<commit_message>
Move poster in another directory
</commit_message>
<xml_diff>
--- a/Poster/Poster.pptx
+++ b/Poster/Poster.pptx
@@ -2,12 +2,12 @@
 <file path=ppt/presentation.xml><?xml version="1.0" encoding="utf-8"?>
 <p:presentation xmlns:a="http://schemas.openxmlformats.org/drawingml/2006/main" xmlns:r="http://schemas.openxmlformats.org/officeDocument/2006/relationships" xmlns:p="http://schemas.openxmlformats.org/presentationml/2006/main" saveSubsetFonts="1">
   <p:sldMasterIdLst>
-    <p:sldMasterId id="2147483660" r:id="rId1"/>
+    <p:sldMasterId id="2147483684" r:id="rId1"/>
   </p:sldMasterIdLst>
   <p:sldIdLst>
     <p:sldId id="256" r:id="rId2"/>
   </p:sldIdLst>
-  <p:sldSz cx="6858000" cy="12192000"/>
+  <p:sldSz cx="30240288" cy="42767250"/>
   <p:notesSz cx="6858000" cy="9144000"/>
   <p:defaultTextStyle>
     <a:defPPr>
@@ -104,13 +104,18 @@
       </a:defRPr>
     </a:lvl9pPr>
   </p:defaultTextStyle>
+  <p:extLst>
+    <p:ext uri="{EFAFB233-063F-42B5-8137-9DF3F51BA10A}">
+      <p15:sldGuideLst xmlns:p15="http://schemas.microsoft.com/office/powerpoint/2012/main"/>
+    </p:ext>
+  </p:extLst>
 </p:presentation>
 </file>
 
 <file path=ppt/revisionInfo.xml><?xml version="1.0" encoding="utf-8"?>
 <p1510:revInfo xmlns:a="http://schemas.openxmlformats.org/drawingml/2006/main" xmlns:r="http://schemas.openxmlformats.org/officeDocument/2006/relationships" xmlns:p1510="http://schemas.microsoft.com/office/powerpoint/2015/10/main">
   <p1510:revLst>
-    <p1510:client id="{503603CF-D47B-40A0-B37E-5FCD232EB101}" v="1" dt="2023-06-05T09:13:01.007"/>
+    <p1510:client id="{5F09D76C-1841-4F58-94B1-5AE3681891B6}" v="386" dt="2023-06-22T09:37:19.801"/>
   </p1510:revLst>
 </p1510:revInfo>
 </file>
@@ -141,6 +146,246 @@
       </pc:sldChg>
     </pc:docChg>
   </pc:docChgLst>
+  <pc:docChgLst>
+    <pc:chgData name="Emils Zegers" userId="bd5cf22c-0e97-44c0-acad-9bc9915da531" providerId="ADAL" clId="{5F09D76C-1841-4F58-94B1-5AE3681891B6}"/>
+    <pc:docChg chg="undo custSel modSld">
+      <pc:chgData name="Emils Zegers" userId="bd5cf22c-0e97-44c0-acad-9bc9915da531" providerId="ADAL" clId="{5F09D76C-1841-4F58-94B1-5AE3681891B6}" dt="2023-06-22T10:11:17.751" v="829" actId="478"/>
+      <pc:docMkLst>
+        <pc:docMk/>
+      </pc:docMkLst>
+      <pc:sldChg chg="addSp delSp modSp mod setBg">
+        <pc:chgData name="Emils Zegers" userId="bd5cf22c-0e97-44c0-acad-9bc9915da531" providerId="ADAL" clId="{5F09D76C-1841-4F58-94B1-5AE3681891B6}" dt="2023-06-22T10:11:17.751" v="829" actId="478"/>
+        <pc:sldMkLst>
+          <pc:docMk/>
+          <pc:sldMk cId="605312590" sldId="256"/>
+        </pc:sldMkLst>
+        <pc:spChg chg="mod">
+          <ac:chgData name="Emils Zegers" userId="bd5cf22c-0e97-44c0-acad-9bc9915da531" providerId="ADAL" clId="{5F09D76C-1841-4F58-94B1-5AE3681891B6}" dt="2023-06-22T09:35:48.844" v="804" actId="1076"/>
+          <ac:spMkLst>
+            <pc:docMk/>
+            <pc:sldMk cId="605312590" sldId="256"/>
+            <ac:spMk id="2" creationId="{8DB20035-8802-6B91-C2C2-CAEC48AD8007}"/>
+          </ac:spMkLst>
+        </pc:spChg>
+        <pc:spChg chg="del">
+          <ac:chgData name="Emils Zegers" userId="bd5cf22c-0e97-44c0-acad-9bc9915da531" providerId="ADAL" clId="{5F09D76C-1841-4F58-94B1-5AE3681891B6}" dt="2023-06-22T07:45:28.656" v="80" actId="478"/>
+          <ac:spMkLst>
+            <pc:docMk/>
+            <pc:sldMk cId="605312590" sldId="256"/>
+            <ac:spMk id="3" creationId="{190A6092-651D-38CE-CB24-1F58314C8B41}"/>
+          </ac:spMkLst>
+        </pc:spChg>
+        <pc:spChg chg="add del mod">
+          <ac:chgData name="Emils Zegers" userId="bd5cf22c-0e97-44c0-acad-9bc9915da531" providerId="ADAL" clId="{5F09D76C-1841-4F58-94B1-5AE3681891B6}" dt="2023-06-22T09:34:05.083" v="765" actId="478"/>
+          <ac:spMkLst>
+            <pc:docMk/>
+            <pc:sldMk cId="605312590" sldId="256"/>
+            <ac:spMk id="3" creationId="{D347D021-A1A0-CEC1-98C3-1776E71D23A0}"/>
+          </ac:spMkLst>
+        </pc:spChg>
+        <pc:spChg chg="add del mod ord">
+          <ac:chgData name="Emils Zegers" userId="bd5cf22c-0e97-44c0-acad-9bc9915da531" providerId="ADAL" clId="{5F09D76C-1841-4F58-94B1-5AE3681891B6}" dt="2023-06-22T09:34:05.083" v="765" actId="478"/>
+          <ac:spMkLst>
+            <pc:docMk/>
+            <pc:sldMk cId="605312590" sldId="256"/>
+            <ac:spMk id="4" creationId="{2102C65A-515F-B2F8-9A1C-38434BCCC427}"/>
+          </ac:spMkLst>
+        </pc:spChg>
+        <pc:spChg chg="add del mod">
+          <ac:chgData name="Emils Zegers" userId="bd5cf22c-0e97-44c0-acad-9bc9915da531" providerId="ADAL" clId="{5F09D76C-1841-4F58-94B1-5AE3681891B6}" dt="2023-06-22T09:34:05.083" v="765" actId="478"/>
+          <ac:spMkLst>
+            <pc:docMk/>
+            <pc:sldMk cId="605312590" sldId="256"/>
+            <ac:spMk id="5" creationId="{77A154C7-5854-948F-FC94-B824696B59C3}"/>
+          </ac:spMkLst>
+        </pc:spChg>
+        <pc:spChg chg="add mod">
+          <ac:chgData name="Emils Zegers" userId="bd5cf22c-0e97-44c0-acad-9bc9915da531" providerId="ADAL" clId="{5F09D76C-1841-4F58-94B1-5AE3681891B6}" dt="2023-06-22T09:36:03.997" v="806" actId="14100"/>
+          <ac:spMkLst>
+            <pc:docMk/>
+            <pc:sldMk cId="605312590" sldId="256"/>
+            <ac:spMk id="6" creationId="{AAE5DBEA-BF18-E3D2-6A0A-B7D3DDDC6955}"/>
+          </ac:spMkLst>
+        </pc:spChg>
+        <pc:spChg chg="add mod">
+          <ac:chgData name="Emils Zegers" userId="bd5cf22c-0e97-44c0-acad-9bc9915da531" providerId="ADAL" clId="{5F09D76C-1841-4F58-94B1-5AE3681891B6}" dt="2023-06-22T09:18:12.963" v="708" actId="1582"/>
+          <ac:spMkLst>
+            <pc:docMk/>
+            <pc:sldMk cId="605312590" sldId="256"/>
+            <ac:spMk id="8" creationId="{F776A035-17DF-D142-9847-265199F0CBDB}"/>
+          </ac:spMkLst>
+        </pc:spChg>
+        <pc:spChg chg="add del mod">
+          <ac:chgData name="Emils Zegers" userId="bd5cf22c-0e97-44c0-acad-9bc9915da531" providerId="ADAL" clId="{5F09D76C-1841-4F58-94B1-5AE3681891B6}" dt="2023-06-22T09:18:14.173" v="710"/>
+          <ac:spMkLst>
+            <pc:docMk/>
+            <pc:sldMk cId="605312590" sldId="256"/>
+            <ac:spMk id="10" creationId="{353E878B-D128-79A3-7BCA-4D0EA2116463}"/>
+          </ac:spMkLst>
+        </pc:spChg>
+        <pc:spChg chg="add mod">
+          <ac:chgData name="Emils Zegers" userId="bd5cf22c-0e97-44c0-acad-9bc9915da531" providerId="ADAL" clId="{5F09D76C-1841-4F58-94B1-5AE3681891B6}" dt="2023-06-22T09:18:53.284" v="762" actId="20577"/>
+          <ac:spMkLst>
+            <pc:docMk/>
+            <pc:sldMk cId="605312590" sldId="256"/>
+            <ac:spMk id="11" creationId="{82B0777B-A2FF-B860-C5E1-B1EF9ADF1C0A}"/>
+          </ac:spMkLst>
+        </pc:spChg>
+        <pc:spChg chg="mod">
+          <ac:chgData name="Emils Zegers" userId="bd5cf22c-0e97-44c0-acad-9bc9915da531" providerId="ADAL" clId="{5F09D76C-1841-4F58-94B1-5AE3681891B6}" dt="2023-06-22T09:35:43.526" v="803" actId="14100"/>
+          <ac:spMkLst>
+            <pc:docMk/>
+            <pc:sldMk cId="605312590" sldId="256"/>
+            <ac:spMk id="14" creationId="{73B8A3AB-D86D-F61D-6ACE-55657C174108}"/>
+          </ac:spMkLst>
+        </pc:spChg>
+        <pc:spChg chg="mod">
+          <ac:chgData name="Emils Zegers" userId="bd5cf22c-0e97-44c0-acad-9bc9915da531" providerId="ADAL" clId="{5F09D76C-1841-4F58-94B1-5AE3681891B6}" dt="2023-06-22T09:36:19.757" v="807" actId="21"/>
+          <ac:spMkLst>
+            <pc:docMk/>
+            <pc:sldMk cId="605312590" sldId="256"/>
+            <ac:spMk id="15" creationId="{A532EE8C-4283-E6F8-5C11-D477855E5280}"/>
+          </ac:spMkLst>
+        </pc:spChg>
+        <pc:spChg chg="add mod">
+          <ac:chgData name="Emils Zegers" userId="bd5cf22c-0e97-44c0-acad-9bc9915da531" providerId="ADAL" clId="{5F09D76C-1841-4F58-94B1-5AE3681891B6}" dt="2023-06-22T09:39:29.586" v="827" actId="1076"/>
+          <ac:spMkLst>
+            <pc:docMk/>
+            <pc:sldMk cId="605312590" sldId="256"/>
+            <ac:spMk id="17" creationId="{0E29FBC8-C102-7BAF-D6A6-070BDC02B058}"/>
+          </ac:spMkLst>
+        </pc:spChg>
+        <pc:spChg chg="add mod">
+          <ac:chgData name="Emils Zegers" userId="bd5cf22c-0e97-44c0-acad-9bc9915da531" providerId="ADAL" clId="{5F09D76C-1841-4F58-94B1-5AE3681891B6}" dt="2023-06-22T09:37:19.801" v="826" actId="164"/>
+          <ac:spMkLst>
+            <pc:docMk/>
+            <pc:sldMk cId="605312590" sldId="256"/>
+            <ac:spMk id="19" creationId="{5EA47C9F-0453-69C3-157F-6AB057DA5D76}"/>
+          </ac:spMkLst>
+        </pc:spChg>
+        <pc:grpChg chg="add del mod">
+          <ac:chgData name="Emils Zegers" userId="bd5cf22c-0e97-44c0-acad-9bc9915da531" providerId="ADAL" clId="{5F09D76C-1841-4F58-94B1-5AE3681891B6}" dt="2023-06-22T10:11:17.751" v="829" actId="478"/>
+          <ac:grpSpMkLst>
+            <pc:docMk/>
+            <pc:sldMk cId="605312590" sldId="256"/>
+            <ac:grpSpMk id="7" creationId="{D7AAE863-2282-0B6B-A7FB-2E034A49FB37}"/>
+          </ac:grpSpMkLst>
+        </pc:grpChg>
+        <pc:grpChg chg="add mod">
+          <ac:chgData name="Emils Zegers" userId="bd5cf22c-0e97-44c0-acad-9bc9915da531" providerId="ADAL" clId="{5F09D76C-1841-4F58-94B1-5AE3681891B6}" dt="2023-06-22T09:10:10.080" v="693" actId="1076"/>
+          <ac:grpSpMkLst>
+            <pc:docMk/>
+            <pc:sldMk cId="605312590" sldId="256"/>
+            <ac:grpSpMk id="9" creationId="{68AD6912-FAB8-B18A-A1F9-FCE5A088D56B}"/>
+          </ac:grpSpMkLst>
+        </pc:grpChg>
+        <pc:grpChg chg="add mod">
+          <ac:chgData name="Emils Zegers" userId="bd5cf22c-0e97-44c0-acad-9bc9915da531" providerId="ADAL" clId="{5F09D76C-1841-4F58-94B1-5AE3681891B6}" dt="2023-06-22T09:37:19.801" v="826" actId="164"/>
+          <ac:grpSpMkLst>
+            <pc:docMk/>
+            <pc:sldMk cId="605312590" sldId="256"/>
+            <ac:grpSpMk id="12" creationId="{D421EDB0-3306-2B0D-25E8-4E2425BB85EF}"/>
+          </ac:grpSpMkLst>
+        </pc:grpChg>
+        <pc:grpChg chg="del mod">
+          <ac:chgData name="Emils Zegers" userId="bd5cf22c-0e97-44c0-acad-9bc9915da531" providerId="ADAL" clId="{5F09D76C-1841-4F58-94B1-5AE3681891B6}" dt="2023-06-22T09:34:08.460" v="767" actId="478"/>
+          <ac:grpSpMkLst>
+            <pc:docMk/>
+            <pc:sldMk cId="605312590" sldId="256"/>
+            <ac:grpSpMk id="13" creationId="{E30AA9FC-9FA1-BC1A-FF2F-5402E3E60CDA}"/>
+          </ac:grpSpMkLst>
+        </pc:grpChg>
+        <pc:grpChg chg="add mod">
+          <ac:chgData name="Emils Zegers" userId="bd5cf22c-0e97-44c0-acad-9bc9915da531" providerId="ADAL" clId="{5F09D76C-1841-4F58-94B1-5AE3681891B6}" dt="2023-06-22T09:37:19.801" v="826" actId="164"/>
+          <ac:grpSpMkLst>
+            <pc:docMk/>
+            <pc:sldMk cId="605312590" sldId="256"/>
+            <ac:grpSpMk id="20" creationId="{F08EB73A-5D5A-6A3A-A58D-38D1E096981C}"/>
+          </ac:grpSpMkLst>
+        </pc:grpChg>
+        <pc:picChg chg="add del mod">
+          <ac:chgData name="Emils Zegers" userId="bd5cf22c-0e97-44c0-acad-9bc9915da531" providerId="ADAL" clId="{5F09D76C-1841-4F58-94B1-5AE3681891B6}" dt="2023-06-22T07:43:11.232" v="51" actId="478"/>
+          <ac:picMkLst>
+            <pc:docMk/>
+            <pc:sldMk cId="605312590" sldId="256"/>
+            <ac:picMk id="6" creationId="{3329F5C5-4FC6-CEED-4739-9C5D136832A1}"/>
+          </ac:picMkLst>
+        </pc:picChg>
+        <pc:picChg chg="add del mod">
+          <ac:chgData name="Emils Zegers" userId="bd5cf22c-0e97-44c0-acad-9bc9915da531" providerId="ADAL" clId="{5F09D76C-1841-4F58-94B1-5AE3681891B6}" dt="2023-06-22T07:43:07.973" v="50" actId="478"/>
+          <ac:picMkLst>
+            <pc:docMk/>
+            <pc:sldMk cId="605312590" sldId="256"/>
+            <ac:picMk id="8" creationId="{5915996A-7DBF-AE16-6F31-009034687659}"/>
+          </ac:picMkLst>
+        </pc:picChg>
+        <pc:picChg chg="add del mod">
+          <ac:chgData name="Emils Zegers" userId="bd5cf22c-0e97-44c0-acad-9bc9915da531" providerId="ADAL" clId="{5F09D76C-1841-4F58-94B1-5AE3681891B6}" dt="2023-06-22T07:43:29.986" v="55" actId="478"/>
+          <ac:picMkLst>
+            <pc:docMk/>
+            <pc:sldMk cId="605312590" sldId="256"/>
+            <ac:picMk id="10" creationId="{FBE9281D-8DCB-AC2F-595C-CFBCDC2568E8}"/>
+          </ac:picMkLst>
+        </pc:picChg>
+        <pc:picChg chg="add del mod">
+          <ac:chgData name="Emils Zegers" userId="bd5cf22c-0e97-44c0-acad-9bc9915da531" providerId="ADAL" clId="{5F09D76C-1841-4F58-94B1-5AE3681891B6}" dt="2023-06-22T07:46:04.035" v="88" actId="478"/>
+          <ac:picMkLst>
+            <pc:docMk/>
+            <pc:sldMk cId="605312590" sldId="256"/>
+            <ac:picMk id="12" creationId="{E792BA31-DCDF-BA17-C848-2EC3708A4542}"/>
+          </ac:picMkLst>
+        </pc:picChg>
+        <pc:picChg chg="add del mod">
+          <ac:chgData name="Emils Zegers" userId="bd5cf22c-0e97-44c0-acad-9bc9915da531" providerId="ADAL" clId="{5F09D76C-1841-4F58-94B1-5AE3681891B6}" dt="2023-06-22T07:51:13.795" v="89" actId="478"/>
+          <ac:picMkLst>
+            <pc:docMk/>
+            <pc:sldMk cId="605312590" sldId="256"/>
+            <ac:picMk id="14" creationId="{7BA47201-6687-80DB-2572-D136598F8B58}"/>
+          </ac:picMkLst>
+        </pc:picChg>
+        <pc:picChg chg="add del mod ord modCrop">
+          <ac:chgData name="Emils Zegers" userId="bd5cf22c-0e97-44c0-acad-9bc9915da531" providerId="ADAL" clId="{5F09D76C-1841-4F58-94B1-5AE3681891B6}" dt="2023-06-22T10:11:17.751" v="829" actId="478"/>
+          <ac:picMkLst>
+            <pc:docMk/>
+            <pc:sldMk cId="605312590" sldId="256"/>
+            <ac:picMk id="16" creationId="{3F43A4C1-1D86-8FD2-2B51-016091922B6A}"/>
+          </ac:picMkLst>
+        </pc:picChg>
+        <pc:picChg chg="del mod">
+          <ac:chgData name="Emils Zegers" userId="bd5cf22c-0e97-44c0-acad-9bc9915da531" providerId="ADAL" clId="{5F09D76C-1841-4F58-94B1-5AE3681891B6}" dt="2023-06-22T09:34:08.460" v="767" actId="478"/>
+          <ac:picMkLst>
+            <pc:docMk/>
+            <pc:sldMk cId="605312590" sldId="256"/>
+            <ac:picMk id="18" creationId="{66C3D6E2-DDA1-D509-1782-6ACFD6DB5DD2}"/>
+          </ac:picMkLst>
+        </pc:picChg>
+        <pc:picChg chg="add del mod">
+          <ac:chgData name="Emils Zegers" userId="bd5cf22c-0e97-44c0-acad-9bc9915da531" providerId="ADAL" clId="{5F09D76C-1841-4F58-94B1-5AE3681891B6}" dt="2023-06-22T07:51:59.418" v="97" actId="478"/>
+          <ac:picMkLst>
+            <pc:docMk/>
+            <pc:sldMk cId="605312590" sldId="256"/>
+            <ac:picMk id="19" creationId="{4C319455-BE5E-D6A1-1891-8CA0C1AEFFFD}"/>
+          </ac:picMkLst>
+        </pc:picChg>
+        <pc:picChg chg="add del mod">
+          <ac:chgData name="Emils Zegers" userId="bd5cf22c-0e97-44c0-acad-9bc9915da531" providerId="ADAL" clId="{5F09D76C-1841-4F58-94B1-5AE3681891B6}" dt="2023-06-22T07:54:18.396" v="101" actId="478"/>
+          <ac:picMkLst>
+            <pc:docMk/>
+            <pc:sldMk cId="605312590" sldId="256"/>
+            <ac:picMk id="21" creationId="{0C2C2998-CE4B-C8EC-EA0A-40889C447CAE}"/>
+          </ac:picMkLst>
+        </pc:picChg>
+        <pc:picChg chg="add mod">
+          <ac:chgData name="Emils Zegers" userId="bd5cf22c-0e97-44c0-acad-9bc9915da531" providerId="ADAL" clId="{5F09D76C-1841-4F58-94B1-5AE3681891B6}" dt="2023-06-22T09:39:32.264" v="828" actId="1076"/>
+          <ac:picMkLst>
+            <pc:docMk/>
+            <pc:sldMk cId="605312590" sldId="256"/>
+            <ac:picMk id="23" creationId="{098999BF-B894-6B99-397A-E1BB84087883}"/>
+          </ac:picMkLst>
+        </pc:picChg>
+      </pc:sldChg>
+    </pc:docChg>
+  </pc:docChgLst>
 </pc:chgInfo>
 </file>
 
@@ -173,15 +418,15 @@
         </p:nvSpPr>
         <p:spPr>
           <a:xfrm>
-            <a:off x="514350" y="1995312"/>
-            <a:ext cx="5829300" cy="4244622"/>
+            <a:off x="2268022" y="6999180"/>
+            <a:ext cx="25704245" cy="14889339"/>
           </a:xfrm>
         </p:spPr>
         <p:txBody>
           <a:bodyPr anchor="b"/>
           <a:lstStyle>
             <a:lvl1pPr algn="ctr">
-              <a:defRPr sz="4500"/>
+              <a:defRPr sz="19843"/>
             </a:lvl1pPr>
           </a:lstStyle>
           <a:p>
@@ -205,8 +450,8 @@
         </p:nvSpPr>
         <p:spPr>
           <a:xfrm>
-            <a:off x="857250" y="6403623"/>
-            <a:ext cx="5143500" cy="2943577"/>
+            <a:off x="3780036" y="22462709"/>
+            <a:ext cx="22680216" cy="10325516"/>
           </a:xfrm>
         </p:spPr>
         <p:txBody>
@@ -214,39 +459,39 @@
           <a:lstStyle>
             <a:lvl1pPr marL="0" indent="0" algn="ctr">
               <a:buNone/>
-              <a:defRPr sz="1800"/>
+              <a:defRPr sz="7937"/>
             </a:lvl1pPr>
-            <a:lvl2pPr marL="342900" indent="0" algn="ctr">
-              <a:buNone/>
-              <a:defRPr sz="1500"/>
+            <a:lvl2pPr marL="1512006" indent="0" algn="ctr">
+              <a:buNone/>
+              <a:defRPr sz="6614"/>
             </a:lvl2pPr>
-            <a:lvl3pPr marL="685800" indent="0" algn="ctr">
-              <a:buNone/>
-              <a:defRPr sz="1350"/>
+            <a:lvl3pPr marL="3024012" indent="0" algn="ctr">
+              <a:buNone/>
+              <a:defRPr sz="5953"/>
             </a:lvl3pPr>
-            <a:lvl4pPr marL="1028700" indent="0" algn="ctr">
-              <a:buNone/>
-              <a:defRPr sz="1200"/>
+            <a:lvl4pPr marL="4536018" indent="0" algn="ctr">
+              <a:buNone/>
+              <a:defRPr sz="5291"/>
             </a:lvl4pPr>
-            <a:lvl5pPr marL="1371600" indent="0" algn="ctr">
-              <a:buNone/>
-              <a:defRPr sz="1200"/>
+            <a:lvl5pPr marL="6048024" indent="0" algn="ctr">
+              <a:buNone/>
+              <a:defRPr sz="5291"/>
             </a:lvl5pPr>
-            <a:lvl6pPr marL="1714500" indent="0" algn="ctr">
-              <a:buNone/>
-              <a:defRPr sz="1200"/>
+            <a:lvl6pPr marL="7560031" indent="0" algn="ctr">
+              <a:buNone/>
+              <a:defRPr sz="5291"/>
             </a:lvl6pPr>
-            <a:lvl7pPr marL="2057400" indent="0" algn="ctr">
-              <a:buNone/>
-              <a:defRPr sz="1200"/>
+            <a:lvl7pPr marL="9072037" indent="0" algn="ctr">
+              <a:buNone/>
+              <a:defRPr sz="5291"/>
             </a:lvl7pPr>
-            <a:lvl8pPr marL="2400300" indent="0" algn="ctr">
-              <a:buNone/>
-              <a:defRPr sz="1200"/>
+            <a:lvl8pPr marL="10584043" indent="0" algn="ctr">
+              <a:buNone/>
+              <a:defRPr sz="5291"/>
             </a:lvl8pPr>
-            <a:lvl9pPr marL="2743200" indent="0" algn="ctr">
-              <a:buNone/>
-              <a:defRPr sz="1200"/>
+            <a:lvl9pPr marL="12096049" indent="0" algn="ctr">
+              <a:buNone/>
+              <a:defRPr sz="5291"/>
             </a:lvl9pPr>
           </a:lstStyle>
           <a:p>
@@ -275,7 +520,7 @@
           <a:p>
             <a:fld id="{B8089D90-E8EC-433F-8241-FB36479BB3A8}" type="datetimeFigureOut">
               <a:rPr lang="en-NL" smtClean="0"/>
-              <a:t>05/06/2023</a:t>
+              <a:t>22/06/2023</a:t>
             </a:fld>
             <a:endParaRPr lang="en-NL"/>
           </a:p>
@@ -326,7 +571,7 @@
     </p:spTree>
     <p:extLst>
       <p:ext uri="{BB962C8B-B14F-4D97-AF65-F5344CB8AC3E}">
-        <p14:creationId xmlns:p14="http://schemas.microsoft.com/office/powerpoint/2010/main" val="4202025576"/>
+        <p14:creationId xmlns:p14="http://schemas.microsoft.com/office/powerpoint/2010/main" val="1216960784"/>
       </p:ext>
     </p:extLst>
   </p:cSld>
@@ -445,7 +690,7 @@
           <a:p>
             <a:fld id="{B8089D90-E8EC-433F-8241-FB36479BB3A8}" type="datetimeFigureOut">
               <a:rPr lang="en-NL" smtClean="0"/>
-              <a:t>05/06/2023</a:t>
+              <a:t>22/06/2023</a:t>
             </a:fld>
             <a:endParaRPr lang="en-NL"/>
           </a:p>
@@ -496,7 +741,7 @@
     </p:spTree>
     <p:extLst>
       <p:ext uri="{BB962C8B-B14F-4D97-AF65-F5344CB8AC3E}">
-        <p14:creationId xmlns:p14="http://schemas.microsoft.com/office/powerpoint/2010/main" val="2809444958"/>
+        <p14:creationId xmlns:p14="http://schemas.microsoft.com/office/powerpoint/2010/main" val="150836630"/>
       </p:ext>
     </p:extLst>
   </p:cSld>
@@ -535,8 +780,8 @@
         </p:nvSpPr>
         <p:spPr>
           <a:xfrm>
-            <a:off x="4907757" y="649111"/>
-            <a:ext cx="1478756" cy="10332156"/>
+            <a:off x="21640708" y="2276960"/>
+            <a:ext cx="6520562" cy="36243268"/>
           </a:xfrm>
         </p:spPr>
         <p:txBody>
@@ -563,8 +808,8 @@
         </p:nvSpPr>
         <p:spPr>
           <a:xfrm>
-            <a:off x="471488" y="649111"/>
-            <a:ext cx="4350544" cy="10332156"/>
+            <a:off x="2079021" y="2276960"/>
+            <a:ext cx="19183683" cy="36243268"/>
           </a:xfrm>
         </p:spPr>
         <p:txBody>
@@ -625,7 +870,7 @@
           <a:p>
             <a:fld id="{B8089D90-E8EC-433F-8241-FB36479BB3A8}" type="datetimeFigureOut">
               <a:rPr lang="en-NL" smtClean="0"/>
-              <a:t>05/06/2023</a:t>
+              <a:t>22/06/2023</a:t>
             </a:fld>
             <a:endParaRPr lang="en-NL"/>
           </a:p>
@@ -676,7 +921,7 @@
     </p:spTree>
     <p:extLst>
       <p:ext uri="{BB962C8B-B14F-4D97-AF65-F5344CB8AC3E}">
-        <p14:creationId xmlns:p14="http://schemas.microsoft.com/office/powerpoint/2010/main" val="1006203623"/>
+        <p14:creationId xmlns:p14="http://schemas.microsoft.com/office/powerpoint/2010/main" val="1796651024"/>
       </p:ext>
     </p:extLst>
   </p:cSld>
@@ -795,7 +1040,7 @@
           <a:p>
             <a:fld id="{B8089D90-E8EC-433F-8241-FB36479BB3A8}" type="datetimeFigureOut">
               <a:rPr lang="en-NL" smtClean="0"/>
-              <a:t>05/06/2023</a:t>
+              <a:t>22/06/2023</a:t>
             </a:fld>
             <a:endParaRPr lang="en-NL"/>
           </a:p>
@@ -846,7 +1091,7 @@
     </p:spTree>
     <p:extLst>
       <p:ext uri="{BB962C8B-B14F-4D97-AF65-F5344CB8AC3E}">
-        <p14:creationId xmlns:p14="http://schemas.microsoft.com/office/powerpoint/2010/main" val="3088679248"/>
+        <p14:creationId xmlns:p14="http://schemas.microsoft.com/office/powerpoint/2010/main" val="2060888008"/>
       </p:ext>
     </p:extLst>
   </p:cSld>
@@ -885,15 +1130,15 @@
         </p:nvSpPr>
         <p:spPr>
           <a:xfrm>
-            <a:off x="467916" y="3039537"/>
-            <a:ext cx="5915025" cy="5071532"/>
+            <a:off x="2063272" y="10662125"/>
+            <a:ext cx="26082248" cy="17789985"/>
           </a:xfrm>
         </p:spPr>
         <p:txBody>
           <a:bodyPr anchor="b"/>
           <a:lstStyle>
             <a:lvl1pPr>
-              <a:defRPr sz="4500"/>
+              <a:defRPr sz="19843"/>
             </a:lvl1pPr>
           </a:lstStyle>
           <a:p>
@@ -917,8 +1162,8 @@
         </p:nvSpPr>
         <p:spPr>
           <a:xfrm>
-            <a:off x="467916" y="8159048"/>
-            <a:ext cx="5915025" cy="2666999"/>
+            <a:off x="2063272" y="28620410"/>
+            <a:ext cx="26082248" cy="9355333"/>
           </a:xfrm>
         </p:spPr>
         <p:txBody>
@@ -926,15 +1171,15 @@
           <a:lstStyle>
             <a:lvl1pPr marL="0" indent="0">
               <a:buNone/>
-              <a:defRPr sz="1800">
+              <a:defRPr sz="7937">
                 <a:solidFill>
                   <a:schemeClr val="tx1"/>
                 </a:solidFill>
               </a:defRPr>
             </a:lvl1pPr>
-            <a:lvl2pPr marL="342900" indent="0">
-              <a:buNone/>
-              <a:defRPr sz="1500">
+            <a:lvl2pPr marL="1512006" indent="0">
+              <a:buNone/>
+              <a:defRPr sz="6614">
                 <a:solidFill>
                   <a:schemeClr val="tx1">
                     <a:tint val="75000"/>
@@ -942,9 +1187,9 @@
                 </a:solidFill>
               </a:defRPr>
             </a:lvl2pPr>
-            <a:lvl3pPr marL="685800" indent="0">
-              <a:buNone/>
-              <a:defRPr sz="1350">
+            <a:lvl3pPr marL="3024012" indent="0">
+              <a:buNone/>
+              <a:defRPr sz="5953">
                 <a:solidFill>
                   <a:schemeClr val="tx1">
                     <a:tint val="75000"/>
@@ -952,9 +1197,9 @@
                 </a:solidFill>
               </a:defRPr>
             </a:lvl3pPr>
-            <a:lvl4pPr marL="1028700" indent="0">
-              <a:buNone/>
-              <a:defRPr sz="1200">
+            <a:lvl4pPr marL="4536018" indent="0">
+              <a:buNone/>
+              <a:defRPr sz="5291">
                 <a:solidFill>
                   <a:schemeClr val="tx1">
                     <a:tint val="75000"/>
@@ -962,9 +1207,9 @@
                 </a:solidFill>
               </a:defRPr>
             </a:lvl4pPr>
-            <a:lvl5pPr marL="1371600" indent="0">
-              <a:buNone/>
-              <a:defRPr sz="1200">
+            <a:lvl5pPr marL="6048024" indent="0">
+              <a:buNone/>
+              <a:defRPr sz="5291">
                 <a:solidFill>
                   <a:schemeClr val="tx1">
                     <a:tint val="75000"/>
@@ -972,9 +1217,9 @@
                 </a:solidFill>
               </a:defRPr>
             </a:lvl5pPr>
-            <a:lvl6pPr marL="1714500" indent="0">
-              <a:buNone/>
-              <a:defRPr sz="1200">
+            <a:lvl6pPr marL="7560031" indent="0">
+              <a:buNone/>
+              <a:defRPr sz="5291">
                 <a:solidFill>
                   <a:schemeClr val="tx1">
                     <a:tint val="75000"/>
@@ -982,9 +1227,9 @@
                 </a:solidFill>
               </a:defRPr>
             </a:lvl6pPr>
-            <a:lvl7pPr marL="2057400" indent="0">
-              <a:buNone/>
-              <a:defRPr sz="1200">
+            <a:lvl7pPr marL="9072037" indent="0">
+              <a:buNone/>
+              <a:defRPr sz="5291">
                 <a:solidFill>
                   <a:schemeClr val="tx1">
                     <a:tint val="75000"/>
@@ -992,9 +1237,9 @@
                 </a:solidFill>
               </a:defRPr>
             </a:lvl7pPr>
-            <a:lvl8pPr marL="2400300" indent="0">
-              <a:buNone/>
-              <a:defRPr sz="1200">
+            <a:lvl8pPr marL="10584043" indent="0">
+              <a:buNone/>
+              <a:defRPr sz="5291">
                 <a:solidFill>
                   <a:schemeClr val="tx1">
                     <a:tint val="75000"/>
@@ -1002,9 +1247,9 @@
                 </a:solidFill>
               </a:defRPr>
             </a:lvl8pPr>
-            <a:lvl9pPr marL="2743200" indent="0">
-              <a:buNone/>
-              <a:defRPr sz="1200">
+            <a:lvl9pPr marL="12096049" indent="0">
+              <a:buNone/>
+              <a:defRPr sz="5291">
                 <a:solidFill>
                   <a:schemeClr val="tx1">
                     <a:tint val="75000"/>
@@ -1039,7 +1284,7 @@
           <a:p>
             <a:fld id="{B8089D90-E8EC-433F-8241-FB36479BB3A8}" type="datetimeFigureOut">
               <a:rPr lang="en-NL" smtClean="0"/>
-              <a:t>05/06/2023</a:t>
+              <a:t>22/06/2023</a:t>
             </a:fld>
             <a:endParaRPr lang="en-NL"/>
           </a:p>
@@ -1090,7 +1335,7 @@
     </p:spTree>
     <p:extLst>
       <p:ext uri="{BB962C8B-B14F-4D97-AF65-F5344CB8AC3E}">
-        <p14:creationId xmlns:p14="http://schemas.microsoft.com/office/powerpoint/2010/main" val="457526537"/>
+        <p14:creationId xmlns:p14="http://schemas.microsoft.com/office/powerpoint/2010/main" val="3226967259"/>
       </p:ext>
     </p:extLst>
   </p:cSld>
@@ -1152,8 +1397,8 @@
         </p:nvSpPr>
         <p:spPr>
           <a:xfrm>
-            <a:off x="471488" y="3245556"/>
-            <a:ext cx="2914650" cy="7735712"/>
+            <a:off x="2079020" y="11384800"/>
+            <a:ext cx="12852122" cy="27135427"/>
           </a:xfrm>
         </p:spPr>
         <p:txBody>
@@ -1209,8 +1454,8 @@
         </p:nvSpPr>
         <p:spPr>
           <a:xfrm>
-            <a:off x="3471863" y="3245556"/>
-            <a:ext cx="2914650" cy="7735712"/>
+            <a:off x="15309146" y="11384800"/>
+            <a:ext cx="12852122" cy="27135427"/>
           </a:xfrm>
         </p:spPr>
         <p:txBody>
@@ -1271,7 +1516,7 @@
           <a:p>
             <a:fld id="{B8089D90-E8EC-433F-8241-FB36479BB3A8}" type="datetimeFigureOut">
               <a:rPr lang="en-NL" smtClean="0"/>
-              <a:t>05/06/2023</a:t>
+              <a:t>22/06/2023</a:t>
             </a:fld>
             <a:endParaRPr lang="en-NL"/>
           </a:p>
@@ -1322,7 +1567,7 @@
     </p:spTree>
     <p:extLst>
       <p:ext uri="{BB962C8B-B14F-4D97-AF65-F5344CB8AC3E}">
-        <p14:creationId xmlns:p14="http://schemas.microsoft.com/office/powerpoint/2010/main" val="991564536"/>
+        <p14:creationId xmlns:p14="http://schemas.microsoft.com/office/powerpoint/2010/main" val="1315376767"/>
       </p:ext>
     </p:extLst>
   </p:cSld>
@@ -1361,8 +1606,8 @@
         </p:nvSpPr>
         <p:spPr>
           <a:xfrm>
-            <a:off x="472381" y="649114"/>
-            <a:ext cx="5915025" cy="2356556"/>
+            <a:off x="2082959" y="2276970"/>
+            <a:ext cx="26082248" cy="8266358"/>
           </a:xfrm>
         </p:spPr>
         <p:txBody>
@@ -1389,8 +1634,8 @@
         </p:nvSpPr>
         <p:spPr>
           <a:xfrm>
-            <a:off x="472381" y="2988734"/>
-            <a:ext cx="2901255" cy="1464732"/>
+            <a:off x="2082962" y="10483919"/>
+            <a:ext cx="12793057" cy="5138007"/>
           </a:xfrm>
         </p:spPr>
         <p:txBody>
@@ -1398,39 +1643,39 @@
           <a:lstStyle>
             <a:lvl1pPr marL="0" indent="0">
               <a:buNone/>
-              <a:defRPr sz="1800" b="1"/>
+              <a:defRPr sz="7937" b="1"/>
             </a:lvl1pPr>
-            <a:lvl2pPr marL="342900" indent="0">
-              <a:buNone/>
-              <a:defRPr sz="1500" b="1"/>
+            <a:lvl2pPr marL="1512006" indent="0">
+              <a:buNone/>
+              <a:defRPr sz="6614" b="1"/>
             </a:lvl2pPr>
-            <a:lvl3pPr marL="685800" indent="0">
-              <a:buNone/>
-              <a:defRPr sz="1350" b="1"/>
+            <a:lvl3pPr marL="3024012" indent="0">
+              <a:buNone/>
+              <a:defRPr sz="5953" b="1"/>
             </a:lvl3pPr>
-            <a:lvl4pPr marL="1028700" indent="0">
-              <a:buNone/>
-              <a:defRPr sz="1200" b="1"/>
+            <a:lvl4pPr marL="4536018" indent="0">
+              <a:buNone/>
+              <a:defRPr sz="5291" b="1"/>
             </a:lvl4pPr>
-            <a:lvl5pPr marL="1371600" indent="0">
-              <a:buNone/>
-              <a:defRPr sz="1200" b="1"/>
+            <a:lvl5pPr marL="6048024" indent="0">
+              <a:buNone/>
+              <a:defRPr sz="5291" b="1"/>
             </a:lvl5pPr>
-            <a:lvl6pPr marL="1714500" indent="0">
-              <a:buNone/>
-              <a:defRPr sz="1200" b="1"/>
+            <a:lvl6pPr marL="7560031" indent="0">
+              <a:buNone/>
+              <a:defRPr sz="5291" b="1"/>
             </a:lvl6pPr>
-            <a:lvl7pPr marL="2057400" indent="0">
-              <a:buNone/>
-              <a:defRPr sz="1200" b="1"/>
+            <a:lvl7pPr marL="9072037" indent="0">
+              <a:buNone/>
+              <a:defRPr sz="5291" b="1"/>
             </a:lvl7pPr>
-            <a:lvl8pPr marL="2400300" indent="0">
-              <a:buNone/>
-              <a:defRPr sz="1200" b="1"/>
+            <a:lvl8pPr marL="10584043" indent="0">
+              <a:buNone/>
+              <a:defRPr sz="5291" b="1"/>
             </a:lvl8pPr>
-            <a:lvl9pPr marL="2743200" indent="0">
-              <a:buNone/>
-              <a:defRPr sz="1200" b="1"/>
+            <a:lvl9pPr marL="12096049" indent="0">
+              <a:buNone/>
+              <a:defRPr sz="5291" b="1"/>
             </a:lvl9pPr>
           </a:lstStyle>
           <a:p>
@@ -1454,8 +1699,8 @@
         </p:nvSpPr>
         <p:spPr>
           <a:xfrm>
-            <a:off x="472381" y="4453467"/>
-            <a:ext cx="2901255" cy="6550379"/>
+            <a:off x="2082962" y="15621926"/>
+            <a:ext cx="12793057" cy="22977500"/>
           </a:xfrm>
         </p:spPr>
         <p:txBody>
@@ -1511,8 +1756,8 @@
         </p:nvSpPr>
         <p:spPr>
           <a:xfrm>
-            <a:off x="3471863" y="2988734"/>
-            <a:ext cx="2915543" cy="1464732"/>
+            <a:off x="15309148" y="10483919"/>
+            <a:ext cx="12856061" cy="5138007"/>
           </a:xfrm>
         </p:spPr>
         <p:txBody>
@@ -1520,39 +1765,39 @@
           <a:lstStyle>
             <a:lvl1pPr marL="0" indent="0">
               <a:buNone/>
-              <a:defRPr sz="1800" b="1"/>
+              <a:defRPr sz="7937" b="1"/>
             </a:lvl1pPr>
-            <a:lvl2pPr marL="342900" indent="0">
-              <a:buNone/>
-              <a:defRPr sz="1500" b="1"/>
+            <a:lvl2pPr marL="1512006" indent="0">
+              <a:buNone/>
+              <a:defRPr sz="6614" b="1"/>
             </a:lvl2pPr>
-            <a:lvl3pPr marL="685800" indent="0">
-              <a:buNone/>
-              <a:defRPr sz="1350" b="1"/>
+            <a:lvl3pPr marL="3024012" indent="0">
+              <a:buNone/>
+              <a:defRPr sz="5953" b="1"/>
             </a:lvl3pPr>
-            <a:lvl4pPr marL="1028700" indent="0">
-              <a:buNone/>
-              <a:defRPr sz="1200" b="1"/>
+            <a:lvl4pPr marL="4536018" indent="0">
+              <a:buNone/>
+              <a:defRPr sz="5291" b="1"/>
             </a:lvl4pPr>
-            <a:lvl5pPr marL="1371600" indent="0">
-              <a:buNone/>
-              <a:defRPr sz="1200" b="1"/>
+            <a:lvl5pPr marL="6048024" indent="0">
+              <a:buNone/>
+              <a:defRPr sz="5291" b="1"/>
             </a:lvl5pPr>
-            <a:lvl6pPr marL="1714500" indent="0">
-              <a:buNone/>
-              <a:defRPr sz="1200" b="1"/>
+            <a:lvl6pPr marL="7560031" indent="0">
+              <a:buNone/>
+              <a:defRPr sz="5291" b="1"/>
             </a:lvl6pPr>
-            <a:lvl7pPr marL="2057400" indent="0">
-              <a:buNone/>
-              <a:defRPr sz="1200" b="1"/>
+            <a:lvl7pPr marL="9072037" indent="0">
+              <a:buNone/>
+              <a:defRPr sz="5291" b="1"/>
             </a:lvl7pPr>
-            <a:lvl8pPr marL="2400300" indent="0">
-              <a:buNone/>
-              <a:defRPr sz="1200" b="1"/>
+            <a:lvl8pPr marL="10584043" indent="0">
+              <a:buNone/>
+              <a:defRPr sz="5291" b="1"/>
             </a:lvl8pPr>
-            <a:lvl9pPr marL="2743200" indent="0">
-              <a:buNone/>
-              <a:defRPr sz="1200" b="1"/>
+            <a:lvl9pPr marL="12096049" indent="0">
+              <a:buNone/>
+              <a:defRPr sz="5291" b="1"/>
             </a:lvl9pPr>
           </a:lstStyle>
           <a:p>
@@ -1576,8 +1821,8 @@
         </p:nvSpPr>
         <p:spPr>
           <a:xfrm>
-            <a:off x="3471863" y="4453467"/>
-            <a:ext cx="2915543" cy="6550379"/>
+            <a:off x="15309148" y="15621926"/>
+            <a:ext cx="12856061" cy="22977500"/>
           </a:xfrm>
         </p:spPr>
         <p:txBody>
@@ -1638,7 +1883,7 @@
           <a:p>
             <a:fld id="{B8089D90-E8EC-433F-8241-FB36479BB3A8}" type="datetimeFigureOut">
               <a:rPr lang="en-NL" smtClean="0"/>
-              <a:t>05/06/2023</a:t>
+              <a:t>22/06/2023</a:t>
             </a:fld>
             <a:endParaRPr lang="en-NL"/>
           </a:p>
@@ -1689,7 +1934,7 @@
     </p:spTree>
     <p:extLst>
       <p:ext uri="{BB962C8B-B14F-4D97-AF65-F5344CB8AC3E}">
-        <p14:creationId xmlns:p14="http://schemas.microsoft.com/office/powerpoint/2010/main" val="3190188667"/>
+        <p14:creationId xmlns:p14="http://schemas.microsoft.com/office/powerpoint/2010/main" val="274705922"/>
       </p:ext>
     </p:extLst>
   </p:cSld>
@@ -1756,7 +2001,7 @@
           <a:p>
             <a:fld id="{B8089D90-E8EC-433F-8241-FB36479BB3A8}" type="datetimeFigureOut">
               <a:rPr lang="en-NL" smtClean="0"/>
-              <a:t>05/06/2023</a:t>
+              <a:t>22/06/2023</a:t>
             </a:fld>
             <a:endParaRPr lang="en-NL"/>
           </a:p>
@@ -1807,7 +2052,7 @@
     </p:spTree>
     <p:extLst>
       <p:ext uri="{BB962C8B-B14F-4D97-AF65-F5344CB8AC3E}">
-        <p14:creationId xmlns:p14="http://schemas.microsoft.com/office/powerpoint/2010/main" val="1301362767"/>
+        <p14:creationId xmlns:p14="http://schemas.microsoft.com/office/powerpoint/2010/main" val="1576448981"/>
       </p:ext>
     </p:extLst>
   </p:cSld>
@@ -1851,7 +2096,7 @@
           <a:p>
             <a:fld id="{B8089D90-E8EC-433F-8241-FB36479BB3A8}" type="datetimeFigureOut">
               <a:rPr lang="en-NL" smtClean="0"/>
-              <a:t>05/06/2023</a:t>
+              <a:t>22/06/2023</a:t>
             </a:fld>
             <a:endParaRPr lang="en-NL"/>
           </a:p>
@@ -1902,7 +2147,7 @@
     </p:spTree>
     <p:extLst>
       <p:ext uri="{BB962C8B-B14F-4D97-AF65-F5344CB8AC3E}">
-        <p14:creationId xmlns:p14="http://schemas.microsoft.com/office/powerpoint/2010/main" val="862736341"/>
+        <p14:creationId xmlns:p14="http://schemas.microsoft.com/office/powerpoint/2010/main" val="2646187575"/>
       </p:ext>
     </p:extLst>
   </p:cSld>
@@ -1941,15 +2186,15 @@
         </p:nvSpPr>
         <p:spPr>
           <a:xfrm>
-            <a:off x="472381" y="812800"/>
-            <a:ext cx="2211884" cy="2844800"/>
+            <a:off x="2082959" y="2851150"/>
+            <a:ext cx="9753280" cy="9979025"/>
           </a:xfrm>
         </p:spPr>
         <p:txBody>
           <a:bodyPr anchor="b"/>
           <a:lstStyle>
             <a:lvl1pPr>
-              <a:defRPr sz="2400"/>
+              <a:defRPr sz="10583"/>
             </a:lvl1pPr>
           </a:lstStyle>
           <a:p>
@@ -1973,39 +2218,39 @@
         </p:nvSpPr>
         <p:spPr>
           <a:xfrm>
-            <a:off x="2915543" y="1755425"/>
-            <a:ext cx="3471863" cy="8664222"/>
+            <a:off x="12856061" y="6157701"/>
+            <a:ext cx="15309146" cy="30392467"/>
           </a:xfrm>
         </p:spPr>
         <p:txBody>
           <a:bodyPr/>
           <a:lstStyle>
             <a:lvl1pPr>
-              <a:defRPr sz="2400"/>
+              <a:defRPr sz="10583"/>
             </a:lvl1pPr>
             <a:lvl2pPr>
-              <a:defRPr sz="2100"/>
+              <a:defRPr sz="9260"/>
             </a:lvl2pPr>
             <a:lvl3pPr>
-              <a:defRPr sz="1800"/>
+              <a:defRPr sz="7937"/>
             </a:lvl3pPr>
             <a:lvl4pPr>
-              <a:defRPr sz="1500"/>
+              <a:defRPr sz="6614"/>
             </a:lvl4pPr>
             <a:lvl5pPr>
-              <a:defRPr sz="1500"/>
+              <a:defRPr sz="6614"/>
             </a:lvl5pPr>
             <a:lvl6pPr>
-              <a:defRPr sz="1500"/>
+              <a:defRPr sz="6614"/>
             </a:lvl6pPr>
             <a:lvl7pPr>
-              <a:defRPr sz="1500"/>
+              <a:defRPr sz="6614"/>
             </a:lvl7pPr>
             <a:lvl8pPr>
-              <a:defRPr sz="1500"/>
+              <a:defRPr sz="6614"/>
             </a:lvl8pPr>
             <a:lvl9pPr>
-              <a:defRPr sz="1500"/>
+              <a:defRPr sz="6614"/>
             </a:lvl9pPr>
           </a:lstStyle>
           <a:p>
@@ -2058,8 +2303,8 @@
         </p:nvSpPr>
         <p:spPr>
           <a:xfrm>
-            <a:off x="472381" y="3657600"/>
-            <a:ext cx="2211884" cy="6776156"/>
+            <a:off x="2082959" y="12830175"/>
+            <a:ext cx="9753280" cy="23769486"/>
           </a:xfrm>
         </p:spPr>
         <p:txBody>
@@ -2067,39 +2312,39 @@
           <a:lstStyle>
             <a:lvl1pPr marL="0" indent="0">
               <a:buNone/>
-              <a:defRPr sz="1200"/>
+              <a:defRPr sz="5291"/>
             </a:lvl1pPr>
-            <a:lvl2pPr marL="342900" indent="0">
-              <a:buNone/>
-              <a:defRPr sz="1050"/>
+            <a:lvl2pPr marL="1512006" indent="0">
+              <a:buNone/>
+              <a:defRPr sz="4630"/>
             </a:lvl2pPr>
-            <a:lvl3pPr marL="685800" indent="0">
-              <a:buNone/>
-              <a:defRPr sz="900"/>
+            <a:lvl3pPr marL="3024012" indent="0">
+              <a:buNone/>
+              <a:defRPr sz="3969"/>
             </a:lvl3pPr>
-            <a:lvl4pPr marL="1028700" indent="0">
-              <a:buNone/>
-              <a:defRPr sz="750"/>
+            <a:lvl4pPr marL="4536018" indent="0">
+              <a:buNone/>
+              <a:defRPr sz="3307"/>
             </a:lvl4pPr>
-            <a:lvl5pPr marL="1371600" indent="0">
-              <a:buNone/>
-              <a:defRPr sz="750"/>
+            <a:lvl5pPr marL="6048024" indent="0">
+              <a:buNone/>
+              <a:defRPr sz="3307"/>
             </a:lvl5pPr>
-            <a:lvl6pPr marL="1714500" indent="0">
-              <a:buNone/>
-              <a:defRPr sz="750"/>
+            <a:lvl6pPr marL="7560031" indent="0">
+              <a:buNone/>
+              <a:defRPr sz="3307"/>
             </a:lvl6pPr>
-            <a:lvl7pPr marL="2057400" indent="0">
-              <a:buNone/>
-              <a:defRPr sz="750"/>
+            <a:lvl7pPr marL="9072037" indent="0">
+              <a:buNone/>
+              <a:defRPr sz="3307"/>
             </a:lvl7pPr>
-            <a:lvl8pPr marL="2400300" indent="0">
-              <a:buNone/>
-              <a:defRPr sz="750"/>
+            <a:lvl8pPr marL="10584043" indent="0">
+              <a:buNone/>
+              <a:defRPr sz="3307"/>
             </a:lvl8pPr>
-            <a:lvl9pPr marL="2743200" indent="0">
-              <a:buNone/>
-              <a:defRPr sz="750"/>
+            <a:lvl9pPr marL="12096049" indent="0">
+              <a:buNone/>
+              <a:defRPr sz="3307"/>
             </a:lvl9pPr>
           </a:lstStyle>
           <a:p>
@@ -2128,7 +2373,7 @@
           <a:p>
             <a:fld id="{B8089D90-E8EC-433F-8241-FB36479BB3A8}" type="datetimeFigureOut">
               <a:rPr lang="en-NL" smtClean="0"/>
-              <a:t>05/06/2023</a:t>
+              <a:t>22/06/2023</a:t>
             </a:fld>
             <a:endParaRPr lang="en-NL"/>
           </a:p>
@@ -2179,7 +2424,7 @@
     </p:spTree>
     <p:extLst>
       <p:ext uri="{BB962C8B-B14F-4D97-AF65-F5344CB8AC3E}">
-        <p14:creationId xmlns:p14="http://schemas.microsoft.com/office/powerpoint/2010/main" val="2630396387"/>
+        <p14:creationId xmlns:p14="http://schemas.microsoft.com/office/powerpoint/2010/main" val="2691020940"/>
       </p:ext>
     </p:extLst>
   </p:cSld>
@@ -2218,15 +2463,15 @@
         </p:nvSpPr>
         <p:spPr>
           <a:xfrm>
-            <a:off x="472381" y="812800"/>
-            <a:ext cx="2211884" cy="2844800"/>
+            <a:off x="2082959" y="2851150"/>
+            <a:ext cx="9753280" cy="9979025"/>
           </a:xfrm>
         </p:spPr>
         <p:txBody>
           <a:bodyPr anchor="b"/>
           <a:lstStyle>
             <a:lvl1pPr>
-              <a:defRPr sz="2400"/>
+              <a:defRPr sz="10583"/>
             </a:lvl1pPr>
           </a:lstStyle>
           <a:p>
@@ -2250,8 +2495,8 @@
         </p:nvSpPr>
         <p:spPr>
           <a:xfrm>
-            <a:off x="2915543" y="1755425"/>
-            <a:ext cx="3471863" cy="8664222"/>
+            <a:off x="12856061" y="6157701"/>
+            <a:ext cx="15309146" cy="30392467"/>
           </a:xfrm>
         </p:spPr>
         <p:txBody>
@@ -2259,39 +2504,39 @@
           <a:lstStyle>
             <a:lvl1pPr marL="0" indent="0">
               <a:buNone/>
-              <a:defRPr sz="2400"/>
+              <a:defRPr sz="10583"/>
             </a:lvl1pPr>
-            <a:lvl2pPr marL="342900" indent="0">
-              <a:buNone/>
-              <a:defRPr sz="2100"/>
+            <a:lvl2pPr marL="1512006" indent="0">
+              <a:buNone/>
+              <a:defRPr sz="9260"/>
             </a:lvl2pPr>
-            <a:lvl3pPr marL="685800" indent="0">
-              <a:buNone/>
-              <a:defRPr sz="1800"/>
+            <a:lvl3pPr marL="3024012" indent="0">
+              <a:buNone/>
+              <a:defRPr sz="7937"/>
             </a:lvl3pPr>
-            <a:lvl4pPr marL="1028700" indent="0">
-              <a:buNone/>
-              <a:defRPr sz="1500"/>
+            <a:lvl4pPr marL="4536018" indent="0">
+              <a:buNone/>
+              <a:defRPr sz="6614"/>
             </a:lvl4pPr>
-            <a:lvl5pPr marL="1371600" indent="0">
-              <a:buNone/>
-              <a:defRPr sz="1500"/>
+            <a:lvl5pPr marL="6048024" indent="0">
+              <a:buNone/>
+              <a:defRPr sz="6614"/>
             </a:lvl5pPr>
-            <a:lvl6pPr marL="1714500" indent="0">
-              <a:buNone/>
-              <a:defRPr sz="1500"/>
+            <a:lvl6pPr marL="7560031" indent="0">
+              <a:buNone/>
+              <a:defRPr sz="6614"/>
             </a:lvl6pPr>
-            <a:lvl7pPr marL="2057400" indent="0">
-              <a:buNone/>
-              <a:defRPr sz="1500"/>
+            <a:lvl7pPr marL="9072037" indent="0">
+              <a:buNone/>
+              <a:defRPr sz="6614"/>
             </a:lvl7pPr>
-            <a:lvl8pPr marL="2400300" indent="0">
-              <a:buNone/>
-              <a:defRPr sz="1500"/>
+            <a:lvl8pPr marL="10584043" indent="0">
+              <a:buNone/>
+              <a:defRPr sz="6614"/>
             </a:lvl8pPr>
-            <a:lvl9pPr marL="2743200" indent="0">
-              <a:buNone/>
-              <a:defRPr sz="1500"/>
+            <a:lvl9pPr marL="12096049" indent="0">
+              <a:buNone/>
+              <a:defRPr sz="6614"/>
             </a:lvl9pPr>
           </a:lstStyle>
           <a:p>
@@ -2315,8 +2560,8 @@
         </p:nvSpPr>
         <p:spPr>
           <a:xfrm>
-            <a:off x="472381" y="3657600"/>
-            <a:ext cx="2211884" cy="6776156"/>
+            <a:off x="2082959" y="12830175"/>
+            <a:ext cx="9753280" cy="23769486"/>
           </a:xfrm>
         </p:spPr>
         <p:txBody>
@@ -2324,39 +2569,39 @@
           <a:lstStyle>
             <a:lvl1pPr marL="0" indent="0">
               <a:buNone/>
-              <a:defRPr sz="1200"/>
+              <a:defRPr sz="5291"/>
             </a:lvl1pPr>
-            <a:lvl2pPr marL="342900" indent="0">
-              <a:buNone/>
-              <a:defRPr sz="1050"/>
+            <a:lvl2pPr marL="1512006" indent="0">
+              <a:buNone/>
+              <a:defRPr sz="4630"/>
             </a:lvl2pPr>
-            <a:lvl3pPr marL="685800" indent="0">
-              <a:buNone/>
-              <a:defRPr sz="900"/>
+            <a:lvl3pPr marL="3024012" indent="0">
+              <a:buNone/>
+              <a:defRPr sz="3969"/>
             </a:lvl3pPr>
-            <a:lvl4pPr marL="1028700" indent="0">
-              <a:buNone/>
-              <a:defRPr sz="750"/>
+            <a:lvl4pPr marL="4536018" indent="0">
+              <a:buNone/>
+              <a:defRPr sz="3307"/>
             </a:lvl4pPr>
-            <a:lvl5pPr marL="1371600" indent="0">
-              <a:buNone/>
-              <a:defRPr sz="750"/>
+            <a:lvl5pPr marL="6048024" indent="0">
+              <a:buNone/>
+              <a:defRPr sz="3307"/>
             </a:lvl5pPr>
-            <a:lvl6pPr marL="1714500" indent="0">
-              <a:buNone/>
-              <a:defRPr sz="750"/>
+            <a:lvl6pPr marL="7560031" indent="0">
+              <a:buNone/>
+              <a:defRPr sz="3307"/>
             </a:lvl6pPr>
-            <a:lvl7pPr marL="2057400" indent="0">
-              <a:buNone/>
-              <a:defRPr sz="750"/>
+            <a:lvl7pPr marL="9072037" indent="0">
+              <a:buNone/>
+              <a:defRPr sz="3307"/>
             </a:lvl7pPr>
-            <a:lvl8pPr marL="2400300" indent="0">
-              <a:buNone/>
-              <a:defRPr sz="750"/>
+            <a:lvl8pPr marL="10584043" indent="0">
+              <a:buNone/>
+              <a:defRPr sz="3307"/>
             </a:lvl8pPr>
-            <a:lvl9pPr marL="2743200" indent="0">
-              <a:buNone/>
-              <a:defRPr sz="750"/>
+            <a:lvl9pPr marL="12096049" indent="0">
+              <a:buNone/>
+              <a:defRPr sz="3307"/>
             </a:lvl9pPr>
           </a:lstStyle>
           <a:p>
@@ -2385,7 +2630,7 @@
           <a:p>
             <a:fld id="{B8089D90-E8EC-433F-8241-FB36479BB3A8}" type="datetimeFigureOut">
               <a:rPr lang="en-NL" smtClean="0"/>
-              <a:t>05/06/2023</a:t>
+              <a:t>22/06/2023</a:t>
             </a:fld>
             <a:endParaRPr lang="en-NL"/>
           </a:p>
@@ -2436,7 +2681,7 @@
     </p:spTree>
     <p:extLst>
       <p:ext uri="{BB962C8B-B14F-4D97-AF65-F5344CB8AC3E}">
-        <p14:creationId xmlns:p14="http://schemas.microsoft.com/office/powerpoint/2010/main" val="1464001684"/>
+        <p14:creationId xmlns:p14="http://schemas.microsoft.com/office/powerpoint/2010/main" val="783370051"/>
       </p:ext>
     </p:extLst>
   </p:cSld>
@@ -2480,8 +2725,8 @@
         </p:nvSpPr>
         <p:spPr>
           <a:xfrm>
-            <a:off x="471488" y="649114"/>
-            <a:ext cx="5915025" cy="2356556"/>
+            <a:off x="2079020" y="2276970"/>
+            <a:ext cx="26082248" cy="8266358"/>
           </a:xfrm>
           <a:prstGeom prst="rect">
             <a:avLst/>
@@ -2513,8 +2758,8 @@
         </p:nvSpPr>
         <p:spPr>
           <a:xfrm>
-            <a:off x="471488" y="3245556"/>
-            <a:ext cx="5915025" cy="7735712"/>
+            <a:off x="2079020" y="11384800"/>
+            <a:ext cx="26082248" cy="27135427"/>
           </a:xfrm>
           <a:prstGeom prst="rect">
             <a:avLst/>
@@ -2575,8 +2820,8 @@
         </p:nvSpPr>
         <p:spPr>
           <a:xfrm>
-            <a:off x="471488" y="11300181"/>
-            <a:ext cx="1543050" cy="649111"/>
+            <a:off x="2079020" y="39638914"/>
+            <a:ext cx="6804065" cy="2276960"/>
           </a:xfrm>
           <a:prstGeom prst="rect">
             <a:avLst/>
@@ -2586,7 +2831,7 @@
           <a:bodyPr vert="horz" lIns="91440" tIns="45720" rIns="91440" bIns="45720" rtlCol="0" anchor="ctr"/>
           <a:lstStyle>
             <a:lvl1pPr algn="l">
-              <a:defRPr sz="900">
+              <a:defRPr sz="3969">
                 <a:solidFill>
                   <a:schemeClr val="tx1">
                     <a:tint val="75000"/>
@@ -2598,7 +2843,7 @@
           <a:p>
             <a:fld id="{B8089D90-E8EC-433F-8241-FB36479BB3A8}" type="datetimeFigureOut">
               <a:rPr lang="en-NL" smtClean="0"/>
-              <a:t>05/06/2023</a:t>
+              <a:t>22/06/2023</a:t>
             </a:fld>
             <a:endParaRPr lang="en-NL"/>
           </a:p>
@@ -2616,8 +2861,8 @@
         </p:nvSpPr>
         <p:spPr>
           <a:xfrm>
-            <a:off x="2271713" y="11300181"/>
-            <a:ext cx="2314575" cy="649111"/>
+            <a:off x="10017096" y="39638914"/>
+            <a:ext cx="10206097" cy="2276960"/>
           </a:xfrm>
           <a:prstGeom prst="rect">
             <a:avLst/>
@@ -2627,7 +2872,7 @@
           <a:bodyPr vert="horz" lIns="91440" tIns="45720" rIns="91440" bIns="45720" rtlCol="0" anchor="ctr"/>
           <a:lstStyle>
             <a:lvl1pPr algn="ctr">
-              <a:defRPr sz="900">
+              <a:defRPr sz="3969">
                 <a:solidFill>
                   <a:schemeClr val="tx1">
                     <a:tint val="75000"/>
@@ -2653,8 +2898,8 @@
         </p:nvSpPr>
         <p:spPr>
           <a:xfrm>
-            <a:off x="4843463" y="11300181"/>
-            <a:ext cx="1543050" cy="649111"/>
+            <a:off x="21357203" y="39638914"/>
+            <a:ext cx="6804065" cy="2276960"/>
           </a:xfrm>
           <a:prstGeom prst="rect">
             <a:avLst/>
@@ -2664,7 +2909,7 @@
           <a:bodyPr vert="horz" lIns="91440" tIns="45720" rIns="91440" bIns="45720" rtlCol="0" anchor="ctr"/>
           <a:lstStyle>
             <a:lvl1pPr algn="r">
-              <a:defRPr sz="900">
+              <a:defRPr sz="3969">
                 <a:solidFill>
                   <a:schemeClr val="tx1">
                     <a:tint val="75000"/>
@@ -2685,27 +2930,27 @@
     </p:spTree>
     <p:extLst>
       <p:ext uri="{BB962C8B-B14F-4D97-AF65-F5344CB8AC3E}">
-        <p14:creationId xmlns:p14="http://schemas.microsoft.com/office/powerpoint/2010/main" val="2672874512"/>
+        <p14:creationId xmlns:p14="http://schemas.microsoft.com/office/powerpoint/2010/main" val="437960786"/>
       </p:ext>
     </p:extLst>
   </p:cSld>
   <p:clrMap bg1="lt1" tx1="dk1" bg2="lt2" tx2="dk2" accent1="accent1" accent2="accent2" accent3="accent3" accent4="accent4" accent5="accent5" accent6="accent6" hlink="hlink" folHlink="folHlink"/>
   <p:sldLayoutIdLst>
-    <p:sldLayoutId id="2147483661" r:id="rId1"/>
-    <p:sldLayoutId id="2147483662" r:id="rId2"/>
-    <p:sldLayoutId id="2147483663" r:id="rId3"/>
-    <p:sldLayoutId id="2147483664" r:id="rId4"/>
-    <p:sldLayoutId id="2147483665" r:id="rId5"/>
-    <p:sldLayoutId id="2147483666" r:id="rId6"/>
-    <p:sldLayoutId id="2147483667" r:id="rId7"/>
-    <p:sldLayoutId id="2147483668" r:id="rId8"/>
-    <p:sldLayoutId id="2147483669" r:id="rId9"/>
-    <p:sldLayoutId id="2147483670" r:id="rId10"/>
-    <p:sldLayoutId id="2147483671" r:id="rId11"/>
+    <p:sldLayoutId id="2147483685" r:id="rId1"/>
+    <p:sldLayoutId id="2147483686" r:id="rId2"/>
+    <p:sldLayoutId id="2147483687" r:id="rId3"/>
+    <p:sldLayoutId id="2147483688" r:id="rId4"/>
+    <p:sldLayoutId id="2147483689" r:id="rId5"/>
+    <p:sldLayoutId id="2147483690" r:id="rId6"/>
+    <p:sldLayoutId id="2147483691" r:id="rId7"/>
+    <p:sldLayoutId id="2147483692" r:id="rId8"/>
+    <p:sldLayoutId id="2147483693" r:id="rId9"/>
+    <p:sldLayoutId id="2147483694" r:id="rId10"/>
+    <p:sldLayoutId id="2147483695" r:id="rId11"/>
   </p:sldLayoutIdLst>
   <p:txStyles>
     <p:titleStyle>
-      <a:lvl1pPr algn="l" defTabSz="685800" rtl="0" eaLnBrk="1" latinLnBrk="0" hangingPunct="1">
+      <a:lvl1pPr algn="l" defTabSz="3024012" rtl="0" eaLnBrk="1" latinLnBrk="0" hangingPunct="1">
         <a:lnSpc>
           <a:spcPct val="90000"/>
         </a:lnSpc>
@@ -2713,7 +2958,7 @@
           <a:spcPct val="0"/>
         </a:spcBef>
         <a:buNone/>
-        <a:defRPr sz="3300" kern="1200">
+        <a:defRPr sz="14551" kern="1200">
           <a:solidFill>
             <a:schemeClr val="tx1"/>
           </a:solidFill>
@@ -2724,16 +2969,16 @@
       </a:lvl1pPr>
     </p:titleStyle>
     <p:bodyStyle>
-      <a:lvl1pPr marL="171450" indent="-171450" algn="l" defTabSz="685800" rtl="0" eaLnBrk="1" latinLnBrk="0" hangingPunct="1">
+      <a:lvl1pPr marL="756003" indent="-756003" algn="l" defTabSz="3024012" rtl="0" eaLnBrk="1" latinLnBrk="0" hangingPunct="1">
         <a:lnSpc>
           <a:spcPct val="90000"/>
         </a:lnSpc>
         <a:spcBef>
-          <a:spcPts val="750"/>
+          <a:spcPts val="3307"/>
         </a:spcBef>
         <a:buFont typeface="Arial" panose="020B0604020202020204" pitchFamily="34" charset="0"/>
         <a:buChar char="•"/>
-        <a:defRPr sz="2100" kern="1200">
+        <a:defRPr sz="9260" kern="1200">
           <a:solidFill>
             <a:schemeClr val="tx1"/>
           </a:solidFill>
@@ -2742,16 +2987,16 @@
           <a:cs typeface="+mn-cs"/>
         </a:defRPr>
       </a:lvl1pPr>
-      <a:lvl2pPr marL="514350" indent="-171450" algn="l" defTabSz="685800" rtl="0" eaLnBrk="1" latinLnBrk="0" hangingPunct="1">
+      <a:lvl2pPr marL="2268009" indent="-756003" algn="l" defTabSz="3024012" rtl="0" eaLnBrk="1" latinLnBrk="0" hangingPunct="1">
         <a:lnSpc>
           <a:spcPct val="90000"/>
         </a:lnSpc>
         <a:spcBef>
-          <a:spcPts val="375"/>
+          <a:spcPts val="1654"/>
         </a:spcBef>
         <a:buFont typeface="Arial" panose="020B0604020202020204" pitchFamily="34" charset="0"/>
         <a:buChar char="•"/>
-        <a:defRPr sz="1800" kern="1200">
+        <a:defRPr sz="7937" kern="1200">
           <a:solidFill>
             <a:schemeClr val="tx1"/>
           </a:solidFill>
@@ -2760,16 +3005,16 @@
           <a:cs typeface="+mn-cs"/>
         </a:defRPr>
       </a:lvl2pPr>
-      <a:lvl3pPr marL="857250" indent="-171450" algn="l" defTabSz="685800" rtl="0" eaLnBrk="1" latinLnBrk="0" hangingPunct="1">
+      <a:lvl3pPr marL="3780015" indent="-756003" algn="l" defTabSz="3024012" rtl="0" eaLnBrk="1" latinLnBrk="0" hangingPunct="1">
         <a:lnSpc>
           <a:spcPct val="90000"/>
         </a:lnSpc>
         <a:spcBef>
-          <a:spcPts val="375"/>
+          <a:spcPts val="1654"/>
         </a:spcBef>
         <a:buFont typeface="Arial" panose="020B0604020202020204" pitchFamily="34" charset="0"/>
         <a:buChar char="•"/>
-        <a:defRPr sz="1500" kern="1200">
+        <a:defRPr sz="6614" kern="1200">
           <a:solidFill>
             <a:schemeClr val="tx1"/>
           </a:solidFill>
@@ -2778,16 +3023,16 @@
           <a:cs typeface="+mn-cs"/>
         </a:defRPr>
       </a:lvl3pPr>
-      <a:lvl4pPr marL="1200150" indent="-171450" algn="l" defTabSz="685800" rtl="0" eaLnBrk="1" latinLnBrk="0" hangingPunct="1">
+      <a:lvl4pPr marL="5292021" indent="-756003" algn="l" defTabSz="3024012" rtl="0" eaLnBrk="1" latinLnBrk="0" hangingPunct="1">
         <a:lnSpc>
           <a:spcPct val="90000"/>
         </a:lnSpc>
         <a:spcBef>
-          <a:spcPts val="375"/>
+          <a:spcPts val="1654"/>
         </a:spcBef>
         <a:buFont typeface="Arial" panose="020B0604020202020204" pitchFamily="34" charset="0"/>
         <a:buChar char="•"/>
-        <a:defRPr sz="1350" kern="1200">
+        <a:defRPr sz="5953" kern="1200">
           <a:solidFill>
             <a:schemeClr val="tx1"/>
           </a:solidFill>
@@ -2796,16 +3041,16 @@
           <a:cs typeface="+mn-cs"/>
         </a:defRPr>
       </a:lvl4pPr>
-      <a:lvl5pPr marL="1543050" indent="-171450" algn="l" defTabSz="685800" rtl="0" eaLnBrk="1" latinLnBrk="0" hangingPunct="1">
+      <a:lvl5pPr marL="6804028" indent="-756003" algn="l" defTabSz="3024012" rtl="0" eaLnBrk="1" latinLnBrk="0" hangingPunct="1">
         <a:lnSpc>
           <a:spcPct val="90000"/>
         </a:lnSpc>
         <a:spcBef>
-          <a:spcPts val="375"/>
+          <a:spcPts val="1654"/>
         </a:spcBef>
         <a:buFont typeface="Arial" panose="020B0604020202020204" pitchFamily="34" charset="0"/>
         <a:buChar char="•"/>
-        <a:defRPr sz="1350" kern="1200">
+        <a:defRPr sz="5953" kern="1200">
           <a:solidFill>
             <a:schemeClr val="tx1"/>
           </a:solidFill>
@@ -2814,16 +3059,16 @@
           <a:cs typeface="+mn-cs"/>
         </a:defRPr>
       </a:lvl5pPr>
-      <a:lvl6pPr marL="1885950" indent="-171450" algn="l" defTabSz="685800" rtl="0" eaLnBrk="1" latinLnBrk="0" hangingPunct="1">
+      <a:lvl6pPr marL="8316034" indent="-756003" algn="l" defTabSz="3024012" rtl="0" eaLnBrk="1" latinLnBrk="0" hangingPunct="1">
         <a:lnSpc>
           <a:spcPct val="90000"/>
         </a:lnSpc>
         <a:spcBef>
-          <a:spcPts val="375"/>
+          <a:spcPts val="1654"/>
         </a:spcBef>
         <a:buFont typeface="Arial" panose="020B0604020202020204" pitchFamily="34" charset="0"/>
         <a:buChar char="•"/>
-        <a:defRPr sz="1350" kern="1200">
+        <a:defRPr sz="5953" kern="1200">
           <a:solidFill>
             <a:schemeClr val="tx1"/>
           </a:solidFill>
@@ -2832,16 +3077,16 @@
           <a:cs typeface="+mn-cs"/>
         </a:defRPr>
       </a:lvl6pPr>
-      <a:lvl7pPr marL="2228850" indent="-171450" algn="l" defTabSz="685800" rtl="0" eaLnBrk="1" latinLnBrk="0" hangingPunct="1">
+      <a:lvl7pPr marL="9828040" indent="-756003" algn="l" defTabSz="3024012" rtl="0" eaLnBrk="1" latinLnBrk="0" hangingPunct="1">
         <a:lnSpc>
           <a:spcPct val="90000"/>
         </a:lnSpc>
         <a:spcBef>
-          <a:spcPts val="375"/>
+          <a:spcPts val="1654"/>
         </a:spcBef>
         <a:buFont typeface="Arial" panose="020B0604020202020204" pitchFamily="34" charset="0"/>
         <a:buChar char="•"/>
-        <a:defRPr sz="1350" kern="1200">
+        <a:defRPr sz="5953" kern="1200">
           <a:solidFill>
             <a:schemeClr val="tx1"/>
           </a:solidFill>
@@ -2850,16 +3095,16 @@
           <a:cs typeface="+mn-cs"/>
         </a:defRPr>
       </a:lvl7pPr>
-      <a:lvl8pPr marL="2571750" indent="-171450" algn="l" defTabSz="685800" rtl="0" eaLnBrk="1" latinLnBrk="0" hangingPunct="1">
+      <a:lvl8pPr marL="11340046" indent="-756003" algn="l" defTabSz="3024012" rtl="0" eaLnBrk="1" latinLnBrk="0" hangingPunct="1">
         <a:lnSpc>
           <a:spcPct val="90000"/>
         </a:lnSpc>
         <a:spcBef>
-          <a:spcPts val="375"/>
+          <a:spcPts val="1654"/>
         </a:spcBef>
         <a:buFont typeface="Arial" panose="020B0604020202020204" pitchFamily="34" charset="0"/>
         <a:buChar char="•"/>
-        <a:defRPr sz="1350" kern="1200">
+        <a:defRPr sz="5953" kern="1200">
           <a:solidFill>
             <a:schemeClr val="tx1"/>
           </a:solidFill>
@@ -2868,16 +3113,16 @@
           <a:cs typeface="+mn-cs"/>
         </a:defRPr>
       </a:lvl8pPr>
-      <a:lvl9pPr marL="2914650" indent="-171450" algn="l" defTabSz="685800" rtl="0" eaLnBrk="1" latinLnBrk="0" hangingPunct="1">
+      <a:lvl9pPr marL="12852052" indent="-756003" algn="l" defTabSz="3024012" rtl="0" eaLnBrk="1" latinLnBrk="0" hangingPunct="1">
         <a:lnSpc>
           <a:spcPct val="90000"/>
         </a:lnSpc>
         <a:spcBef>
-          <a:spcPts val="375"/>
+          <a:spcPts val="1654"/>
         </a:spcBef>
         <a:buFont typeface="Arial" panose="020B0604020202020204" pitchFamily="34" charset="0"/>
         <a:buChar char="•"/>
-        <a:defRPr sz="1350" kern="1200">
+        <a:defRPr sz="5953" kern="1200">
           <a:solidFill>
             <a:schemeClr val="tx1"/>
           </a:solidFill>
@@ -2891,8 +3136,8 @@
       <a:defPPr>
         <a:defRPr lang="en-US"/>
       </a:defPPr>
-      <a:lvl1pPr marL="0" algn="l" defTabSz="685800" rtl="0" eaLnBrk="1" latinLnBrk="0" hangingPunct="1">
-        <a:defRPr sz="1350" kern="1200">
+      <a:lvl1pPr marL="0" algn="l" defTabSz="3024012" rtl="0" eaLnBrk="1" latinLnBrk="0" hangingPunct="1">
+        <a:defRPr sz="5953" kern="1200">
           <a:solidFill>
             <a:schemeClr val="tx1"/>
           </a:solidFill>
@@ -2901,8 +3146,8 @@
           <a:cs typeface="+mn-cs"/>
         </a:defRPr>
       </a:lvl1pPr>
-      <a:lvl2pPr marL="342900" algn="l" defTabSz="685800" rtl="0" eaLnBrk="1" latinLnBrk="0" hangingPunct="1">
-        <a:defRPr sz="1350" kern="1200">
+      <a:lvl2pPr marL="1512006" algn="l" defTabSz="3024012" rtl="0" eaLnBrk="1" latinLnBrk="0" hangingPunct="1">
+        <a:defRPr sz="5953" kern="1200">
           <a:solidFill>
             <a:schemeClr val="tx1"/>
           </a:solidFill>
@@ -2911,8 +3156,8 @@
           <a:cs typeface="+mn-cs"/>
         </a:defRPr>
       </a:lvl2pPr>
-      <a:lvl3pPr marL="685800" algn="l" defTabSz="685800" rtl="0" eaLnBrk="1" latinLnBrk="0" hangingPunct="1">
-        <a:defRPr sz="1350" kern="1200">
+      <a:lvl3pPr marL="3024012" algn="l" defTabSz="3024012" rtl="0" eaLnBrk="1" latinLnBrk="0" hangingPunct="1">
+        <a:defRPr sz="5953" kern="1200">
           <a:solidFill>
             <a:schemeClr val="tx1"/>
           </a:solidFill>
@@ -2921,8 +3166,8 @@
           <a:cs typeface="+mn-cs"/>
         </a:defRPr>
       </a:lvl3pPr>
-      <a:lvl4pPr marL="1028700" algn="l" defTabSz="685800" rtl="0" eaLnBrk="1" latinLnBrk="0" hangingPunct="1">
-        <a:defRPr sz="1350" kern="1200">
+      <a:lvl4pPr marL="4536018" algn="l" defTabSz="3024012" rtl="0" eaLnBrk="1" latinLnBrk="0" hangingPunct="1">
+        <a:defRPr sz="5953" kern="1200">
           <a:solidFill>
             <a:schemeClr val="tx1"/>
           </a:solidFill>
@@ -2931,8 +3176,8 @@
           <a:cs typeface="+mn-cs"/>
         </a:defRPr>
       </a:lvl4pPr>
-      <a:lvl5pPr marL="1371600" algn="l" defTabSz="685800" rtl="0" eaLnBrk="1" latinLnBrk="0" hangingPunct="1">
-        <a:defRPr sz="1350" kern="1200">
+      <a:lvl5pPr marL="6048024" algn="l" defTabSz="3024012" rtl="0" eaLnBrk="1" latinLnBrk="0" hangingPunct="1">
+        <a:defRPr sz="5953" kern="1200">
           <a:solidFill>
             <a:schemeClr val="tx1"/>
           </a:solidFill>
@@ -2941,8 +3186,8 @@
           <a:cs typeface="+mn-cs"/>
         </a:defRPr>
       </a:lvl5pPr>
-      <a:lvl6pPr marL="1714500" algn="l" defTabSz="685800" rtl="0" eaLnBrk="1" latinLnBrk="0" hangingPunct="1">
-        <a:defRPr sz="1350" kern="1200">
+      <a:lvl6pPr marL="7560031" algn="l" defTabSz="3024012" rtl="0" eaLnBrk="1" latinLnBrk="0" hangingPunct="1">
+        <a:defRPr sz="5953" kern="1200">
           <a:solidFill>
             <a:schemeClr val="tx1"/>
           </a:solidFill>
@@ -2951,8 +3196,8 @@
           <a:cs typeface="+mn-cs"/>
         </a:defRPr>
       </a:lvl6pPr>
-      <a:lvl7pPr marL="2057400" algn="l" defTabSz="685800" rtl="0" eaLnBrk="1" latinLnBrk="0" hangingPunct="1">
-        <a:defRPr sz="1350" kern="1200">
+      <a:lvl7pPr marL="9072037" algn="l" defTabSz="3024012" rtl="0" eaLnBrk="1" latinLnBrk="0" hangingPunct="1">
+        <a:defRPr sz="5953" kern="1200">
           <a:solidFill>
             <a:schemeClr val="tx1"/>
           </a:solidFill>
@@ -2961,8 +3206,8 @@
           <a:cs typeface="+mn-cs"/>
         </a:defRPr>
       </a:lvl7pPr>
-      <a:lvl8pPr marL="2400300" algn="l" defTabSz="685800" rtl="0" eaLnBrk="1" latinLnBrk="0" hangingPunct="1">
-        <a:defRPr sz="1350" kern="1200">
+      <a:lvl8pPr marL="10584043" algn="l" defTabSz="3024012" rtl="0" eaLnBrk="1" latinLnBrk="0" hangingPunct="1">
+        <a:defRPr sz="5953" kern="1200">
           <a:solidFill>
             <a:schemeClr val="tx1"/>
           </a:solidFill>
@@ -2971,8 +3216,8 @@
           <a:cs typeface="+mn-cs"/>
         </a:defRPr>
       </a:lvl8pPr>
-      <a:lvl9pPr marL="2743200" algn="l" defTabSz="685800" rtl="0" eaLnBrk="1" latinLnBrk="0" hangingPunct="1">
-        <a:defRPr sz="1350" kern="1200">
+      <a:lvl9pPr marL="12096049" algn="l" defTabSz="3024012" rtl="0" eaLnBrk="1" latinLnBrk="0" hangingPunct="1">
+        <a:defRPr sz="5953" kern="1200">
           <a:solidFill>
             <a:schemeClr val="tx1"/>
           </a:solidFill>
@@ -2989,6 +3234,47 @@
 <file path=ppt/slides/slide1.xml><?xml version="1.0" encoding="utf-8"?>
 <p:sld xmlns:a="http://schemas.openxmlformats.org/drawingml/2006/main" xmlns:r="http://schemas.openxmlformats.org/officeDocument/2006/relationships" xmlns:p="http://schemas.openxmlformats.org/presentationml/2006/main">
   <p:cSld>
+    <p:bg>
+      <p:bgPr>
+        <a:gradFill flip="none" rotWithShape="1">
+          <a:gsLst>
+            <a:gs pos="0">
+              <a:schemeClr val="accent1">
+                <a:lumMod val="5000"/>
+                <a:lumOff val="95000"/>
+              </a:schemeClr>
+            </a:gs>
+            <a:gs pos="15000">
+              <a:schemeClr val="bg1"/>
+            </a:gs>
+            <a:gs pos="33000">
+              <a:srgbClr val="FFC000"/>
+            </a:gs>
+            <a:gs pos="40000">
+              <a:schemeClr val="bg1"/>
+            </a:gs>
+            <a:gs pos="63000">
+              <a:schemeClr val="bg1"/>
+            </a:gs>
+            <a:gs pos="55000">
+              <a:srgbClr val="FF0000">
+                <a:alpha val="30000"/>
+              </a:srgbClr>
+            </a:gs>
+            <a:gs pos="75000">
+              <a:srgbClr val="FF0000">
+                <a:alpha val="26000"/>
+              </a:srgbClr>
+            </a:gs>
+          </a:gsLst>
+          <a:path path="circle">
+            <a:fillToRect l="100000" t="100000"/>
+          </a:path>
+          <a:tileRect r="-100000" b="-100000"/>
+        </a:gradFill>
+        <a:effectLst/>
+      </p:bgPr>
+    </p:bg>
     <p:spTree>
       <p:nvGrpSpPr>
         <p:cNvPr id="1" name=""/>
@@ -3019,44 +3305,499 @@
             <p:ph type="ctrTitle"/>
           </p:nvPr>
         </p:nvSpPr>
-        <p:spPr/>
-        <p:txBody>
-          <a:bodyPr/>
-          <a:lstStyle/>
-          <a:p>
-            <a:r>
-              <a:rPr lang="en-US"/>
-              <a:t>Test</a:t>
-            </a:r>
-            <a:endParaRPr lang="en-NL"/>
-          </a:p>
-        </p:txBody>
-      </p:sp>
-      <p:sp>
-        <p:nvSpPr>
-          <p:cNvPr id="3" name="Subtitle 2">
+        <p:spPr>
+          <a:xfrm>
+            <a:off x="2268020" y="-15176"/>
+            <a:ext cx="25704245" cy="2979845"/>
+          </a:xfrm>
+        </p:spPr>
+        <p:txBody>
+          <a:bodyPr/>
+          <a:lstStyle/>
+          <a:p>
+            <a:r>
+              <a:rPr lang="en-US" dirty="0"/>
+              <a:t>Optical Feedback</a:t>
+            </a:r>
+            <a:endParaRPr lang="en-NL" dirty="0"/>
+          </a:p>
+        </p:txBody>
+      </p:sp>
+      <p:sp>
+        <p:nvSpPr>
+          <p:cNvPr id="17" name="TextBox 16">
             <a:extLst>
               <a:ext uri="{FF2B5EF4-FFF2-40B4-BE49-F238E27FC236}">
-                <a16:creationId xmlns:a16="http://schemas.microsoft.com/office/drawing/2014/main" id="{190A6092-651D-38CE-CB24-1F58314C8B41}"/>
+                <a16:creationId xmlns:a16="http://schemas.microsoft.com/office/drawing/2014/main" id="{0E29FBC8-C102-7BAF-D6A6-070BDC02B058}"/>
               </a:ext>
             </a:extLst>
           </p:cNvPr>
-          <p:cNvSpPr>
-            <a:spLocks noGrp="1"/>
-          </p:cNvSpPr>
-          <p:nvPr>
-            <p:ph type="subTitle" idx="1"/>
-          </p:nvPr>
-        </p:nvSpPr>
-        <p:spPr/>
-        <p:txBody>
-          <a:bodyPr/>
-          <a:lstStyle/>
-          <a:p>
-            <a:endParaRPr lang="en-NL"/>
-          </a:p>
-        </p:txBody>
-      </p:sp>
+          <p:cNvSpPr txBox="1"/>
+          <p:nvPr/>
+        </p:nvSpPr>
+        <p:spPr>
+          <a:xfrm>
+            <a:off x="19382551" y="9088788"/>
+            <a:ext cx="6852045" cy="5632311"/>
+          </a:xfrm>
+          <a:prstGeom prst="rect">
+            <a:avLst/>
+          </a:prstGeom>
+          <a:noFill/>
+        </p:spPr>
+        <p:txBody>
+          <a:bodyPr wrap="square" rtlCol="0">
+            <a:spAutoFit/>
+          </a:bodyPr>
+          <a:lstStyle/>
+          <a:p>
+            <a:r>
+              <a:rPr lang="en-GB" sz="4000" b="0" i="0" u="none" strike="noStrike" dirty="0">
+                <a:solidFill>
+                  <a:srgbClr val="000000"/>
+                </a:solidFill>
+                <a:effectLst/>
+                <a:latin typeface="Arial" panose="020B0604020202020204" pitchFamily="34" charset="0"/>
+              </a:rPr>
+              <a:t>A diode laser emits light by sending electrons through a semiconductor-type material. This material lets excited electrons deexcite through an energy gap making them emit light with the wavelength of the energy that’s around or higher than the energy gap.</a:t>
+            </a:r>
+            <a:endParaRPr lang="en-NL" sz="4000" dirty="0"/>
+          </a:p>
+        </p:txBody>
+      </p:sp>
+      <p:pic>
+        <p:nvPicPr>
+          <p:cNvPr id="23" name="Graphic 22">
+            <a:extLst>
+              <a:ext uri="{FF2B5EF4-FFF2-40B4-BE49-F238E27FC236}">
+                <a16:creationId xmlns:a16="http://schemas.microsoft.com/office/drawing/2014/main" id="{098999BF-B894-6B99-397A-E1BB84087883}"/>
+              </a:ext>
+            </a:extLst>
+          </p:cNvPr>
+          <p:cNvPicPr>
+            <a:picLocks noChangeAspect="1"/>
+          </p:cNvPicPr>
+          <p:nvPr/>
+        </p:nvPicPr>
+        <p:blipFill>
+          <a:blip r:embed="rId2">
+            <a:extLst>
+              <a:ext uri="{28A0092B-C50C-407E-A947-70E740481C1C}">
+                <a14:useLocalDpi xmlns:a14="http://schemas.microsoft.com/office/drawing/2010/main" val="0"/>
+              </a:ext>
+              <a:ext uri="{96DAC541-7B7A-43D3-8B79-37D633B846F1}">
+                <asvg:svgBlip xmlns:asvg="http://schemas.microsoft.com/office/drawing/2016/SVG/main" r:embed="rId3"/>
+              </a:ext>
+            </a:extLst>
+          </a:blip>
+          <a:stretch>
+            <a:fillRect/>
+          </a:stretch>
+        </p:blipFill>
+        <p:spPr>
+          <a:xfrm>
+            <a:off x="15821054" y="15538414"/>
+            <a:ext cx="15747722" cy="9947434"/>
+          </a:xfrm>
+          <a:prstGeom prst="rect">
+            <a:avLst/>
+          </a:prstGeom>
+        </p:spPr>
+      </p:pic>
+      <p:grpSp>
+        <p:nvGrpSpPr>
+          <p:cNvPr id="9" name="Group 8">
+            <a:extLst>
+              <a:ext uri="{FF2B5EF4-FFF2-40B4-BE49-F238E27FC236}">
+                <a16:creationId xmlns:a16="http://schemas.microsoft.com/office/drawing/2014/main" id="{68AD6912-FAB8-B18A-A1F9-FCE5A088D56B}"/>
+              </a:ext>
+            </a:extLst>
+          </p:cNvPr>
+          <p:cNvGrpSpPr/>
+          <p:nvPr/>
+        </p:nvGrpSpPr>
+        <p:grpSpPr>
+          <a:xfrm>
+            <a:off x="495299" y="13903784"/>
+            <a:ext cx="14624844" cy="10882642"/>
+            <a:chOff x="-107792" y="23197808"/>
+            <a:chExt cx="14624844" cy="10882642"/>
+          </a:xfrm>
+        </p:grpSpPr>
+        <p:sp>
+          <p:nvSpPr>
+            <p:cNvPr id="6" name="Rectangle: Rounded Corners 5">
+              <a:extLst>
+                <a:ext uri="{FF2B5EF4-FFF2-40B4-BE49-F238E27FC236}">
+                  <a16:creationId xmlns:a16="http://schemas.microsoft.com/office/drawing/2014/main" id="{AAE5DBEA-BF18-E3D2-6A0A-B7D3DDDC6955}"/>
+                </a:ext>
+              </a:extLst>
+            </p:cNvPr>
+            <p:cNvSpPr/>
+            <p:nvPr/>
+          </p:nvSpPr>
+          <p:spPr>
+            <a:xfrm>
+              <a:off x="-107792" y="24003000"/>
+              <a:ext cx="14624844" cy="10077450"/>
+            </a:xfrm>
+            <a:prstGeom prst="roundRect">
+              <a:avLst>
+                <a:gd name="adj" fmla="val 3203"/>
+              </a:avLst>
+            </a:prstGeom>
+            <a:solidFill>
+              <a:schemeClr val="bg1"/>
+            </a:solidFill>
+            <a:ln w="76200">
+              <a:solidFill>
+                <a:schemeClr val="tx1"/>
+              </a:solidFill>
+            </a:ln>
+          </p:spPr>
+          <p:style>
+            <a:lnRef idx="2">
+              <a:schemeClr val="accent1">
+                <a:shade val="50000"/>
+              </a:schemeClr>
+            </a:lnRef>
+            <a:fillRef idx="1">
+              <a:schemeClr val="accent1"/>
+            </a:fillRef>
+            <a:effectRef idx="0">
+              <a:schemeClr val="accent1"/>
+            </a:effectRef>
+            <a:fontRef idx="minor">
+              <a:schemeClr val="lt1"/>
+            </a:fontRef>
+          </p:style>
+          <p:txBody>
+            <a:bodyPr rtlCol="0" anchor="ctr"/>
+            <a:lstStyle/>
+            <a:p>
+              <a:pPr algn="ctr"/>
+              <a:endParaRPr lang="en-NL" dirty="0"/>
+            </a:p>
+          </p:txBody>
+        </p:sp>
+        <p:sp>
+          <p:nvSpPr>
+            <p:cNvPr id="8" name="Rectangle: Top Corners Rounded 7">
+              <a:extLst>
+                <a:ext uri="{FF2B5EF4-FFF2-40B4-BE49-F238E27FC236}">
+                  <a16:creationId xmlns:a16="http://schemas.microsoft.com/office/drawing/2014/main" id="{F776A035-17DF-D142-9847-265199F0CBDB}"/>
+                </a:ext>
+              </a:extLst>
+            </p:cNvPr>
+            <p:cNvSpPr/>
+            <p:nvPr/>
+          </p:nvSpPr>
+          <p:spPr>
+            <a:xfrm>
+              <a:off x="4349909" y="23197808"/>
+              <a:ext cx="5638800" cy="1634630"/>
+            </a:xfrm>
+            <a:prstGeom prst="round2SameRect">
+              <a:avLst/>
+            </a:prstGeom>
+            <a:solidFill>
+              <a:schemeClr val="bg1"/>
+            </a:solidFill>
+            <a:ln w="76200">
+              <a:solidFill>
+                <a:schemeClr val="tx1"/>
+              </a:solidFill>
+            </a:ln>
+          </p:spPr>
+          <p:style>
+            <a:lnRef idx="2">
+              <a:schemeClr val="accent1">
+                <a:shade val="50000"/>
+              </a:schemeClr>
+            </a:lnRef>
+            <a:fillRef idx="1">
+              <a:schemeClr val="accent1"/>
+            </a:fillRef>
+            <a:effectRef idx="0">
+              <a:schemeClr val="accent1"/>
+            </a:effectRef>
+            <a:fontRef idx="minor">
+              <a:schemeClr val="lt1"/>
+            </a:fontRef>
+          </p:style>
+          <p:txBody>
+            <a:bodyPr rtlCol="0" anchor="ctr"/>
+            <a:lstStyle/>
+            <a:p>
+              <a:pPr algn="ctr"/>
+              <a:r>
+                <a:rPr lang="en-US" sz="13800" dirty="0">
+                  <a:solidFill>
+                    <a:schemeClr val="tx1"/>
+                  </a:solidFill>
+                </a:rPr>
+                <a:t>Setup</a:t>
+              </a:r>
+              <a:endParaRPr lang="en-NL" sz="13800" dirty="0">
+                <a:solidFill>
+                  <a:schemeClr val="tx1"/>
+                </a:solidFill>
+              </a:endParaRPr>
+            </a:p>
+          </p:txBody>
+        </p:sp>
+      </p:grpSp>
+      <p:sp>
+        <p:nvSpPr>
+          <p:cNvPr id="11" name="TextBox 10">
+            <a:extLst>
+              <a:ext uri="{FF2B5EF4-FFF2-40B4-BE49-F238E27FC236}">
+                <a16:creationId xmlns:a16="http://schemas.microsoft.com/office/drawing/2014/main" id="{82B0777B-A2FF-B860-C5E1-B1EF9ADF1C0A}"/>
+              </a:ext>
+            </a:extLst>
+          </p:cNvPr>
+          <p:cNvSpPr txBox="1"/>
+          <p:nvPr/>
+        </p:nvSpPr>
+        <p:spPr>
+          <a:xfrm>
+            <a:off x="1799303" y="20765729"/>
+            <a:ext cx="12211665" cy="707886"/>
+          </a:xfrm>
+          <a:prstGeom prst="rect">
+            <a:avLst/>
+          </a:prstGeom>
+          <a:noFill/>
+        </p:spPr>
+        <p:txBody>
+          <a:bodyPr wrap="square" rtlCol="0">
+            <a:spAutoFit/>
+          </a:bodyPr>
+          <a:lstStyle/>
+          <a:p>
+            <a:r>
+              <a:rPr lang="en-US" sz="4000" dirty="0"/>
+              <a:t>The setup that was used for the experiments</a:t>
+            </a:r>
+            <a:endParaRPr lang="en-NL" sz="4000" dirty="0"/>
+          </a:p>
+        </p:txBody>
+      </p:sp>
+      <p:grpSp>
+        <p:nvGrpSpPr>
+          <p:cNvPr id="20" name="Group 19">
+            <a:extLst>
+              <a:ext uri="{FF2B5EF4-FFF2-40B4-BE49-F238E27FC236}">
+                <a16:creationId xmlns:a16="http://schemas.microsoft.com/office/drawing/2014/main" id="{F08EB73A-5D5A-6A3A-A58D-38D1E096981C}"/>
+              </a:ext>
+            </a:extLst>
+          </p:cNvPr>
+          <p:cNvGrpSpPr/>
+          <p:nvPr/>
+        </p:nvGrpSpPr>
+        <p:grpSpPr>
+          <a:xfrm>
+            <a:off x="495299" y="4876522"/>
+            <a:ext cx="14624844" cy="6345302"/>
+            <a:chOff x="495299" y="4876522"/>
+            <a:chExt cx="14624844" cy="6345302"/>
+          </a:xfrm>
+        </p:grpSpPr>
+        <p:grpSp>
+          <p:nvGrpSpPr>
+            <p:cNvPr id="12" name="Group 11">
+              <a:extLst>
+                <a:ext uri="{FF2B5EF4-FFF2-40B4-BE49-F238E27FC236}">
+                  <a16:creationId xmlns:a16="http://schemas.microsoft.com/office/drawing/2014/main" id="{D421EDB0-3306-2B0D-25E8-4E2425BB85EF}"/>
+                </a:ext>
+              </a:extLst>
+            </p:cNvPr>
+            <p:cNvGrpSpPr/>
+            <p:nvPr/>
+          </p:nvGrpSpPr>
+          <p:grpSpPr>
+            <a:xfrm>
+              <a:off x="495299" y="4876522"/>
+              <a:ext cx="14624844" cy="6306312"/>
+              <a:chOff x="-107792" y="23197808"/>
+              <a:chExt cx="14624844" cy="6306312"/>
+            </a:xfrm>
+          </p:grpSpPr>
+          <p:sp>
+            <p:nvSpPr>
+              <p:cNvPr id="15" name="Rectangle: Rounded Corners 14">
+                <a:extLst>
+                  <a:ext uri="{FF2B5EF4-FFF2-40B4-BE49-F238E27FC236}">
+                    <a16:creationId xmlns:a16="http://schemas.microsoft.com/office/drawing/2014/main" id="{A532EE8C-4283-E6F8-5C11-D477855E5280}"/>
+                  </a:ext>
+                </a:extLst>
+              </p:cNvPr>
+              <p:cNvSpPr/>
+              <p:nvPr/>
+            </p:nvSpPr>
+            <p:spPr>
+              <a:xfrm>
+                <a:off x="-107792" y="24461570"/>
+                <a:ext cx="14624844" cy="5042550"/>
+              </a:xfrm>
+              <a:prstGeom prst="roundRect">
+                <a:avLst>
+                  <a:gd name="adj" fmla="val 6138"/>
+                </a:avLst>
+              </a:prstGeom>
+              <a:solidFill>
+                <a:schemeClr val="bg1"/>
+              </a:solidFill>
+              <a:ln w="76200">
+                <a:solidFill>
+                  <a:schemeClr val="tx1"/>
+                </a:solidFill>
+              </a:ln>
+            </p:spPr>
+            <p:style>
+              <a:lnRef idx="2">
+                <a:schemeClr val="accent1">
+                  <a:shade val="50000"/>
+                </a:schemeClr>
+              </a:lnRef>
+              <a:fillRef idx="1">
+                <a:schemeClr val="accent1"/>
+              </a:fillRef>
+              <a:effectRef idx="0">
+                <a:schemeClr val="accent1"/>
+              </a:effectRef>
+              <a:fontRef idx="minor">
+                <a:schemeClr val="lt1"/>
+              </a:fontRef>
+            </p:style>
+            <p:txBody>
+              <a:bodyPr rtlCol="0" anchor="ctr"/>
+              <a:lstStyle/>
+              <a:p>
+                <a:pPr algn="just"/>
+                <a:endParaRPr lang="en-NL" sz="4400" dirty="0">
+                  <a:solidFill>
+                    <a:schemeClr val="tx1"/>
+                  </a:solidFill>
+                </a:endParaRPr>
+              </a:p>
+            </p:txBody>
+          </p:sp>
+          <p:sp>
+            <p:nvSpPr>
+              <p:cNvPr id="14" name="Rectangle: Top Corners Rounded 13">
+                <a:extLst>
+                  <a:ext uri="{FF2B5EF4-FFF2-40B4-BE49-F238E27FC236}">
+                    <a16:creationId xmlns:a16="http://schemas.microsoft.com/office/drawing/2014/main" id="{73B8A3AB-D86D-F61D-6ACE-55657C174108}"/>
+                  </a:ext>
+                </a:extLst>
+              </p:cNvPr>
+              <p:cNvSpPr/>
+              <p:nvPr/>
+            </p:nvSpPr>
+            <p:spPr>
+              <a:xfrm>
+                <a:off x="1664930" y="23197808"/>
+                <a:ext cx="11064521" cy="1634630"/>
+              </a:xfrm>
+              <a:prstGeom prst="round2SameRect">
+                <a:avLst/>
+              </a:prstGeom>
+              <a:solidFill>
+                <a:schemeClr val="bg1"/>
+              </a:solidFill>
+              <a:ln w="76200">
+                <a:solidFill>
+                  <a:schemeClr val="tx1"/>
+                </a:solidFill>
+              </a:ln>
+            </p:spPr>
+            <p:style>
+              <a:lnRef idx="2">
+                <a:schemeClr val="accent1">
+                  <a:shade val="50000"/>
+                </a:schemeClr>
+              </a:lnRef>
+              <a:fillRef idx="1">
+                <a:schemeClr val="accent1"/>
+              </a:fillRef>
+              <a:effectRef idx="0">
+                <a:schemeClr val="accent1"/>
+              </a:effectRef>
+              <a:fontRef idx="minor">
+                <a:schemeClr val="lt1"/>
+              </a:fontRef>
+            </p:style>
+            <p:txBody>
+              <a:bodyPr rtlCol="0" anchor="ctr"/>
+              <a:lstStyle/>
+              <a:p>
+                <a:pPr algn="ctr"/>
+                <a:r>
+                  <a:rPr lang="en-US" sz="13800" dirty="0">
+                    <a:solidFill>
+                      <a:schemeClr val="tx1"/>
+                    </a:solidFill>
+                  </a:rPr>
+                  <a:t>Introduction</a:t>
+                </a:r>
+                <a:endParaRPr lang="en-NL" sz="13800" dirty="0">
+                  <a:solidFill>
+                    <a:schemeClr val="tx1"/>
+                  </a:solidFill>
+                </a:endParaRPr>
+              </a:p>
+            </p:txBody>
+          </p:sp>
+        </p:grpSp>
+        <p:sp>
+          <p:nvSpPr>
+            <p:cNvPr id="19" name="TextBox 18">
+              <a:extLst>
+                <a:ext uri="{FF2B5EF4-FFF2-40B4-BE49-F238E27FC236}">
+                  <a16:creationId xmlns:a16="http://schemas.microsoft.com/office/drawing/2014/main" id="{5EA47C9F-0453-69C3-157F-6AB057DA5D76}"/>
+                </a:ext>
+              </a:extLst>
+            </p:cNvPr>
+            <p:cNvSpPr txBox="1"/>
+            <p:nvPr/>
+          </p:nvSpPr>
+          <p:spPr>
+            <a:xfrm>
+              <a:off x="690592" y="6820619"/>
+              <a:ext cx="14234258" cy="4401205"/>
+            </a:xfrm>
+            <a:prstGeom prst="rect">
+              <a:avLst/>
+            </a:prstGeom>
+            <a:noFill/>
+          </p:spPr>
+          <p:txBody>
+            <a:bodyPr wrap="square" rtlCol="0">
+              <a:spAutoFit/>
+            </a:bodyPr>
+            <a:lstStyle/>
+            <a:p>
+              <a:pPr algn="just"/>
+              <a:r>
+                <a:rPr lang="en-GB" sz="4000" b="0" i="0" u="none" strike="noStrike" dirty="0">
+                  <a:solidFill>
+                    <a:srgbClr val="000000"/>
+                  </a:solidFill>
+                  <a:effectLst/>
+                  <a:latin typeface="Arial" panose="020B0604020202020204" pitchFamily="34" charset="0"/>
+                </a:rPr>
+                <a:t>For this project we built our own external cavity diode laser (ECDL) and Czerny-Turner Spectrometer, to measure the effects that optical feedback has on the output of a diode laser. The output of the ECDL was used as an input for the spectrometer, which visualized our results using an oscilloscope and a CCD we programmed.</a:t>
+              </a:r>
+              <a:endParaRPr lang="en-NL" sz="4000" dirty="0"/>
+            </a:p>
+            <a:p>
+              <a:pPr algn="just"/>
+              <a:endParaRPr lang="en-NL" sz="4000" dirty="0"/>
+            </a:p>
+          </p:txBody>
+        </p:sp>
+      </p:grpSp>
     </p:spTree>
     <p:extLst>
       <p:ext uri="{BB962C8B-B14F-4D97-AF65-F5344CB8AC3E}">

</xml_diff>

<commit_message>
Very rough version of poster
</commit_message>
<xml_diff>
--- a/Poster/Poster.pptx
+++ b/Poster/Poster.pptx
@@ -115,7 +115,7 @@
 <file path=ppt/revisionInfo.xml><?xml version="1.0" encoding="utf-8"?>
 <p1510:revInfo xmlns:a="http://schemas.openxmlformats.org/drawingml/2006/main" xmlns:r="http://schemas.openxmlformats.org/officeDocument/2006/relationships" xmlns:p1510="http://schemas.microsoft.com/office/powerpoint/2015/10/main">
   <p1510:revLst>
-    <p1510:client id="{5F09D76C-1841-4F58-94B1-5AE3681891B6}" v="386" dt="2023-06-22T09:37:19.801"/>
+    <p1510:client id="{5F09D76C-1841-4F58-94B1-5AE3681891B6}" v="882" dt="2023-06-22T11:00:25.590"/>
   </p1510:revLst>
 </p1510:revInfo>
 </file>
@@ -149,12 +149,12 @@
   <pc:docChgLst>
     <pc:chgData name="Emils Zegers" userId="bd5cf22c-0e97-44c0-acad-9bc9915da531" providerId="ADAL" clId="{5F09D76C-1841-4F58-94B1-5AE3681891B6}"/>
     <pc:docChg chg="undo custSel modSld">
-      <pc:chgData name="Emils Zegers" userId="bd5cf22c-0e97-44c0-acad-9bc9915da531" providerId="ADAL" clId="{5F09D76C-1841-4F58-94B1-5AE3681891B6}" dt="2023-06-22T10:11:17.751" v="829" actId="478"/>
+      <pc:chgData name="Emils Zegers" userId="bd5cf22c-0e97-44c0-acad-9bc9915da531" providerId="ADAL" clId="{5F09D76C-1841-4F58-94B1-5AE3681891B6}" dt="2023-06-22T11:00:33.229" v="1568" actId="20577"/>
       <pc:docMkLst>
         <pc:docMk/>
       </pc:docMkLst>
       <pc:sldChg chg="addSp delSp modSp mod setBg">
-        <pc:chgData name="Emils Zegers" userId="bd5cf22c-0e97-44c0-acad-9bc9915da531" providerId="ADAL" clId="{5F09D76C-1841-4F58-94B1-5AE3681891B6}" dt="2023-06-22T10:11:17.751" v="829" actId="478"/>
+        <pc:chgData name="Emils Zegers" userId="bd5cf22c-0e97-44c0-acad-9bc9915da531" providerId="ADAL" clId="{5F09D76C-1841-4F58-94B1-5AE3681891B6}" dt="2023-06-22T11:00:33.229" v="1568" actId="20577"/>
         <pc:sldMkLst>
           <pc:docMk/>
           <pc:sldMk cId="605312590" sldId="256"/>
@@ -199,16 +199,16 @@
             <ac:spMk id="5" creationId="{77A154C7-5854-948F-FC94-B824696B59C3}"/>
           </ac:spMkLst>
         </pc:spChg>
-        <pc:spChg chg="add mod">
-          <ac:chgData name="Emils Zegers" userId="bd5cf22c-0e97-44c0-acad-9bc9915da531" providerId="ADAL" clId="{5F09D76C-1841-4F58-94B1-5AE3681891B6}" dt="2023-06-22T09:36:03.997" v="806" actId="14100"/>
+        <pc:spChg chg="add mod topLvl">
+          <ac:chgData name="Emils Zegers" userId="bd5cf22c-0e97-44c0-acad-9bc9915da531" providerId="ADAL" clId="{5F09D76C-1841-4F58-94B1-5AE3681891B6}" dt="2023-06-22T10:46:29.177" v="1332" actId="1076"/>
           <ac:spMkLst>
             <pc:docMk/>
             <pc:sldMk cId="605312590" sldId="256"/>
             <ac:spMk id="6" creationId="{AAE5DBEA-BF18-E3D2-6A0A-B7D3DDDC6955}"/>
           </ac:spMkLst>
         </pc:spChg>
-        <pc:spChg chg="add mod">
-          <ac:chgData name="Emils Zegers" userId="bd5cf22c-0e97-44c0-acad-9bc9915da531" providerId="ADAL" clId="{5F09D76C-1841-4F58-94B1-5AE3681891B6}" dt="2023-06-22T09:18:12.963" v="708" actId="1582"/>
+        <pc:spChg chg="add mod topLvl">
+          <ac:chgData name="Emils Zegers" userId="bd5cf22c-0e97-44c0-acad-9bc9915da531" providerId="ADAL" clId="{5F09D76C-1841-4F58-94B1-5AE3681891B6}" dt="2023-06-22T10:46:33.234" v="1333" actId="1076"/>
           <ac:spMkLst>
             <pc:docMk/>
             <pc:sldMk cId="605312590" sldId="256"/>
@@ -224,23 +224,23 @@
           </ac:spMkLst>
         </pc:spChg>
         <pc:spChg chg="add mod">
-          <ac:chgData name="Emils Zegers" userId="bd5cf22c-0e97-44c0-acad-9bc9915da531" providerId="ADAL" clId="{5F09D76C-1841-4F58-94B1-5AE3681891B6}" dt="2023-06-22T09:18:53.284" v="762" actId="20577"/>
+          <ac:chgData name="Emils Zegers" userId="bd5cf22c-0e97-44c0-acad-9bc9915da531" providerId="ADAL" clId="{5F09D76C-1841-4F58-94B1-5AE3681891B6}" dt="2023-06-22T10:58:18.310" v="1454" actId="123"/>
           <ac:spMkLst>
             <pc:docMk/>
             <pc:sldMk cId="605312590" sldId="256"/>
             <ac:spMk id="11" creationId="{82B0777B-A2FF-B860-C5E1-B1EF9ADF1C0A}"/>
           </ac:spMkLst>
         </pc:spChg>
-        <pc:spChg chg="mod">
-          <ac:chgData name="Emils Zegers" userId="bd5cf22c-0e97-44c0-acad-9bc9915da531" providerId="ADAL" clId="{5F09D76C-1841-4F58-94B1-5AE3681891B6}" dt="2023-06-22T09:35:43.526" v="803" actId="14100"/>
+        <pc:spChg chg="mod topLvl">
+          <ac:chgData name="Emils Zegers" userId="bd5cf22c-0e97-44c0-acad-9bc9915da531" providerId="ADAL" clId="{5F09D76C-1841-4F58-94B1-5AE3681891B6}" dt="2023-06-22T10:46:01.790" v="1327" actId="165"/>
           <ac:spMkLst>
             <pc:docMk/>
             <pc:sldMk cId="605312590" sldId="256"/>
             <ac:spMk id="14" creationId="{73B8A3AB-D86D-F61D-6ACE-55657C174108}"/>
           </ac:spMkLst>
         </pc:spChg>
-        <pc:spChg chg="mod">
-          <ac:chgData name="Emils Zegers" userId="bd5cf22c-0e97-44c0-acad-9bc9915da531" providerId="ADAL" clId="{5F09D76C-1841-4F58-94B1-5AE3681891B6}" dt="2023-06-22T09:36:19.757" v="807" actId="21"/>
+        <pc:spChg chg="mod topLvl">
+          <ac:chgData name="Emils Zegers" userId="bd5cf22c-0e97-44c0-acad-9bc9915da531" providerId="ADAL" clId="{5F09D76C-1841-4F58-94B1-5AE3681891B6}" dt="2023-06-22T10:46:01.790" v="1327" actId="165"/>
           <ac:spMkLst>
             <pc:docMk/>
             <pc:sldMk cId="605312590" sldId="256"/>
@@ -248,7 +248,15 @@
           </ac:spMkLst>
         </pc:spChg>
         <pc:spChg chg="add mod">
-          <ac:chgData name="Emils Zegers" userId="bd5cf22c-0e97-44c0-acad-9bc9915da531" providerId="ADAL" clId="{5F09D76C-1841-4F58-94B1-5AE3681891B6}" dt="2023-06-22T09:39:29.586" v="827" actId="1076"/>
+          <ac:chgData name="Emils Zegers" userId="bd5cf22c-0e97-44c0-acad-9bc9915da531" providerId="ADAL" clId="{5F09D76C-1841-4F58-94B1-5AE3681891B6}" dt="2023-06-22T10:52:51.231" v="1361" actId="113"/>
+          <ac:spMkLst>
+            <pc:docMk/>
+            <pc:sldMk cId="605312590" sldId="256"/>
+            <ac:spMk id="16" creationId="{71943113-C3FB-E68C-3559-3E941114FFB1}"/>
+          </ac:spMkLst>
+        </pc:spChg>
+        <pc:spChg chg="add mod ord">
+          <ac:chgData name="Emils Zegers" userId="bd5cf22c-0e97-44c0-acad-9bc9915da531" providerId="ADAL" clId="{5F09D76C-1841-4F58-94B1-5AE3681891B6}" dt="2023-06-22T10:58:24.926" v="1456" actId="123"/>
           <ac:spMkLst>
             <pc:docMk/>
             <pc:sldMk cId="605312590" sldId="256"/>
@@ -256,11 +264,91 @@
           </ac:spMkLst>
         </pc:spChg>
         <pc:spChg chg="add mod">
-          <ac:chgData name="Emils Zegers" userId="bd5cf22c-0e97-44c0-acad-9bc9915da531" providerId="ADAL" clId="{5F09D76C-1841-4F58-94B1-5AE3681891B6}" dt="2023-06-22T09:37:19.801" v="826" actId="164"/>
+          <ac:chgData name="Emils Zegers" userId="bd5cf22c-0e97-44c0-acad-9bc9915da531" providerId="ADAL" clId="{5F09D76C-1841-4F58-94B1-5AE3681891B6}" dt="2023-06-22T10:56:23.552" v="1414" actId="20577"/>
+          <ac:spMkLst>
+            <pc:docMk/>
+            <pc:sldMk cId="605312590" sldId="256"/>
+            <ac:spMk id="18" creationId="{23F4374A-D1AB-AC16-3EDD-BDAA660FAC95}"/>
+          </ac:spMkLst>
+        </pc:spChg>
+        <pc:spChg chg="add mod topLvl">
+          <ac:chgData name="Emils Zegers" userId="bd5cf22c-0e97-44c0-acad-9bc9915da531" providerId="ADAL" clId="{5F09D76C-1841-4F58-94B1-5AE3681891B6}" dt="2023-06-22T10:52:30.649" v="1337" actId="1076"/>
           <ac:spMkLst>
             <pc:docMk/>
             <pc:sldMk cId="605312590" sldId="256"/>
             <ac:spMk id="19" creationId="{5EA47C9F-0453-69C3-157F-6AB057DA5D76}"/>
+          </ac:spMkLst>
+        </pc:spChg>
+        <pc:spChg chg="add mod">
+          <ac:chgData name="Emils Zegers" userId="bd5cf22c-0e97-44c0-acad-9bc9915da531" providerId="ADAL" clId="{5F09D76C-1841-4F58-94B1-5AE3681891B6}" dt="2023-06-22T10:57:27.513" v="1443" actId="1076"/>
+          <ac:spMkLst>
+            <pc:docMk/>
+            <pc:sldMk cId="605312590" sldId="256"/>
+            <ac:spMk id="21" creationId="{63D33713-FA70-0926-2288-F6BB18F431A9}"/>
+          </ac:spMkLst>
+        </pc:spChg>
+        <pc:spChg chg="add mod">
+          <ac:chgData name="Emils Zegers" userId="bd5cf22c-0e97-44c0-acad-9bc9915da531" providerId="ADAL" clId="{5F09D76C-1841-4F58-94B1-5AE3681891B6}" dt="2023-06-22T10:59:11.508" v="1480" actId="20577"/>
+          <ac:spMkLst>
+            <pc:docMk/>
+            <pc:sldMk cId="605312590" sldId="256"/>
+            <ac:spMk id="22" creationId="{31544DDD-4DBB-76CF-C7E7-2828C0580963}"/>
+          </ac:spMkLst>
+        </pc:spChg>
+        <pc:spChg chg="add mod">
+          <ac:chgData name="Emils Zegers" userId="bd5cf22c-0e97-44c0-acad-9bc9915da531" providerId="ADAL" clId="{5F09D76C-1841-4F58-94B1-5AE3681891B6}" dt="2023-06-22T10:59:35.463" v="1520" actId="5793"/>
+          <ac:spMkLst>
+            <pc:docMk/>
+            <pc:sldMk cId="605312590" sldId="256"/>
+            <ac:spMk id="24" creationId="{37F2954F-601B-7628-AF3C-623E467FC958}"/>
+          </ac:spMkLst>
+        </pc:spChg>
+        <pc:spChg chg="add del mod">
+          <ac:chgData name="Emils Zegers" userId="bd5cf22c-0e97-44c0-acad-9bc9915da531" providerId="ADAL" clId="{5F09D76C-1841-4F58-94B1-5AE3681891B6}" dt="2023-06-22T10:59:59.971" v="1522" actId="767"/>
+          <ac:spMkLst>
+            <pc:docMk/>
+            <pc:sldMk cId="605312590" sldId="256"/>
+            <ac:spMk id="25" creationId="{5027672E-3930-C316-33EF-8C515C2E8A46}"/>
+          </ac:spMkLst>
+        </pc:spChg>
+        <pc:spChg chg="add mod">
+          <ac:chgData name="Emils Zegers" userId="bd5cf22c-0e97-44c0-acad-9bc9915da531" providerId="ADAL" clId="{5F09D76C-1841-4F58-94B1-5AE3681891B6}" dt="2023-06-22T11:00:15.708" v="1544" actId="20577"/>
+          <ac:spMkLst>
+            <pc:docMk/>
+            <pc:sldMk cId="605312590" sldId="256"/>
+            <ac:spMk id="26" creationId="{34648C32-1B5B-84D7-78EB-DE232346049C}"/>
+          </ac:spMkLst>
+        </pc:spChg>
+        <pc:spChg chg="add mod">
+          <ac:chgData name="Emils Zegers" userId="bd5cf22c-0e97-44c0-acad-9bc9915da531" providerId="ADAL" clId="{5F09D76C-1841-4F58-94B1-5AE3681891B6}" dt="2023-06-22T11:00:10.904" v="1524" actId="1076"/>
+          <ac:spMkLst>
+            <pc:docMk/>
+            <pc:sldMk cId="605312590" sldId="256"/>
+            <ac:spMk id="27" creationId="{69DC1238-EB0D-C7D5-29FC-96E28CD19024}"/>
+          </ac:spMkLst>
+        </pc:spChg>
+        <pc:spChg chg="add del mod">
+          <ac:chgData name="Emils Zegers" userId="bd5cf22c-0e97-44c0-acad-9bc9915da531" providerId="ADAL" clId="{5F09D76C-1841-4F58-94B1-5AE3681891B6}" dt="2023-06-22T11:00:23.911" v="1546" actId="478"/>
+          <ac:spMkLst>
+            <pc:docMk/>
+            <pc:sldMk cId="605312590" sldId="256"/>
+            <ac:spMk id="28" creationId="{7C33C5F9-D1D2-119A-C2E2-95210D860213}"/>
+          </ac:spMkLst>
+        </pc:spChg>
+        <pc:spChg chg="add mod">
+          <ac:chgData name="Emils Zegers" userId="bd5cf22c-0e97-44c0-acad-9bc9915da531" providerId="ADAL" clId="{5F09D76C-1841-4F58-94B1-5AE3681891B6}" dt="2023-06-22T11:00:33.229" v="1568" actId="20577"/>
+          <ac:spMkLst>
+            <pc:docMk/>
+            <pc:sldMk cId="605312590" sldId="256"/>
+            <ac:spMk id="29" creationId="{079F492F-F6C6-929D-855D-07D237F5C7F3}"/>
+          </ac:spMkLst>
+        </pc:spChg>
+        <pc:spChg chg="add mod">
+          <ac:chgData name="Emils Zegers" userId="bd5cf22c-0e97-44c0-acad-9bc9915da531" providerId="ADAL" clId="{5F09D76C-1841-4F58-94B1-5AE3681891B6}" dt="2023-06-22T11:00:27.964" v="1548" actId="1076"/>
+          <ac:spMkLst>
+            <pc:docMk/>
+            <pc:sldMk cId="605312590" sldId="256"/>
+            <ac:spMk id="30" creationId="{06D7D6FF-D3E2-C821-9B87-5E021566DEEE}"/>
           </ac:spMkLst>
         </pc:spChg>
         <pc:grpChg chg="add del mod">
@@ -271,16 +359,16 @@
             <ac:grpSpMk id="7" creationId="{D7AAE863-2282-0B6B-A7FB-2E034A49FB37}"/>
           </ac:grpSpMkLst>
         </pc:grpChg>
-        <pc:grpChg chg="add mod">
-          <ac:chgData name="Emils Zegers" userId="bd5cf22c-0e97-44c0-acad-9bc9915da531" providerId="ADAL" clId="{5F09D76C-1841-4F58-94B1-5AE3681891B6}" dt="2023-06-22T09:10:10.080" v="693" actId="1076"/>
+        <pc:grpChg chg="add del mod">
+          <ac:chgData name="Emils Zegers" userId="bd5cf22c-0e97-44c0-acad-9bc9915da531" providerId="ADAL" clId="{5F09D76C-1841-4F58-94B1-5AE3681891B6}" dt="2023-06-22T10:46:23.518" v="1330" actId="165"/>
           <ac:grpSpMkLst>
             <pc:docMk/>
             <pc:sldMk cId="605312590" sldId="256"/>
             <ac:grpSpMk id="9" creationId="{68AD6912-FAB8-B18A-A1F9-FCE5A088D56B}"/>
           </ac:grpSpMkLst>
         </pc:grpChg>
-        <pc:grpChg chg="add mod">
-          <ac:chgData name="Emils Zegers" userId="bd5cf22c-0e97-44c0-acad-9bc9915da531" providerId="ADAL" clId="{5F09D76C-1841-4F58-94B1-5AE3681891B6}" dt="2023-06-22T09:37:19.801" v="826" actId="164"/>
+        <pc:grpChg chg="add del mod topLvl">
+          <ac:chgData name="Emils Zegers" userId="bd5cf22c-0e97-44c0-acad-9bc9915da531" providerId="ADAL" clId="{5F09D76C-1841-4F58-94B1-5AE3681891B6}" dt="2023-06-22T10:46:01.790" v="1327" actId="165"/>
           <ac:grpSpMkLst>
             <pc:docMk/>
             <pc:sldMk cId="605312590" sldId="256"/>
@@ -295,8 +383,8 @@
             <ac:grpSpMk id="13" creationId="{E30AA9FC-9FA1-BC1A-FF2F-5402E3E60CDA}"/>
           </ac:grpSpMkLst>
         </pc:grpChg>
-        <pc:grpChg chg="add mod">
-          <ac:chgData name="Emils Zegers" userId="bd5cf22c-0e97-44c0-acad-9bc9915da531" providerId="ADAL" clId="{5F09D76C-1841-4F58-94B1-5AE3681891B6}" dt="2023-06-22T09:37:19.801" v="826" actId="164"/>
+        <pc:grpChg chg="add del mod">
+          <ac:chgData name="Emils Zegers" userId="bd5cf22c-0e97-44c0-acad-9bc9915da531" providerId="ADAL" clId="{5F09D76C-1841-4F58-94B1-5AE3681891B6}" dt="2023-06-22T10:45:51.218" v="1325" actId="165"/>
           <ac:grpSpMkLst>
             <pc:docMk/>
             <pc:sldMk cId="605312590" sldId="256"/>
@@ -304,11 +392,27 @@
           </ac:grpSpMkLst>
         </pc:grpChg>
         <pc:picChg chg="add del mod">
+          <ac:chgData name="Emils Zegers" userId="bd5cf22c-0e97-44c0-acad-9bc9915da531" providerId="ADAL" clId="{5F09D76C-1841-4F58-94B1-5AE3681891B6}" dt="2023-06-22T10:35:15.729" v="835" actId="478"/>
+          <ac:picMkLst>
+            <pc:docMk/>
+            <pc:sldMk cId="605312590" sldId="256"/>
+            <ac:picMk id="4" creationId="{BC22DF59-DEBB-FADF-CB52-D1EE8093ED36}"/>
+          </ac:picMkLst>
+        </pc:picChg>
+        <pc:picChg chg="add del mod">
           <ac:chgData name="Emils Zegers" userId="bd5cf22c-0e97-44c0-acad-9bc9915da531" providerId="ADAL" clId="{5F09D76C-1841-4F58-94B1-5AE3681891B6}" dt="2023-06-22T07:43:11.232" v="51" actId="478"/>
           <ac:picMkLst>
             <pc:docMk/>
             <pc:sldMk cId="605312590" sldId="256"/>
             <ac:picMk id="6" creationId="{3329F5C5-4FC6-CEED-4739-9C5D136832A1}"/>
+          </ac:picMkLst>
+        </pc:picChg>
+        <pc:picChg chg="add mod ord">
+          <ac:chgData name="Emils Zegers" userId="bd5cf22c-0e97-44c0-acad-9bc9915da531" providerId="ADAL" clId="{5F09D76C-1841-4F58-94B1-5AE3681891B6}" dt="2023-06-22T10:58:00.040" v="1449" actId="167"/>
+          <ac:picMkLst>
+            <pc:docMk/>
+            <pc:sldMk cId="605312590" sldId="256"/>
+            <ac:picMk id="7" creationId="{BA027267-29E6-ED00-67F1-DFA0D8E32B97}"/>
           </ac:picMkLst>
         </pc:picChg>
         <pc:picChg chg="add del mod">
@@ -333,6 +437,14 @@
             <pc:docMk/>
             <pc:sldMk cId="605312590" sldId="256"/>
             <ac:picMk id="12" creationId="{E792BA31-DCDF-BA17-C848-2EC3708A4542}"/>
+          </ac:picMkLst>
+        </pc:picChg>
+        <pc:picChg chg="add mod modCrop">
+          <ac:chgData name="Emils Zegers" userId="bd5cf22c-0e97-44c0-acad-9bc9915da531" providerId="ADAL" clId="{5F09D76C-1841-4F58-94B1-5AE3681891B6}" dt="2023-06-22T10:55:38.298" v="1384" actId="1076"/>
+          <ac:picMkLst>
+            <pc:docMk/>
+            <pc:sldMk cId="605312590" sldId="256"/>
+            <ac:picMk id="13" creationId="{2363D4A2-65EB-8D1B-426F-3F6A8D121227}"/>
           </ac:picMkLst>
         </pc:picChg>
         <pc:picChg chg="add del mod">
@@ -376,7 +488,7 @@
           </ac:picMkLst>
         </pc:picChg>
         <pc:picChg chg="add mod">
-          <ac:chgData name="Emils Zegers" userId="bd5cf22c-0e97-44c0-acad-9bc9915da531" providerId="ADAL" clId="{5F09D76C-1841-4F58-94B1-5AE3681891B6}" dt="2023-06-22T09:39:32.264" v="828" actId="1076"/>
+          <ac:chgData name="Emils Zegers" userId="bd5cf22c-0e97-44c0-acad-9bc9915da531" providerId="ADAL" clId="{5F09D76C-1841-4F58-94B1-5AE3681891B6}" dt="2023-06-22T10:55:40.568" v="1385" actId="1076"/>
           <ac:picMkLst>
             <pc:docMk/>
             <pc:sldMk cId="605312590" sldId="256"/>
@@ -3238,39 +3350,26 @@
       <p:bgPr>
         <a:gradFill flip="none" rotWithShape="1">
           <a:gsLst>
-            <a:gs pos="0">
-              <a:schemeClr val="accent1">
-                <a:lumMod val="5000"/>
-                <a:lumOff val="95000"/>
-              </a:schemeClr>
-            </a:gs>
-            <a:gs pos="15000">
+            <a:gs pos="23000">
               <a:schemeClr val="bg1"/>
             </a:gs>
-            <a:gs pos="33000">
-              <a:srgbClr val="FFC000"/>
-            </a:gs>
-            <a:gs pos="40000">
+            <a:gs pos="80000">
               <a:schemeClr val="bg1"/>
             </a:gs>
-            <a:gs pos="63000">
-              <a:schemeClr val="bg1"/>
-            </a:gs>
-            <a:gs pos="55000">
-              <a:srgbClr val="FF0000">
-                <a:alpha val="30000"/>
+            <a:gs pos="0">
+              <a:srgbClr val="FF9999">
+                <a:alpha val="50000"/>
               </a:srgbClr>
             </a:gs>
-            <a:gs pos="75000">
-              <a:srgbClr val="FF0000">
-                <a:alpha val="26000"/>
+            <a:gs pos="100000">
+              <a:srgbClr val="FF9999">
+                <a:lumMod val="100000"/>
+                <a:alpha val="50000"/>
               </a:srgbClr>
             </a:gs>
           </a:gsLst>
-          <a:path path="circle">
-            <a:fillToRect l="100000" t="100000"/>
-          </a:path>
-          <a:tileRect r="-100000" b="-100000"/>
+          <a:lin ang="6000000" scaled="0"/>
+          <a:tileRect/>
         </a:gradFill>
         <a:effectLst/>
       </p:bgPr>
@@ -3289,88 +3388,12 @@
           <a:chExt cx="0" cy="0"/>
         </a:xfrm>
       </p:grpSpPr>
-      <p:sp>
-        <p:nvSpPr>
-          <p:cNvPr id="2" name="Title 1">
+      <p:pic>
+        <p:nvPicPr>
+          <p:cNvPr id="7" name="Graphic 6">
             <a:extLst>
               <a:ext uri="{FF2B5EF4-FFF2-40B4-BE49-F238E27FC236}">
-                <a16:creationId xmlns:a16="http://schemas.microsoft.com/office/drawing/2014/main" id="{8DB20035-8802-6B91-C2C2-CAEC48AD8007}"/>
-              </a:ext>
-            </a:extLst>
-          </p:cNvPr>
-          <p:cNvSpPr>
-            <a:spLocks noGrp="1"/>
-          </p:cNvSpPr>
-          <p:nvPr>
-            <p:ph type="ctrTitle"/>
-          </p:nvPr>
-        </p:nvSpPr>
-        <p:spPr>
-          <a:xfrm>
-            <a:off x="2268020" y="-15176"/>
-            <a:ext cx="25704245" cy="2979845"/>
-          </a:xfrm>
-        </p:spPr>
-        <p:txBody>
-          <a:bodyPr/>
-          <a:lstStyle/>
-          <a:p>
-            <a:r>
-              <a:rPr lang="en-US" dirty="0"/>
-              <a:t>Optical Feedback</a:t>
-            </a:r>
-            <a:endParaRPr lang="en-NL" dirty="0"/>
-          </a:p>
-        </p:txBody>
-      </p:sp>
-      <p:sp>
-        <p:nvSpPr>
-          <p:cNvPr id="17" name="TextBox 16">
-            <a:extLst>
-              <a:ext uri="{FF2B5EF4-FFF2-40B4-BE49-F238E27FC236}">
-                <a16:creationId xmlns:a16="http://schemas.microsoft.com/office/drawing/2014/main" id="{0E29FBC8-C102-7BAF-D6A6-070BDC02B058}"/>
-              </a:ext>
-            </a:extLst>
-          </p:cNvPr>
-          <p:cNvSpPr txBox="1"/>
-          <p:nvPr/>
-        </p:nvSpPr>
-        <p:spPr>
-          <a:xfrm>
-            <a:off x="19382551" y="9088788"/>
-            <a:ext cx="6852045" cy="5632311"/>
-          </a:xfrm>
-          <a:prstGeom prst="rect">
-            <a:avLst/>
-          </a:prstGeom>
-          <a:noFill/>
-        </p:spPr>
-        <p:txBody>
-          <a:bodyPr wrap="square" rtlCol="0">
-            <a:spAutoFit/>
-          </a:bodyPr>
-          <a:lstStyle/>
-          <a:p>
-            <a:r>
-              <a:rPr lang="en-GB" sz="4000" b="0" i="0" u="none" strike="noStrike" dirty="0">
-                <a:solidFill>
-                  <a:srgbClr val="000000"/>
-                </a:solidFill>
-                <a:effectLst/>
-                <a:latin typeface="Arial" panose="020B0604020202020204" pitchFamily="34" charset="0"/>
-              </a:rPr>
-              <a:t>A diode laser emits light by sending electrons through a semiconductor-type material. This material lets excited electrons deexcite through an energy gap making them emit light with the wavelength of the energy that’s around or higher than the energy gap.</a:t>
-            </a:r>
-            <a:endParaRPr lang="en-NL" sz="4000" dirty="0"/>
-          </a:p>
-        </p:txBody>
-      </p:sp>
-      <p:pic>
-        <p:nvPicPr>
-          <p:cNvPr id="23" name="Graphic 22">
-            <a:extLst>
-              <a:ext uri="{FF2B5EF4-FFF2-40B4-BE49-F238E27FC236}">
-                <a16:creationId xmlns:a16="http://schemas.microsoft.com/office/drawing/2014/main" id="{098999BF-B894-6B99-397A-E1BB84087883}"/>
+                <a16:creationId xmlns:a16="http://schemas.microsoft.com/office/drawing/2014/main" id="{BA027267-29E6-ED00-67F1-DFA0D8E32B97}"/>
               </a:ext>
             </a:extLst>
           </p:cNvPr>
@@ -3396,7 +3419,80 @@
         </p:blipFill>
         <p:spPr>
           <a:xfrm>
-            <a:off x="15821054" y="15538414"/>
+            <a:off x="1444434" y="8587137"/>
+            <a:ext cx="13675709" cy="10226753"/>
+          </a:xfrm>
+          <a:prstGeom prst="rect">
+            <a:avLst/>
+          </a:prstGeom>
+        </p:spPr>
+      </p:pic>
+      <p:sp>
+        <p:nvSpPr>
+          <p:cNvPr id="2" name="Title 1">
+            <a:extLst>
+              <a:ext uri="{FF2B5EF4-FFF2-40B4-BE49-F238E27FC236}">
+                <a16:creationId xmlns:a16="http://schemas.microsoft.com/office/drawing/2014/main" id="{8DB20035-8802-6B91-C2C2-CAEC48AD8007}"/>
+              </a:ext>
+            </a:extLst>
+          </p:cNvPr>
+          <p:cNvSpPr>
+            <a:spLocks noGrp="1"/>
+          </p:cNvSpPr>
+          <p:nvPr>
+            <p:ph type="ctrTitle"/>
+          </p:nvPr>
+        </p:nvSpPr>
+        <p:spPr>
+          <a:xfrm>
+            <a:off x="2268020" y="-15176"/>
+            <a:ext cx="25704245" cy="2979845"/>
+          </a:xfrm>
+        </p:spPr>
+        <p:txBody>
+          <a:bodyPr/>
+          <a:lstStyle/>
+          <a:p>
+            <a:r>
+              <a:rPr lang="en-US" dirty="0"/>
+              <a:t>Optical Feedback</a:t>
+            </a:r>
+            <a:endParaRPr lang="en-NL" dirty="0"/>
+          </a:p>
+        </p:txBody>
+      </p:sp>
+      <p:pic>
+        <p:nvPicPr>
+          <p:cNvPr id="23" name="Graphic 22">
+            <a:extLst>
+              <a:ext uri="{FF2B5EF4-FFF2-40B4-BE49-F238E27FC236}">
+                <a16:creationId xmlns:a16="http://schemas.microsoft.com/office/drawing/2014/main" id="{098999BF-B894-6B99-397A-E1BB84087883}"/>
+              </a:ext>
+            </a:extLst>
+          </p:cNvPr>
+          <p:cNvPicPr>
+            <a:picLocks noChangeAspect="1"/>
+          </p:cNvPicPr>
+          <p:nvPr/>
+        </p:nvPicPr>
+        <p:blipFill>
+          <a:blip r:embed="rId4">
+            <a:extLst>
+              <a:ext uri="{28A0092B-C50C-407E-A947-70E740481C1C}">
+                <a14:useLocalDpi xmlns:a14="http://schemas.microsoft.com/office/drawing/2010/main" val="0"/>
+              </a:ext>
+              <a:ext uri="{96DAC541-7B7A-43D3-8B79-37D633B846F1}">
+                <asvg:svgBlip xmlns:asvg="http://schemas.microsoft.com/office/drawing/2016/SVG/main" r:embed="rId5"/>
+              </a:ext>
+            </a:extLst>
+          </a:blip>
+          <a:stretch>
+            <a:fillRect/>
+          </a:stretch>
+        </p:blipFill>
+        <p:spPr>
+          <a:xfrm>
+            <a:off x="14761356" y="16499898"/>
             <a:ext cx="15747722" cy="9947434"/>
           </a:xfrm>
           <a:prstGeom prst="rect">
@@ -3404,149 +3500,128 @@
           </a:prstGeom>
         </p:spPr>
       </p:pic>
-      <p:grpSp>
-        <p:nvGrpSpPr>
-          <p:cNvPr id="9" name="Group 8">
+      <p:sp>
+        <p:nvSpPr>
+          <p:cNvPr id="6" name="Rectangle: Rounded Corners 5">
             <a:extLst>
               <a:ext uri="{FF2B5EF4-FFF2-40B4-BE49-F238E27FC236}">
-                <a16:creationId xmlns:a16="http://schemas.microsoft.com/office/drawing/2014/main" id="{68AD6912-FAB8-B18A-A1F9-FCE5A088D56B}"/>
+                <a16:creationId xmlns:a16="http://schemas.microsoft.com/office/drawing/2014/main" id="{AAE5DBEA-BF18-E3D2-6A0A-B7D3DDDC6955}"/>
               </a:ext>
             </a:extLst>
           </p:cNvPr>
-          <p:cNvGrpSpPr/>
+          <p:cNvSpPr/>
           <p:nvPr/>
-        </p:nvGrpSpPr>
-        <p:grpSpPr>
+        </p:nvSpPr>
+        <p:spPr>
           <a:xfrm>
-            <a:off x="495299" y="13903784"/>
-            <a:ext cx="14624844" cy="10882642"/>
-            <a:chOff x="-107792" y="23197808"/>
-            <a:chExt cx="14624844" cy="10882642"/>
+            <a:off x="-23209096" y="16080947"/>
+            <a:ext cx="14624844" cy="10077450"/>
           </a:xfrm>
-        </p:grpSpPr>
-        <p:sp>
-          <p:nvSpPr>
-            <p:cNvPr id="6" name="Rectangle: Rounded Corners 5">
-              <a:extLst>
-                <a:ext uri="{FF2B5EF4-FFF2-40B4-BE49-F238E27FC236}">
-                  <a16:creationId xmlns:a16="http://schemas.microsoft.com/office/drawing/2014/main" id="{AAE5DBEA-BF18-E3D2-6A0A-B7D3DDDC6955}"/>
-                </a:ext>
-              </a:extLst>
-            </p:cNvPr>
-            <p:cNvSpPr/>
-            <p:nvPr/>
-          </p:nvSpPr>
-          <p:spPr>
-            <a:xfrm>
-              <a:off x="-107792" y="24003000"/>
-              <a:ext cx="14624844" cy="10077450"/>
-            </a:xfrm>
-            <a:prstGeom prst="roundRect">
-              <a:avLst>
-                <a:gd name="adj" fmla="val 3203"/>
-              </a:avLst>
-            </a:prstGeom>
+          <a:prstGeom prst="roundRect">
+            <a:avLst>
+              <a:gd name="adj" fmla="val 3203"/>
+            </a:avLst>
+          </a:prstGeom>
+          <a:solidFill>
+            <a:schemeClr val="bg1"/>
+          </a:solidFill>
+          <a:ln w="76200">
             <a:solidFill>
-              <a:schemeClr val="bg1"/>
+              <a:schemeClr val="tx1"/>
             </a:solidFill>
-            <a:ln w="76200">
+          </a:ln>
+        </p:spPr>
+        <p:style>
+          <a:lnRef idx="2">
+            <a:schemeClr val="accent1">
+              <a:shade val="50000"/>
+            </a:schemeClr>
+          </a:lnRef>
+          <a:fillRef idx="1">
+            <a:schemeClr val="accent1"/>
+          </a:fillRef>
+          <a:effectRef idx="0">
+            <a:schemeClr val="accent1"/>
+          </a:effectRef>
+          <a:fontRef idx="minor">
+            <a:schemeClr val="lt1"/>
+          </a:fontRef>
+        </p:style>
+        <p:txBody>
+          <a:bodyPr rtlCol="0" anchor="ctr"/>
+          <a:lstStyle/>
+          <a:p>
+            <a:pPr algn="ctr"/>
+            <a:endParaRPr lang="en-NL" dirty="0"/>
+          </a:p>
+        </p:txBody>
+      </p:sp>
+      <p:sp>
+        <p:nvSpPr>
+          <p:cNvPr id="8" name="Rectangle: Top Corners Rounded 7">
+            <a:extLst>
+              <a:ext uri="{FF2B5EF4-FFF2-40B4-BE49-F238E27FC236}">
+                <a16:creationId xmlns:a16="http://schemas.microsoft.com/office/drawing/2014/main" id="{F776A035-17DF-D142-9847-265199F0CBDB}"/>
+              </a:ext>
+            </a:extLst>
+          </p:cNvPr>
+          <p:cNvSpPr/>
+          <p:nvPr/>
+        </p:nvSpPr>
+        <p:spPr>
+          <a:xfrm>
+            <a:off x="-14223052" y="12876466"/>
+            <a:ext cx="5638800" cy="1634630"/>
+          </a:xfrm>
+          <a:prstGeom prst="round2SameRect">
+            <a:avLst/>
+          </a:prstGeom>
+          <a:solidFill>
+            <a:schemeClr val="bg1"/>
+          </a:solidFill>
+          <a:ln w="76200">
+            <a:solidFill>
+              <a:schemeClr val="tx1"/>
+            </a:solidFill>
+          </a:ln>
+        </p:spPr>
+        <p:style>
+          <a:lnRef idx="2">
+            <a:schemeClr val="accent1">
+              <a:shade val="50000"/>
+            </a:schemeClr>
+          </a:lnRef>
+          <a:fillRef idx="1">
+            <a:schemeClr val="accent1"/>
+          </a:fillRef>
+          <a:effectRef idx="0">
+            <a:schemeClr val="accent1"/>
+          </a:effectRef>
+          <a:fontRef idx="minor">
+            <a:schemeClr val="lt1"/>
+          </a:fontRef>
+        </p:style>
+        <p:txBody>
+          <a:bodyPr rtlCol="0" anchor="ctr"/>
+          <a:lstStyle/>
+          <a:p>
+            <a:pPr algn="ctr"/>
+            <a:r>
+              <a:rPr lang="en-US" sz="13800" dirty="0">
+                <a:solidFill>
+                  <a:schemeClr val="tx1"/>
+                </a:solidFill>
+              </a:rPr>
+              <a:t>Setup</a:t>
+            </a:r>
+            <a:endParaRPr lang="en-NL" sz="13800" dirty="0">
               <a:solidFill>
                 <a:schemeClr val="tx1"/>
               </a:solidFill>
-            </a:ln>
-          </p:spPr>
-          <p:style>
-            <a:lnRef idx="2">
-              <a:schemeClr val="accent1">
-                <a:shade val="50000"/>
-              </a:schemeClr>
-            </a:lnRef>
-            <a:fillRef idx="1">
-              <a:schemeClr val="accent1"/>
-            </a:fillRef>
-            <a:effectRef idx="0">
-              <a:schemeClr val="accent1"/>
-            </a:effectRef>
-            <a:fontRef idx="minor">
-              <a:schemeClr val="lt1"/>
-            </a:fontRef>
-          </p:style>
-          <p:txBody>
-            <a:bodyPr rtlCol="0" anchor="ctr"/>
-            <a:lstStyle/>
-            <a:p>
-              <a:pPr algn="ctr"/>
-              <a:endParaRPr lang="en-NL" dirty="0"/>
-            </a:p>
-          </p:txBody>
-        </p:sp>
-        <p:sp>
-          <p:nvSpPr>
-            <p:cNvPr id="8" name="Rectangle: Top Corners Rounded 7">
-              <a:extLst>
-                <a:ext uri="{FF2B5EF4-FFF2-40B4-BE49-F238E27FC236}">
-                  <a16:creationId xmlns:a16="http://schemas.microsoft.com/office/drawing/2014/main" id="{F776A035-17DF-D142-9847-265199F0CBDB}"/>
-                </a:ext>
-              </a:extLst>
-            </p:cNvPr>
-            <p:cNvSpPr/>
-            <p:nvPr/>
-          </p:nvSpPr>
-          <p:spPr>
-            <a:xfrm>
-              <a:off x="4349909" y="23197808"/>
-              <a:ext cx="5638800" cy="1634630"/>
-            </a:xfrm>
-            <a:prstGeom prst="round2SameRect">
-              <a:avLst/>
-            </a:prstGeom>
-            <a:solidFill>
-              <a:schemeClr val="bg1"/>
-            </a:solidFill>
-            <a:ln w="76200">
-              <a:solidFill>
-                <a:schemeClr val="tx1"/>
-              </a:solidFill>
-            </a:ln>
-          </p:spPr>
-          <p:style>
-            <a:lnRef idx="2">
-              <a:schemeClr val="accent1">
-                <a:shade val="50000"/>
-              </a:schemeClr>
-            </a:lnRef>
-            <a:fillRef idx="1">
-              <a:schemeClr val="accent1"/>
-            </a:fillRef>
-            <a:effectRef idx="0">
-              <a:schemeClr val="accent1"/>
-            </a:effectRef>
-            <a:fontRef idx="minor">
-              <a:schemeClr val="lt1"/>
-            </a:fontRef>
-          </p:style>
-          <p:txBody>
-            <a:bodyPr rtlCol="0" anchor="ctr"/>
-            <a:lstStyle/>
-            <a:p>
-              <a:pPr algn="ctr"/>
-              <a:r>
-                <a:rPr lang="en-US" sz="13800" dirty="0">
-                  <a:solidFill>
-                    <a:schemeClr val="tx1"/>
-                  </a:solidFill>
-                </a:rPr>
-                <a:t>Setup</a:t>
-              </a:r>
-              <a:endParaRPr lang="en-NL" sz="13800" dirty="0">
-                <a:solidFill>
-                  <a:schemeClr val="tx1"/>
-                </a:solidFill>
-              </a:endParaRPr>
-            </a:p>
-          </p:txBody>
-        </p:sp>
-      </p:grpSp>
+            </a:endParaRPr>
+          </a:p>
+        </p:txBody>
+      </p:sp>
       <p:sp>
         <p:nvSpPr>
           <p:cNvPr id="11" name="TextBox 10">
@@ -3561,8 +3636,8 @@
         </p:nvSpPr>
         <p:spPr>
           <a:xfrm>
-            <a:off x="1799303" y="20765729"/>
-            <a:ext cx="12211665" cy="707886"/>
+            <a:off x="1627127" y="17414778"/>
+            <a:ext cx="13303392" cy="11172289"/>
           </a:xfrm>
           <a:prstGeom prst="rect">
             <a:avLst/>
@@ -3575,229 +3650,700 @@
           </a:bodyPr>
           <a:lstStyle/>
           <a:p>
-            <a:r>
-              <a:rPr lang="en-US" sz="4000" dirty="0"/>
-              <a:t>The setup that was used for the experiments</a:t>
-            </a:r>
-            <a:endParaRPr lang="en-NL" sz="4000" dirty="0"/>
-          </a:p>
-        </p:txBody>
-      </p:sp>
-      <p:grpSp>
-        <p:nvGrpSpPr>
-          <p:cNvPr id="20" name="Group 19">
+            <a:pPr algn="just"/>
+            <a:r>
+              <a:rPr lang="en-GB" sz="4000" dirty="0"/>
+              <a:t>The ECDL made use of a Littman-Metcalf (</a:t>
+            </a:r>
+            <a:r>
+              <a:rPr lang="en-GB" sz="4000" dirty="0" err="1"/>
+              <a:t>laat</a:t>
+            </a:r>
+            <a:r>
+              <a:rPr lang="en-GB" sz="4000" dirty="0"/>
+              <a:t> </a:t>
+            </a:r>
+            <a:r>
+              <a:rPr lang="en-GB" sz="4000" dirty="0" err="1"/>
+              <a:t>figuur</a:t>
+            </a:r>
+            <a:r>
+              <a:rPr lang="en-GB" sz="4000" dirty="0"/>
+              <a:t> </a:t>
+            </a:r>
+            <a:r>
+              <a:rPr lang="en-GB" sz="4000" dirty="0" err="1"/>
+              <a:t>zien</a:t>
+            </a:r>
+            <a:r>
+              <a:rPr lang="en-GB" sz="4000" dirty="0"/>
+              <a:t>) configuration, where a mirror mounted on a rotation stage selects which wavelengths are being feedbacked into the diode laser. </a:t>
+            </a:r>
+          </a:p>
+          <a:p>
+            <a:pPr algn="just"/>
+            <a:r>
+              <a:rPr lang="en-GB" sz="4000" dirty="0"/>
+              <a:t>The beam of a diode laser is pointed into a reflection grating, which separates the various component wavelengths of the beam. The first order diffraction is directed into a mirror mounted on a high-precision rotation stage, which reflects a certain wavelength back into the grating and subsequently into the diode laser, providing optical feedback. By adjusting the angle on the rotation stage, we select which wavelength is providing optical feedback. The zeroth order diffraction is used as the output for our ECDL after being directed into an optical fibre.</a:t>
+            </a:r>
+          </a:p>
+          <a:p>
+            <a:pPr algn="just"/>
+            <a:r>
+              <a:rPr lang="en-GB" sz="4000" dirty="0"/>
+              <a:t>That zeroth order diffraction of the ECDL was put into a spectrometer to measure the wavelength range and the effect optical feedback has on the wavelength that the diode laser emits.</a:t>
+            </a:r>
+          </a:p>
+        </p:txBody>
+      </p:sp>
+      <p:sp>
+        <p:nvSpPr>
+          <p:cNvPr id="15" name="Rectangle: Rounded Corners 14">
             <a:extLst>
               <a:ext uri="{FF2B5EF4-FFF2-40B4-BE49-F238E27FC236}">
-                <a16:creationId xmlns:a16="http://schemas.microsoft.com/office/drawing/2014/main" id="{F08EB73A-5D5A-6A3A-A58D-38D1E096981C}"/>
+                <a16:creationId xmlns:a16="http://schemas.microsoft.com/office/drawing/2014/main" id="{A532EE8C-4283-E6F8-5C11-D477855E5280}"/>
               </a:ext>
             </a:extLst>
           </p:cNvPr>
-          <p:cNvGrpSpPr/>
+          <p:cNvSpPr/>
           <p:nvPr/>
-        </p:nvGrpSpPr>
-        <p:grpSpPr>
+        </p:nvSpPr>
+        <p:spPr>
           <a:xfrm>
-            <a:off x="495299" y="4876522"/>
-            <a:ext cx="14624844" cy="6345302"/>
-            <a:chOff x="495299" y="4876522"/>
-            <a:chExt cx="14624844" cy="6345302"/>
+            <a:off x="-23209095" y="7898695"/>
+            <a:ext cx="14624844" cy="5042550"/>
           </a:xfrm>
-        </p:grpSpPr>
-        <p:grpSp>
-          <p:nvGrpSpPr>
-            <p:cNvPr id="12" name="Group 11">
-              <a:extLst>
-                <a:ext uri="{FF2B5EF4-FFF2-40B4-BE49-F238E27FC236}">
-                  <a16:creationId xmlns:a16="http://schemas.microsoft.com/office/drawing/2014/main" id="{D421EDB0-3306-2B0D-25E8-4E2425BB85EF}"/>
-                </a:ext>
-              </a:extLst>
-            </p:cNvPr>
-            <p:cNvGrpSpPr/>
-            <p:nvPr/>
-          </p:nvGrpSpPr>
-          <p:grpSpPr>
-            <a:xfrm>
-              <a:off x="495299" y="4876522"/>
-              <a:ext cx="14624844" cy="6306312"/>
-              <a:chOff x="-107792" y="23197808"/>
-              <a:chExt cx="14624844" cy="6306312"/>
-            </a:xfrm>
-          </p:grpSpPr>
-          <p:sp>
-            <p:nvSpPr>
-              <p:cNvPr id="15" name="Rectangle: Rounded Corners 14">
-                <a:extLst>
-                  <a:ext uri="{FF2B5EF4-FFF2-40B4-BE49-F238E27FC236}">
-                    <a16:creationId xmlns:a16="http://schemas.microsoft.com/office/drawing/2014/main" id="{A532EE8C-4283-E6F8-5C11-D477855E5280}"/>
-                  </a:ext>
-                </a:extLst>
-              </p:cNvPr>
-              <p:cNvSpPr/>
-              <p:nvPr/>
-            </p:nvSpPr>
-            <p:spPr>
-              <a:xfrm>
-                <a:off x="-107792" y="24461570"/>
-                <a:ext cx="14624844" cy="5042550"/>
-              </a:xfrm>
-              <a:prstGeom prst="roundRect">
-                <a:avLst>
-                  <a:gd name="adj" fmla="val 6138"/>
-                </a:avLst>
-              </a:prstGeom>
+          <a:prstGeom prst="roundRect">
+            <a:avLst>
+              <a:gd name="adj" fmla="val 6138"/>
+            </a:avLst>
+          </a:prstGeom>
+          <a:solidFill>
+            <a:schemeClr val="bg1"/>
+          </a:solidFill>
+          <a:ln w="76200">
+            <a:solidFill>
+              <a:schemeClr val="tx1"/>
+            </a:solidFill>
+          </a:ln>
+        </p:spPr>
+        <p:style>
+          <a:lnRef idx="2">
+            <a:schemeClr val="accent1">
+              <a:shade val="50000"/>
+            </a:schemeClr>
+          </a:lnRef>
+          <a:fillRef idx="1">
+            <a:schemeClr val="accent1"/>
+          </a:fillRef>
+          <a:effectRef idx="0">
+            <a:schemeClr val="accent1"/>
+          </a:effectRef>
+          <a:fontRef idx="minor">
+            <a:schemeClr val="lt1"/>
+          </a:fontRef>
+        </p:style>
+        <p:txBody>
+          <a:bodyPr rtlCol="0" anchor="ctr"/>
+          <a:lstStyle/>
+          <a:p>
+            <a:pPr algn="just"/>
+            <a:endParaRPr lang="en-NL" sz="4400" dirty="0">
               <a:solidFill>
-                <a:schemeClr val="bg1"/>
+                <a:schemeClr val="tx1"/>
               </a:solidFill>
-              <a:ln w="76200">
+            </a:endParaRPr>
+          </a:p>
+        </p:txBody>
+      </p:sp>
+      <p:sp>
+        <p:nvSpPr>
+          <p:cNvPr id="14" name="Rectangle: Top Corners Rounded 13">
+            <a:extLst>
+              <a:ext uri="{FF2B5EF4-FFF2-40B4-BE49-F238E27FC236}">
+                <a16:creationId xmlns:a16="http://schemas.microsoft.com/office/drawing/2014/main" id="{73B8A3AB-D86D-F61D-6ACE-55657C174108}"/>
+              </a:ext>
+            </a:extLst>
+          </p:cNvPr>
+          <p:cNvSpPr/>
+          <p:nvPr/>
+        </p:nvSpPr>
+        <p:spPr>
+          <a:xfrm>
+            <a:off x="-21428934" y="5169388"/>
+            <a:ext cx="11064521" cy="1634630"/>
+          </a:xfrm>
+          <a:prstGeom prst="round2SameRect">
+            <a:avLst/>
+          </a:prstGeom>
+          <a:solidFill>
+            <a:schemeClr val="bg1"/>
+          </a:solidFill>
+          <a:ln w="76200">
+            <a:solidFill>
+              <a:schemeClr val="tx1"/>
+            </a:solidFill>
+          </a:ln>
+        </p:spPr>
+        <p:style>
+          <a:lnRef idx="2">
+            <a:schemeClr val="accent1">
+              <a:shade val="50000"/>
+            </a:schemeClr>
+          </a:lnRef>
+          <a:fillRef idx="1">
+            <a:schemeClr val="accent1"/>
+          </a:fillRef>
+          <a:effectRef idx="0">
+            <a:schemeClr val="accent1"/>
+          </a:effectRef>
+          <a:fontRef idx="minor">
+            <a:schemeClr val="lt1"/>
+          </a:fontRef>
+        </p:style>
+        <p:txBody>
+          <a:bodyPr rtlCol="0" anchor="ctr"/>
+          <a:lstStyle/>
+          <a:p>
+            <a:pPr algn="ctr"/>
+            <a:r>
+              <a:rPr lang="en-US" sz="13800" dirty="0">
                 <a:solidFill>
                   <a:schemeClr val="tx1"/>
                 </a:solidFill>
-              </a:ln>
-            </p:spPr>
-            <p:style>
-              <a:lnRef idx="2">
-                <a:schemeClr val="accent1">
-                  <a:shade val="50000"/>
-                </a:schemeClr>
-              </a:lnRef>
-              <a:fillRef idx="1">
-                <a:schemeClr val="accent1"/>
-              </a:fillRef>
-              <a:effectRef idx="0">
-                <a:schemeClr val="accent1"/>
-              </a:effectRef>
-              <a:fontRef idx="minor">
-                <a:schemeClr val="lt1"/>
-              </a:fontRef>
-            </p:style>
-            <p:txBody>
-              <a:bodyPr rtlCol="0" anchor="ctr"/>
-              <a:lstStyle/>
-              <a:p>
-                <a:pPr algn="just"/>
-                <a:endParaRPr lang="en-NL" sz="4400" dirty="0">
-                  <a:solidFill>
-                    <a:schemeClr val="tx1"/>
-                  </a:solidFill>
-                </a:endParaRPr>
-              </a:p>
-            </p:txBody>
-          </p:sp>
-          <p:sp>
-            <p:nvSpPr>
-              <p:cNvPr id="14" name="Rectangle: Top Corners Rounded 13">
-                <a:extLst>
-                  <a:ext uri="{FF2B5EF4-FFF2-40B4-BE49-F238E27FC236}">
-                    <a16:creationId xmlns:a16="http://schemas.microsoft.com/office/drawing/2014/main" id="{73B8A3AB-D86D-F61D-6ACE-55657C174108}"/>
-                  </a:ext>
-                </a:extLst>
-              </p:cNvPr>
-              <p:cNvSpPr/>
-              <p:nvPr/>
-            </p:nvSpPr>
-            <p:spPr>
-              <a:xfrm>
-                <a:off x="1664930" y="23197808"/>
-                <a:ext cx="11064521" cy="1634630"/>
-              </a:xfrm>
-              <a:prstGeom prst="round2SameRect">
-                <a:avLst/>
-              </a:prstGeom>
+              </a:rPr>
+              <a:t>Introduction</a:t>
+            </a:r>
+            <a:endParaRPr lang="en-NL" sz="13800" dirty="0">
               <a:solidFill>
-                <a:schemeClr val="bg1"/>
+                <a:schemeClr val="tx1"/>
               </a:solidFill>
-              <a:ln w="76200">
+            </a:endParaRPr>
+          </a:p>
+        </p:txBody>
+      </p:sp>
+      <p:sp>
+        <p:nvSpPr>
+          <p:cNvPr id="19" name="TextBox 18">
+            <a:extLst>
+              <a:ext uri="{FF2B5EF4-FFF2-40B4-BE49-F238E27FC236}">
+                <a16:creationId xmlns:a16="http://schemas.microsoft.com/office/drawing/2014/main" id="{5EA47C9F-0453-69C3-157F-6AB057DA5D76}"/>
+              </a:ext>
+            </a:extLst>
+          </p:cNvPr>
+          <p:cNvSpPr txBox="1"/>
+          <p:nvPr/>
+        </p:nvSpPr>
+        <p:spPr>
+          <a:xfrm>
+            <a:off x="1581123" y="4884958"/>
+            <a:ext cx="14234258" cy="4401205"/>
+          </a:xfrm>
+          <a:prstGeom prst="rect">
+            <a:avLst/>
+          </a:prstGeom>
+          <a:noFill/>
+        </p:spPr>
+        <p:txBody>
+          <a:bodyPr wrap="square" rtlCol="0">
+            <a:spAutoFit/>
+          </a:bodyPr>
+          <a:lstStyle/>
+          <a:p>
+            <a:pPr algn="just"/>
+            <a:r>
+              <a:rPr lang="en-GB" sz="4000" b="0" i="0" u="none" strike="noStrike" dirty="0">
                 <a:solidFill>
-                  <a:schemeClr val="tx1"/>
+                  <a:srgbClr val="000000"/>
                 </a:solidFill>
-              </a:ln>
-            </p:spPr>
-            <p:style>
-              <a:lnRef idx="2">
-                <a:schemeClr val="accent1">
-                  <a:shade val="50000"/>
-                </a:schemeClr>
-              </a:lnRef>
-              <a:fillRef idx="1">
-                <a:schemeClr val="accent1"/>
-              </a:fillRef>
-              <a:effectRef idx="0">
-                <a:schemeClr val="accent1"/>
-              </a:effectRef>
-              <a:fontRef idx="minor">
-                <a:schemeClr val="lt1"/>
-              </a:fontRef>
-            </p:style>
-            <p:txBody>
-              <a:bodyPr rtlCol="0" anchor="ctr"/>
-              <a:lstStyle/>
-              <a:p>
-                <a:pPr algn="ctr"/>
-                <a:r>
-                  <a:rPr lang="en-US" sz="13800" dirty="0">
-                    <a:solidFill>
-                      <a:schemeClr val="tx1"/>
-                    </a:solidFill>
-                  </a:rPr>
-                  <a:t>Introduction</a:t>
-                </a:r>
-                <a:endParaRPr lang="en-NL" sz="13800" dirty="0">
-                  <a:solidFill>
-                    <a:schemeClr val="tx1"/>
-                  </a:solidFill>
-                </a:endParaRPr>
-              </a:p>
-            </p:txBody>
-          </p:sp>
-        </p:grpSp>
-        <p:sp>
-          <p:nvSpPr>
-            <p:cNvPr id="19" name="TextBox 18">
-              <a:extLst>
-                <a:ext uri="{FF2B5EF4-FFF2-40B4-BE49-F238E27FC236}">
-                  <a16:creationId xmlns:a16="http://schemas.microsoft.com/office/drawing/2014/main" id="{5EA47C9F-0453-69C3-157F-6AB057DA5D76}"/>
-                </a:ext>
-              </a:extLst>
-            </p:cNvPr>
-            <p:cNvSpPr txBox="1"/>
-            <p:nvPr/>
-          </p:nvSpPr>
-          <p:spPr>
-            <a:xfrm>
-              <a:off x="690592" y="6820619"/>
-              <a:ext cx="14234258" cy="4401205"/>
-            </a:xfrm>
-            <a:prstGeom prst="rect">
-              <a:avLst/>
-            </a:prstGeom>
-            <a:noFill/>
-          </p:spPr>
-          <p:txBody>
-            <a:bodyPr wrap="square" rtlCol="0">
-              <a:spAutoFit/>
-            </a:bodyPr>
-            <a:lstStyle/>
-            <a:p>
-              <a:pPr algn="just"/>
-              <a:r>
-                <a:rPr lang="en-GB" sz="4000" b="0" i="0" u="none" strike="noStrike" dirty="0">
-                  <a:solidFill>
-                    <a:srgbClr val="000000"/>
-                  </a:solidFill>
-                  <a:effectLst/>
-                  <a:latin typeface="Arial" panose="020B0604020202020204" pitchFamily="34" charset="0"/>
-                </a:rPr>
-                <a:t>For this project we built our own external cavity diode laser (ECDL) and Czerny-Turner Spectrometer, to measure the effects that optical feedback has on the output of a diode laser. The output of the ECDL was used as an input for the spectrometer, which visualized our results using an oscilloscope and a CCD we programmed.</a:t>
-              </a:r>
-              <a:endParaRPr lang="en-NL" sz="4000" dirty="0"/>
-            </a:p>
-            <a:p>
-              <a:pPr algn="just"/>
-              <a:endParaRPr lang="en-NL" sz="4000" dirty="0"/>
-            </a:p>
-          </p:txBody>
-        </p:sp>
-      </p:grpSp>
+                <a:effectLst/>
+                <a:latin typeface="Arial" panose="020B0604020202020204" pitchFamily="34" charset="0"/>
+              </a:rPr>
+              <a:t>For this project we built our own external cavity diode laser (ECDL) and Czerny-Turner Spectrometer, to measure the effects that optical feedback has on the output of a diode laser. The output of the ECDL was used as an input for the spectrometer, which visualized our results using an oscilloscope and a CCD we programmed.</a:t>
+            </a:r>
+            <a:endParaRPr lang="en-NL" sz="4000" dirty="0"/>
+          </a:p>
+          <a:p>
+            <a:pPr algn="just"/>
+            <a:endParaRPr lang="en-NL" sz="4000" dirty="0"/>
+          </a:p>
+        </p:txBody>
+      </p:sp>
+      <p:pic>
+        <p:nvPicPr>
+          <p:cNvPr id="13" name="Graphic 12">
+            <a:extLst>
+              <a:ext uri="{FF2B5EF4-FFF2-40B4-BE49-F238E27FC236}">
+                <a16:creationId xmlns:a16="http://schemas.microsoft.com/office/drawing/2014/main" id="{2363D4A2-65EB-8D1B-426F-3F6A8D121227}"/>
+              </a:ext>
+            </a:extLst>
+          </p:cNvPr>
+          <p:cNvPicPr>
+            <a:picLocks noChangeAspect="1"/>
+          </p:cNvPicPr>
+          <p:nvPr/>
+        </p:nvPicPr>
+        <p:blipFill rotWithShape="1">
+          <a:blip r:embed="rId6">
+            <a:extLst>
+              <a:ext uri="{28A0092B-C50C-407E-A947-70E740481C1C}">
+                <a14:useLocalDpi xmlns:a14="http://schemas.microsoft.com/office/drawing/2010/main" val="0"/>
+              </a:ext>
+              <a:ext uri="{96DAC541-7B7A-43D3-8B79-37D633B846F1}">
+                <asvg:svgBlip xmlns:asvg="http://schemas.microsoft.com/office/drawing/2016/SVG/main" r:embed="rId7"/>
+              </a:ext>
+            </a:extLst>
+          </a:blip>
+          <a:srcRect l="5139" t="7953" r="6217" b="3588"/>
+          <a:stretch/>
+        </p:blipFill>
+        <p:spPr>
+          <a:xfrm>
+            <a:off x="15511746" y="27161287"/>
+            <a:ext cx="14246943" cy="14217445"/>
+          </a:xfrm>
+          <a:prstGeom prst="rect">
+            <a:avLst/>
+          </a:prstGeom>
+        </p:spPr>
+      </p:pic>
+      <p:sp>
+        <p:nvSpPr>
+          <p:cNvPr id="16" name="TextBox 15">
+            <a:extLst>
+              <a:ext uri="{FF2B5EF4-FFF2-40B4-BE49-F238E27FC236}">
+                <a16:creationId xmlns:a16="http://schemas.microsoft.com/office/drawing/2014/main" id="{71943113-C3FB-E68C-3559-3E941114FFB1}"/>
+              </a:ext>
+            </a:extLst>
+          </p:cNvPr>
+          <p:cNvSpPr txBox="1"/>
+          <p:nvPr/>
+        </p:nvSpPr>
+        <p:spPr>
+          <a:xfrm>
+            <a:off x="1581123" y="4088053"/>
+            <a:ext cx="6607277" cy="923330"/>
+          </a:xfrm>
+          <a:prstGeom prst="rect">
+            <a:avLst/>
+          </a:prstGeom>
+          <a:noFill/>
+        </p:spPr>
+        <p:txBody>
+          <a:bodyPr wrap="square" rtlCol="0">
+            <a:spAutoFit/>
+          </a:bodyPr>
+          <a:lstStyle/>
+          <a:p>
+            <a:r>
+              <a:rPr lang="en-US" sz="5400" b="1" dirty="0"/>
+              <a:t>Introduction</a:t>
+            </a:r>
+            <a:endParaRPr lang="en-NL" sz="5400" b="1" dirty="0"/>
+          </a:p>
+        </p:txBody>
+      </p:sp>
+      <p:sp>
+        <p:nvSpPr>
+          <p:cNvPr id="17" name="TextBox 16">
+            <a:extLst>
+              <a:ext uri="{FF2B5EF4-FFF2-40B4-BE49-F238E27FC236}">
+                <a16:creationId xmlns:a16="http://schemas.microsoft.com/office/drawing/2014/main" id="{0E29FBC8-C102-7BAF-D6A6-070BDC02B058}"/>
+              </a:ext>
+            </a:extLst>
+          </p:cNvPr>
+          <p:cNvSpPr txBox="1"/>
+          <p:nvPr/>
+        </p:nvSpPr>
+        <p:spPr>
+          <a:xfrm>
+            <a:off x="17660508" y="5011383"/>
+            <a:ext cx="12267343" cy="12403395"/>
+          </a:xfrm>
+          <a:prstGeom prst="rect">
+            <a:avLst/>
+          </a:prstGeom>
+          <a:noFill/>
+        </p:spPr>
+        <p:txBody>
+          <a:bodyPr wrap="square" rtlCol="0">
+            <a:spAutoFit/>
+          </a:bodyPr>
+          <a:lstStyle/>
+          <a:p>
+            <a:pPr algn="just"/>
+            <a:r>
+              <a:rPr lang="en-GB" sz="4000" b="0" i="0" u="none" strike="noStrike" dirty="0">
+                <a:solidFill>
+                  <a:srgbClr val="000000"/>
+                </a:solidFill>
+                <a:effectLst/>
+                <a:latin typeface="Arial" panose="020B0604020202020204" pitchFamily="34" charset="0"/>
+              </a:rPr>
+              <a:t>A diode laser emits light by sending electrons through a semiconductor-type material. This material lets excited electrons deexcite through an energy gap making them emit light with the wavelength of the energy that’s around or higher than the energy gap.</a:t>
+            </a:r>
+          </a:p>
+          <a:p>
+            <a:pPr algn="just"/>
+            <a:endParaRPr lang="en-GB" sz="4000" dirty="0">
+              <a:solidFill>
+                <a:srgbClr val="000000"/>
+              </a:solidFill>
+              <a:latin typeface="Arial" panose="020B0604020202020204" pitchFamily="34" charset="0"/>
+            </a:endParaRPr>
+          </a:p>
+          <a:p>
+            <a:pPr algn="just"/>
+            <a:r>
+              <a:rPr lang="en-GB" sz="4000" b="0" i="0" u="none" strike="noStrike" dirty="0">
+                <a:solidFill>
+                  <a:srgbClr val="000000"/>
+                </a:solidFill>
+                <a:effectLst/>
+                <a:latin typeface="Arial" panose="020B0604020202020204" pitchFamily="34" charset="0"/>
+              </a:rPr>
+              <a:t>Light can influence the semiconductor-type material. </a:t>
+            </a:r>
+          </a:p>
+          <a:p>
+            <a:pPr algn="just"/>
+            <a:r>
+              <a:rPr lang="en-GB" sz="4000" b="0" i="0" u="none" strike="noStrike" dirty="0">
+                <a:solidFill>
+                  <a:srgbClr val="000000"/>
+                </a:solidFill>
+                <a:effectLst/>
+                <a:latin typeface="Arial" panose="020B0604020202020204" pitchFamily="34" charset="0"/>
+              </a:rPr>
+              <a:t>When a photon with more energy than the bandgap hits the semiconductor, the electrons act like a harmonic oscillator, making the emission a stimulated emission. This causes the diode to send out more light but with roughly the same wavelength as the incoming light.</a:t>
+            </a:r>
+          </a:p>
+          <a:p>
+            <a:pPr algn="just"/>
+            <a:endParaRPr lang="en-GB" sz="4000" b="0" i="0" u="none" strike="noStrike" dirty="0">
+              <a:solidFill>
+                <a:srgbClr val="000000"/>
+              </a:solidFill>
+              <a:effectLst/>
+              <a:latin typeface="Arial" panose="020B0604020202020204" pitchFamily="34" charset="0"/>
+            </a:endParaRPr>
+          </a:p>
+          <a:p>
+            <a:pPr algn="just"/>
+            <a:r>
+              <a:rPr lang="en-GB" sz="4000" dirty="0"/>
+              <a:t>This experiment measures how the optical feedback changes the output of the diode laser. According to the theory, we expect that the diode laser with feedback will have a narrower wavelength and will require less voltage to power because of the harmonic oscillation of the electrons.</a:t>
+            </a:r>
+            <a:endParaRPr lang="en-NL" sz="4000" dirty="0"/>
+          </a:p>
+        </p:txBody>
+      </p:sp>
+      <p:sp>
+        <p:nvSpPr>
+          <p:cNvPr id="18" name="TextBox 17">
+            <a:extLst>
+              <a:ext uri="{FF2B5EF4-FFF2-40B4-BE49-F238E27FC236}">
+                <a16:creationId xmlns:a16="http://schemas.microsoft.com/office/drawing/2014/main" id="{23F4374A-D1AB-AC16-3EDD-BDAA660FAC95}"/>
+              </a:ext>
+            </a:extLst>
+          </p:cNvPr>
+          <p:cNvSpPr txBox="1"/>
+          <p:nvPr/>
+        </p:nvSpPr>
+        <p:spPr>
+          <a:xfrm>
+            <a:off x="17660508" y="4088053"/>
+            <a:ext cx="6607277" cy="923330"/>
+          </a:xfrm>
+          <a:prstGeom prst="rect">
+            <a:avLst/>
+          </a:prstGeom>
+          <a:noFill/>
+        </p:spPr>
+        <p:txBody>
+          <a:bodyPr wrap="square" rtlCol="0">
+            <a:spAutoFit/>
+          </a:bodyPr>
+          <a:lstStyle/>
+          <a:p>
+            <a:r>
+              <a:rPr lang="en-US" sz="5400" b="1" dirty="0"/>
+              <a:t>Expectation</a:t>
+            </a:r>
+            <a:endParaRPr lang="en-NL" sz="5400" b="1" dirty="0"/>
+          </a:p>
+        </p:txBody>
+      </p:sp>
+      <p:sp>
+        <p:nvSpPr>
+          <p:cNvPr id="21" name="TextBox 20">
+            <a:extLst>
+              <a:ext uri="{FF2B5EF4-FFF2-40B4-BE49-F238E27FC236}">
+                <a16:creationId xmlns:a16="http://schemas.microsoft.com/office/drawing/2014/main" id="{63D33713-FA70-0926-2288-F6BB18F431A9}"/>
+              </a:ext>
+            </a:extLst>
+          </p:cNvPr>
+          <p:cNvSpPr txBox="1"/>
+          <p:nvPr/>
+        </p:nvSpPr>
+        <p:spPr>
+          <a:xfrm>
+            <a:off x="1581123" y="8836122"/>
+            <a:ext cx="6607277" cy="923330"/>
+          </a:xfrm>
+          <a:prstGeom prst="rect">
+            <a:avLst/>
+          </a:prstGeom>
+          <a:noFill/>
+        </p:spPr>
+        <p:txBody>
+          <a:bodyPr wrap="square" rtlCol="0">
+            <a:spAutoFit/>
+          </a:bodyPr>
+          <a:lstStyle/>
+          <a:p>
+            <a:r>
+              <a:rPr lang="en-US" sz="5400" b="1" dirty="0"/>
+              <a:t>Methodology</a:t>
+            </a:r>
+            <a:endParaRPr lang="en-NL" sz="5400" b="1" dirty="0"/>
+          </a:p>
+        </p:txBody>
+      </p:sp>
+      <p:sp>
+        <p:nvSpPr>
+          <p:cNvPr id="22" name="TextBox 21">
+            <a:extLst>
+              <a:ext uri="{FF2B5EF4-FFF2-40B4-BE49-F238E27FC236}">
+                <a16:creationId xmlns:a16="http://schemas.microsoft.com/office/drawing/2014/main" id="{31544DDD-4DBB-76CF-C7E7-2828C0580963}"/>
+              </a:ext>
+            </a:extLst>
+          </p:cNvPr>
+          <p:cNvSpPr txBox="1"/>
+          <p:nvPr/>
+        </p:nvSpPr>
+        <p:spPr>
+          <a:xfrm>
+            <a:off x="1581122" y="29040282"/>
+            <a:ext cx="6607277" cy="923330"/>
+          </a:xfrm>
+          <a:prstGeom prst="rect">
+            <a:avLst/>
+          </a:prstGeom>
+          <a:noFill/>
+        </p:spPr>
+        <p:txBody>
+          <a:bodyPr wrap="square" rtlCol="0">
+            <a:spAutoFit/>
+          </a:bodyPr>
+          <a:lstStyle/>
+          <a:p>
+            <a:r>
+              <a:rPr lang="en-US" sz="5400" b="1" dirty="0"/>
+              <a:t>Conclusion</a:t>
+            </a:r>
+            <a:endParaRPr lang="en-NL" sz="5400" b="1" dirty="0"/>
+          </a:p>
+        </p:txBody>
+      </p:sp>
+      <p:sp>
+        <p:nvSpPr>
+          <p:cNvPr id="24" name="TextBox 23">
+            <a:extLst>
+              <a:ext uri="{FF2B5EF4-FFF2-40B4-BE49-F238E27FC236}">
+                <a16:creationId xmlns:a16="http://schemas.microsoft.com/office/drawing/2014/main" id="{37F2954F-601B-7628-AF3C-623E467FC958}"/>
+              </a:ext>
+            </a:extLst>
+          </p:cNvPr>
+          <p:cNvSpPr txBox="1"/>
+          <p:nvPr/>
+        </p:nvSpPr>
+        <p:spPr>
+          <a:xfrm>
+            <a:off x="1581122" y="29963612"/>
+            <a:ext cx="11898904" cy="707886"/>
+          </a:xfrm>
+          <a:prstGeom prst="rect">
+            <a:avLst/>
+          </a:prstGeom>
+          <a:noFill/>
+        </p:spPr>
+        <p:txBody>
+          <a:bodyPr wrap="square" rtlCol="0">
+            <a:spAutoFit/>
+          </a:bodyPr>
+          <a:lstStyle/>
+          <a:p>
+            <a:r>
+              <a:rPr lang="en-US" sz="4000" dirty="0"/>
+              <a:t>I need to be written</a:t>
+            </a:r>
+            <a:r>
+              <a:rPr lang="en-US" sz="4000" dirty="0">
+                <a:sym typeface="Wingdings" panose="05000000000000000000" pitchFamily="2" charset="2"/>
+              </a:rPr>
+              <a:t></a:t>
+            </a:r>
+            <a:endParaRPr lang="en-NL" sz="4000" dirty="0"/>
+          </a:p>
+        </p:txBody>
+      </p:sp>
+      <p:sp>
+        <p:nvSpPr>
+          <p:cNvPr id="26" name="TextBox 25">
+            <a:extLst>
+              <a:ext uri="{FF2B5EF4-FFF2-40B4-BE49-F238E27FC236}">
+                <a16:creationId xmlns:a16="http://schemas.microsoft.com/office/drawing/2014/main" id="{34648C32-1B5B-84D7-78EB-DE232346049C}"/>
+              </a:ext>
+            </a:extLst>
+          </p:cNvPr>
+          <p:cNvSpPr txBox="1"/>
+          <p:nvPr/>
+        </p:nvSpPr>
+        <p:spPr>
+          <a:xfrm>
+            <a:off x="1581122" y="34244279"/>
+            <a:ext cx="6607277" cy="923330"/>
+          </a:xfrm>
+          <a:prstGeom prst="rect">
+            <a:avLst/>
+          </a:prstGeom>
+          <a:noFill/>
+        </p:spPr>
+        <p:txBody>
+          <a:bodyPr wrap="square" rtlCol="0">
+            <a:spAutoFit/>
+          </a:bodyPr>
+          <a:lstStyle/>
+          <a:p>
+            <a:r>
+              <a:rPr lang="en-US" sz="5400" b="1" dirty="0"/>
+              <a:t>Discussion</a:t>
+            </a:r>
+            <a:endParaRPr lang="en-NL" sz="5400" b="1" dirty="0"/>
+          </a:p>
+        </p:txBody>
+      </p:sp>
+      <p:sp>
+        <p:nvSpPr>
+          <p:cNvPr id="27" name="TextBox 26">
+            <a:extLst>
+              <a:ext uri="{FF2B5EF4-FFF2-40B4-BE49-F238E27FC236}">
+                <a16:creationId xmlns:a16="http://schemas.microsoft.com/office/drawing/2014/main" id="{69DC1238-EB0D-C7D5-29FC-96E28CD19024}"/>
+              </a:ext>
+            </a:extLst>
+          </p:cNvPr>
+          <p:cNvSpPr txBox="1"/>
+          <p:nvPr/>
+        </p:nvSpPr>
+        <p:spPr>
+          <a:xfrm>
+            <a:off x="1581122" y="35167609"/>
+            <a:ext cx="11898904" cy="707886"/>
+          </a:xfrm>
+          <a:prstGeom prst="rect">
+            <a:avLst/>
+          </a:prstGeom>
+          <a:noFill/>
+        </p:spPr>
+        <p:txBody>
+          <a:bodyPr wrap="square" rtlCol="0">
+            <a:spAutoFit/>
+          </a:bodyPr>
+          <a:lstStyle/>
+          <a:p>
+            <a:r>
+              <a:rPr lang="en-US" sz="4000" dirty="0"/>
+              <a:t>I need to be written</a:t>
+            </a:r>
+            <a:r>
+              <a:rPr lang="en-US" sz="4000" dirty="0">
+                <a:sym typeface="Wingdings" panose="05000000000000000000" pitchFamily="2" charset="2"/>
+              </a:rPr>
+              <a:t></a:t>
+            </a:r>
+            <a:endParaRPr lang="en-NL" sz="4000" dirty="0"/>
+          </a:p>
+        </p:txBody>
+      </p:sp>
+      <p:sp>
+        <p:nvSpPr>
+          <p:cNvPr id="29" name="TextBox 28">
+            <a:extLst>
+              <a:ext uri="{FF2B5EF4-FFF2-40B4-BE49-F238E27FC236}">
+                <a16:creationId xmlns:a16="http://schemas.microsoft.com/office/drawing/2014/main" id="{079F492F-F6C6-929D-855D-07D237F5C7F3}"/>
+              </a:ext>
+            </a:extLst>
+          </p:cNvPr>
+          <p:cNvSpPr txBox="1"/>
+          <p:nvPr/>
+        </p:nvSpPr>
+        <p:spPr>
+          <a:xfrm>
+            <a:off x="1444434" y="38558788"/>
+            <a:ext cx="6607277" cy="923330"/>
+          </a:xfrm>
+          <a:prstGeom prst="rect">
+            <a:avLst/>
+          </a:prstGeom>
+          <a:noFill/>
+        </p:spPr>
+        <p:txBody>
+          <a:bodyPr wrap="square" rtlCol="0">
+            <a:spAutoFit/>
+          </a:bodyPr>
+          <a:lstStyle/>
+          <a:p>
+            <a:r>
+              <a:rPr lang="en-US" sz="5400" b="1"/>
+              <a:t>References</a:t>
+            </a:r>
+            <a:endParaRPr lang="en-NL" sz="5400" b="1" dirty="0"/>
+          </a:p>
+        </p:txBody>
+      </p:sp>
+      <p:sp>
+        <p:nvSpPr>
+          <p:cNvPr id="30" name="TextBox 29">
+            <a:extLst>
+              <a:ext uri="{FF2B5EF4-FFF2-40B4-BE49-F238E27FC236}">
+                <a16:creationId xmlns:a16="http://schemas.microsoft.com/office/drawing/2014/main" id="{06D7D6FF-D3E2-C821-9B87-5E021566DEEE}"/>
+              </a:ext>
+            </a:extLst>
+          </p:cNvPr>
+          <p:cNvSpPr txBox="1"/>
+          <p:nvPr/>
+        </p:nvSpPr>
+        <p:spPr>
+          <a:xfrm>
+            <a:off x="1444434" y="39482118"/>
+            <a:ext cx="11898904" cy="707886"/>
+          </a:xfrm>
+          <a:prstGeom prst="rect">
+            <a:avLst/>
+          </a:prstGeom>
+          <a:noFill/>
+        </p:spPr>
+        <p:txBody>
+          <a:bodyPr wrap="square" rtlCol="0">
+            <a:spAutoFit/>
+          </a:bodyPr>
+          <a:lstStyle/>
+          <a:p>
+            <a:r>
+              <a:rPr lang="en-US" sz="4000" dirty="0"/>
+              <a:t>I need to be written</a:t>
+            </a:r>
+            <a:r>
+              <a:rPr lang="en-US" sz="4000" dirty="0">
+                <a:sym typeface="Wingdings" panose="05000000000000000000" pitchFamily="2" charset="2"/>
+              </a:rPr>
+              <a:t></a:t>
+            </a:r>
+            <a:endParaRPr lang="en-NL" sz="4000" dirty="0"/>
+          </a:p>
+        </p:txBody>
+      </p:sp>
     </p:spTree>
     <p:extLst>
       <p:ext uri="{BB962C8B-B14F-4D97-AF65-F5344CB8AC3E}">

</xml_diff>

<commit_message>
Made discussion and conclusion
</commit_message>
<xml_diff>
--- a/Poster/Poster.pptx
+++ b/Poster/Poster.pptx
@@ -115,7 +115,7 @@
 <file path=ppt/revisionInfo.xml><?xml version="1.0" encoding="utf-8"?>
 <p1510:revInfo xmlns:a="http://schemas.openxmlformats.org/drawingml/2006/main" xmlns:r="http://schemas.openxmlformats.org/officeDocument/2006/relationships" xmlns:p1510="http://schemas.microsoft.com/office/powerpoint/2015/10/main">
   <p1510:revLst>
-    <p1510:client id="{5F09D76C-1841-4F58-94B1-5AE3681891B6}" v="882" dt="2023-06-22T11:00:25.590"/>
+    <p1510:client id="{5F09D76C-1841-4F58-94B1-5AE3681891B6}" v="1186" dt="2023-06-22T12:27:20.619"/>
   </p1510:revLst>
 </p1510:revInfo>
 </file>
@@ -149,18 +149,18 @@
   <pc:docChgLst>
     <pc:chgData name="Emils Zegers" userId="bd5cf22c-0e97-44c0-acad-9bc9915da531" providerId="ADAL" clId="{5F09D76C-1841-4F58-94B1-5AE3681891B6}"/>
     <pc:docChg chg="undo custSel modSld">
-      <pc:chgData name="Emils Zegers" userId="bd5cf22c-0e97-44c0-acad-9bc9915da531" providerId="ADAL" clId="{5F09D76C-1841-4F58-94B1-5AE3681891B6}" dt="2023-06-22T11:00:33.229" v="1568" actId="20577"/>
+      <pc:chgData name="Emils Zegers" userId="bd5cf22c-0e97-44c0-acad-9bc9915da531" providerId="ADAL" clId="{5F09D76C-1841-4F58-94B1-5AE3681891B6}" dt="2023-06-22T12:35:06.237" v="2962" actId="20577"/>
       <pc:docMkLst>
         <pc:docMk/>
       </pc:docMkLst>
       <pc:sldChg chg="addSp delSp modSp mod setBg">
-        <pc:chgData name="Emils Zegers" userId="bd5cf22c-0e97-44c0-acad-9bc9915da531" providerId="ADAL" clId="{5F09D76C-1841-4F58-94B1-5AE3681891B6}" dt="2023-06-22T11:00:33.229" v="1568" actId="20577"/>
+        <pc:chgData name="Emils Zegers" userId="bd5cf22c-0e97-44c0-acad-9bc9915da531" providerId="ADAL" clId="{5F09D76C-1841-4F58-94B1-5AE3681891B6}" dt="2023-06-22T12:35:06.237" v="2962" actId="20577"/>
         <pc:sldMkLst>
           <pc:docMk/>
           <pc:sldMk cId="605312590" sldId="256"/>
         </pc:sldMkLst>
         <pc:spChg chg="mod">
-          <ac:chgData name="Emils Zegers" userId="bd5cf22c-0e97-44c0-acad-9bc9915da531" providerId="ADAL" clId="{5F09D76C-1841-4F58-94B1-5AE3681891B6}" dt="2023-06-22T09:35:48.844" v="804" actId="1076"/>
+          <ac:chgData name="Emils Zegers" userId="bd5cf22c-0e97-44c0-acad-9bc9915da531" providerId="ADAL" clId="{5F09D76C-1841-4F58-94B1-5AE3681891B6}" dt="2023-06-22T11:52:00.448" v="2249" actId="2711"/>
           <ac:spMkLst>
             <pc:docMk/>
             <pc:sldMk cId="605312590" sldId="256"/>
@@ -199,16 +199,16 @@
             <ac:spMk id="5" creationId="{77A154C7-5854-948F-FC94-B824696B59C3}"/>
           </ac:spMkLst>
         </pc:spChg>
-        <pc:spChg chg="add mod topLvl">
-          <ac:chgData name="Emils Zegers" userId="bd5cf22c-0e97-44c0-acad-9bc9915da531" providerId="ADAL" clId="{5F09D76C-1841-4F58-94B1-5AE3681891B6}" dt="2023-06-22T10:46:29.177" v="1332" actId="1076"/>
+        <pc:spChg chg="add del mod topLvl">
+          <ac:chgData name="Emils Zegers" userId="bd5cf22c-0e97-44c0-acad-9bc9915da531" providerId="ADAL" clId="{5F09D76C-1841-4F58-94B1-5AE3681891B6}" dt="2023-06-22T11:01:57.193" v="1569" actId="478"/>
           <ac:spMkLst>
             <pc:docMk/>
             <pc:sldMk cId="605312590" sldId="256"/>
             <ac:spMk id="6" creationId="{AAE5DBEA-BF18-E3D2-6A0A-B7D3DDDC6955}"/>
           </ac:spMkLst>
         </pc:spChg>
-        <pc:spChg chg="add mod topLvl">
-          <ac:chgData name="Emils Zegers" userId="bd5cf22c-0e97-44c0-acad-9bc9915da531" providerId="ADAL" clId="{5F09D76C-1841-4F58-94B1-5AE3681891B6}" dt="2023-06-22T10:46:33.234" v="1333" actId="1076"/>
+        <pc:spChg chg="add del mod topLvl">
+          <ac:chgData name="Emils Zegers" userId="bd5cf22c-0e97-44c0-acad-9bc9915da531" providerId="ADAL" clId="{5F09D76C-1841-4F58-94B1-5AE3681891B6}" dt="2023-06-22T11:01:57.193" v="1569" actId="478"/>
           <ac:spMkLst>
             <pc:docMk/>
             <pc:sldMk cId="605312590" sldId="256"/>
@@ -224,23 +224,31 @@
           </ac:spMkLst>
         </pc:spChg>
         <pc:spChg chg="add mod">
-          <ac:chgData name="Emils Zegers" userId="bd5cf22c-0e97-44c0-acad-9bc9915da531" providerId="ADAL" clId="{5F09D76C-1841-4F58-94B1-5AE3681891B6}" dt="2023-06-22T10:58:18.310" v="1454" actId="123"/>
+          <ac:chgData name="Emils Zegers" userId="bd5cf22c-0e97-44c0-acad-9bc9915da531" providerId="ADAL" clId="{5F09D76C-1841-4F58-94B1-5AE3681891B6}" dt="2023-06-22T12:35:06.237" v="2962" actId="20577"/>
+          <ac:spMkLst>
+            <pc:docMk/>
+            <pc:sldMk cId="605312590" sldId="256"/>
+            <ac:spMk id="10" creationId="{93D495C6-9A4B-A40E-70AD-18D5E7855D68}"/>
+          </ac:spMkLst>
+        </pc:spChg>
+        <pc:spChg chg="add mod">
+          <ac:chgData name="Emils Zegers" userId="bd5cf22c-0e97-44c0-acad-9bc9915da531" providerId="ADAL" clId="{5F09D76C-1841-4F58-94B1-5AE3681891B6}" dt="2023-06-22T11:51:46.992" v="2247" actId="2711"/>
           <ac:spMkLst>
             <pc:docMk/>
             <pc:sldMk cId="605312590" sldId="256"/>
             <ac:spMk id="11" creationId="{82B0777B-A2FF-B860-C5E1-B1EF9ADF1C0A}"/>
           </ac:spMkLst>
         </pc:spChg>
-        <pc:spChg chg="mod topLvl">
-          <ac:chgData name="Emils Zegers" userId="bd5cf22c-0e97-44c0-acad-9bc9915da531" providerId="ADAL" clId="{5F09D76C-1841-4F58-94B1-5AE3681891B6}" dt="2023-06-22T10:46:01.790" v="1327" actId="165"/>
+        <pc:spChg chg="del mod topLvl">
+          <ac:chgData name="Emils Zegers" userId="bd5cf22c-0e97-44c0-acad-9bc9915da531" providerId="ADAL" clId="{5F09D76C-1841-4F58-94B1-5AE3681891B6}" dt="2023-06-22T11:01:57.193" v="1569" actId="478"/>
           <ac:spMkLst>
             <pc:docMk/>
             <pc:sldMk cId="605312590" sldId="256"/>
             <ac:spMk id="14" creationId="{73B8A3AB-D86D-F61D-6ACE-55657C174108}"/>
           </ac:spMkLst>
         </pc:spChg>
-        <pc:spChg chg="mod topLvl">
-          <ac:chgData name="Emils Zegers" userId="bd5cf22c-0e97-44c0-acad-9bc9915da531" providerId="ADAL" clId="{5F09D76C-1841-4F58-94B1-5AE3681891B6}" dt="2023-06-22T10:46:01.790" v="1327" actId="165"/>
+        <pc:spChg chg="del mod topLvl">
+          <ac:chgData name="Emils Zegers" userId="bd5cf22c-0e97-44c0-acad-9bc9915da531" providerId="ADAL" clId="{5F09D76C-1841-4F58-94B1-5AE3681891B6}" dt="2023-06-22T11:01:57.193" v="1569" actId="478"/>
           <ac:spMkLst>
             <pc:docMk/>
             <pc:sldMk cId="605312590" sldId="256"/>
@@ -256,7 +264,7 @@
           </ac:spMkLst>
         </pc:spChg>
         <pc:spChg chg="add mod ord">
-          <ac:chgData name="Emils Zegers" userId="bd5cf22c-0e97-44c0-acad-9bc9915da531" providerId="ADAL" clId="{5F09D76C-1841-4F58-94B1-5AE3681891B6}" dt="2023-06-22T10:58:24.926" v="1456" actId="123"/>
+          <ac:chgData name="Emils Zegers" userId="bd5cf22c-0e97-44c0-acad-9bc9915da531" providerId="ADAL" clId="{5F09D76C-1841-4F58-94B1-5AE3681891B6}" dt="2023-06-22T11:51:54.146" v="2248" actId="2711"/>
           <ac:spMkLst>
             <pc:docMk/>
             <pc:sldMk cId="605312590" sldId="256"/>
@@ -272,7 +280,7 @@
           </ac:spMkLst>
         </pc:spChg>
         <pc:spChg chg="add mod topLvl">
-          <ac:chgData name="Emils Zegers" userId="bd5cf22c-0e97-44c0-acad-9bc9915da531" providerId="ADAL" clId="{5F09D76C-1841-4F58-94B1-5AE3681891B6}" dt="2023-06-22T10:52:30.649" v="1337" actId="1076"/>
+          <ac:chgData name="Emils Zegers" userId="bd5cf22c-0e97-44c0-acad-9bc9915da531" providerId="ADAL" clId="{5F09D76C-1841-4F58-94B1-5AE3681891B6}" dt="2023-06-22T11:47:01.059" v="2246" actId="14100"/>
           <ac:spMkLst>
             <pc:docMk/>
             <pc:sldMk cId="605312590" sldId="256"/>
@@ -280,7 +288,7 @@
           </ac:spMkLst>
         </pc:spChg>
         <pc:spChg chg="add mod">
-          <ac:chgData name="Emils Zegers" userId="bd5cf22c-0e97-44c0-acad-9bc9915da531" providerId="ADAL" clId="{5F09D76C-1841-4F58-94B1-5AE3681891B6}" dt="2023-06-22T10:57:27.513" v="1443" actId="1076"/>
+          <ac:chgData name="Emils Zegers" userId="bd5cf22c-0e97-44c0-acad-9bc9915da531" providerId="ADAL" clId="{5F09D76C-1841-4F58-94B1-5AE3681891B6}" dt="2023-06-22T11:52:25.614" v="2253" actId="2711"/>
           <ac:spMkLst>
             <pc:docMk/>
             <pc:sldMk cId="605312590" sldId="256"/>
@@ -288,7 +296,7 @@
           </ac:spMkLst>
         </pc:spChg>
         <pc:spChg chg="add mod">
-          <ac:chgData name="Emils Zegers" userId="bd5cf22c-0e97-44c0-acad-9bc9915da531" providerId="ADAL" clId="{5F09D76C-1841-4F58-94B1-5AE3681891B6}" dt="2023-06-22T10:59:11.508" v="1480" actId="20577"/>
+          <ac:chgData name="Emils Zegers" userId="bd5cf22c-0e97-44c0-acad-9bc9915da531" providerId="ADAL" clId="{5F09D76C-1841-4F58-94B1-5AE3681891B6}" dt="2023-06-22T11:52:20.850" v="2252" actId="2711"/>
           <ac:spMkLst>
             <pc:docMk/>
             <pc:sldMk cId="605312590" sldId="256"/>
@@ -296,7 +304,7 @@
           </ac:spMkLst>
         </pc:spChg>
         <pc:spChg chg="add mod">
-          <ac:chgData name="Emils Zegers" userId="bd5cf22c-0e97-44c0-acad-9bc9915da531" providerId="ADAL" clId="{5F09D76C-1841-4F58-94B1-5AE3681891B6}" dt="2023-06-22T10:59:35.463" v="1520" actId="5793"/>
+          <ac:chgData name="Emils Zegers" userId="bd5cf22c-0e97-44c0-acad-9bc9915da531" providerId="ADAL" clId="{5F09D76C-1841-4F58-94B1-5AE3681891B6}" dt="2023-06-22T11:57:28.933" v="2277" actId="20577"/>
           <ac:spMkLst>
             <pc:docMk/>
             <pc:sldMk cId="605312590" sldId="256"/>
@@ -312,15 +320,15 @@
           </ac:spMkLst>
         </pc:spChg>
         <pc:spChg chg="add mod">
-          <ac:chgData name="Emils Zegers" userId="bd5cf22c-0e97-44c0-acad-9bc9915da531" providerId="ADAL" clId="{5F09D76C-1841-4F58-94B1-5AE3681891B6}" dt="2023-06-22T11:00:15.708" v="1544" actId="20577"/>
+          <ac:chgData name="Emils Zegers" userId="bd5cf22c-0e97-44c0-acad-9bc9915da531" providerId="ADAL" clId="{5F09D76C-1841-4F58-94B1-5AE3681891B6}" dt="2023-06-22T12:03:44.282" v="2703" actId="1076"/>
           <ac:spMkLst>
             <pc:docMk/>
             <pc:sldMk cId="605312590" sldId="256"/>
             <ac:spMk id="26" creationId="{34648C32-1B5B-84D7-78EB-DE232346049C}"/>
           </ac:spMkLst>
         </pc:spChg>
-        <pc:spChg chg="add mod">
-          <ac:chgData name="Emils Zegers" userId="bd5cf22c-0e97-44c0-acad-9bc9915da531" providerId="ADAL" clId="{5F09D76C-1841-4F58-94B1-5AE3681891B6}" dt="2023-06-22T11:00:10.904" v="1524" actId="1076"/>
+        <pc:spChg chg="add del mod">
+          <ac:chgData name="Emils Zegers" userId="bd5cf22c-0e97-44c0-acad-9bc9915da531" providerId="ADAL" clId="{5F09D76C-1841-4F58-94B1-5AE3681891B6}" dt="2023-06-22T11:45:50.460" v="2239"/>
           <ac:spMkLst>
             <pc:docMk/>
             <pc:sldMk cId="605312590" sldId="256"/>
@@ -336,7 +344,7 @@
           </ac:spMkLst>
         </pc:spChg>
         <pc:spChg chg="add mod">
-          <ac:chgData name="Emils Zegers" userId="bd5cf22c-0e97-44c0-acad-9bc9915da531" providerId="ADAL" clId="{5F09D76C-1841-4F58-94B1-5AE3681891B6}" dt="2023-06-22T11:00:33.229" v="1568" actId="20577"/>
+          <ac:chgData name="Emils Zegers" userId="bd5cf22c-0e97-44c0-acad-9bc9915da531" providerId="ADAL" clId="{5F09D76C-1841-4F58-94B1-5AE3681891B6}" dt="2023-06-22T12:04:04.741" v="2707" actId="1076"/>
           <ac:spMkLst>
             <pc:docMk/>
             <pc:sldMk cId="605312590" sldId="256"/>
@@ -344,7 +352,7 @@
           </ac:spMkLst>
         </pc:spChg>
         <pc:spChg chg="add mod">
-          <ac:chgData name="Emils Zegers" userId="bd5cf22c-0e97-44c0-acad-9bc9915da531" providerId="ADAL" clId="{5F09D76C-1841-4F58-94B1-5AE3681891B6}" dt="2023-06-22T11:00:27.964" v="1548" actId="1076"/>
+          <ac:chgData name="Emils Zegers" userId="bd5cf22c-0e97-44c0-acad-9bc9915da531" providerId="ADAL" clId="{5F09D76C-1841-4F58-94B1-5AE3681891B6}" dt="2023-06-22T12:04:01.256" v="2706" actId="1076"/>
           <ac:spMkLst>
             <pc:docMk/>
             <pc:sldMk cId="605312590" sldId="256"/>
@@ -392,6 +400,14 @@
           </ac:grpSpMkLst>
         </pc:grpChg>
         <pc:picChg chg="add del mod">
+          <ac:chgData name="Emils Zegers" userId="bd5cf22c-0e97-44c0-acad-9bc9915da531" providerId="ADAL" clId="{5F09D76C-1841-4F58-94B1-5AE3681891B6}" dt="2023-06-22T11:09:05.328" v="1573"/>
+          <ac:picMkLst>
+            <pc:docMk/>
+            <pc:sldMk cId="605312590" sldId="256"/>
+            <ac:picMk id="4" creationId="{537B20C0-A524-026A-E871-5611C5506E7C}"/>
+          </ac:picMkLst>
+        </pc:picChg>
+        <pc:picChg chg="add del mod">
           <ac:chgData name="Emils Zegers" userId="bd5cf22c-0e97-44c0-acad-9bc9915da531" providerId="ADAL" clId="{5F09D76C-1841-4F58-94B1-5AE3681891B6}" dt="2023-06-22T10:35:15.729" v="835" actId="478"/>
           <ac:picMkLst>
             <pc:docMk/>
@@ -408,7 +424,7 @@
           </ac:picMkLst>
         </pc:picChg>
         <pc:picChg chg="add mod ord">
-          <ac:chgData name="Emils Zegers" userId="bd5cf22c-0e97-44c0-acad-9bc9915da531" providerId="ADAL" clId="{5F09D76C-1841-4F58-94B1-5AE3681891B6}" dt="2023-06-22T10:58:00.040" v="1449" actId="167"/>
+          <ac:chgData name="Emils Zegers" userId="bd5cf22c-0e97-44c0-acad-9bc9915da531" providerId="ADAL" clId="{5F09D76C-1841-4F58-94B1-5AE3681891B6}" dt="2023-06-22T11:52:52.450" v="2254" actId="1076"/>
           <ac:picMkLst>
             <pc:docMk/>
             <pc:sldMk cId="605312590" sldId="256"/>
@@ -424,6 +440,14 @@
           </ac:picMkLst>
         </pc:picChg>
         <pc:picChg chg="add del mod">
+          <ac:chgData name="Emils Zegers" userId="bd5cf22c-0e97-44c0-acad-9bc9915da531" providerId="ADAL" clId="{5F09D76C-1841-4F58-94B1-5AE3681891B6}" dt="2023-06-22T11:11:23.636" v="1591"/>
+          <ac:picMkLst>
+            <pc:docMk/>
+            <pc:sldMk cId="605312590" sldId="256"/>
+            <ac:picMk id="9" creationId="{E644B97B-9F2C-49F9-578C-D614E2A26570}"/>
+          </ac:picMkLst>
+        </pc:picChg>
+        <pc:picChg chg="add del mod">
           <ac:chgData name="Emils Zegers" userId="bd5cf22c-0e97-44c0-acad-9bc9915da531" providerId="ADAL" clId="{5F09D76C-1841-4F58-94B1-5AE3681891B6}" dt="2023-06-22T07:43:29.986" v="55" actId="478"/>
           <ac:picMkLst>
             <pc:docMk/>
@@ -439,8 +463,8 @@
             <ac:picMk id="12" creationId="{E792BA31-DCDF-BA17-C848-2EC3708A4542}"/>
           </ac:picMkLst>
         </pc:picChg>
-        <pc:picChg chg="add mod modCrop">
-          <ac:chgData name="Emils Zegers" userId="bd5cf22c-0e97-44c0-acad-9bc9915da531" providerId="ADAL" clId="{5F09D76C-1841-4F58-94B1-5AE3681891B6}" dt="2023-06-22T10:55:38.298" v="1384" actId="1076"/>
+        <pc:picChg chg="add del mod ord modCrop">
+          <ac:chgData name="Emils Zegers" userId="bd5cf22c-0e97-44c0-acad-9bc9915da531" providerId="ADAL" clId="{5F09D76C-1841-4F58-94B1-5AE3681891B6}" dt="2023-06-22T12:12:40.457" v="2708" actId="478"/>
           <ac:picMkLst>
             <pc:docMk/>
             <pc:sldMk cId="605312590" sldId="256"/>
@@ -479,6 +503,14 @@
             <ac:picMk id="19" creationId="{4C319455-BE5E-D6A1-1891-8CA0C1AEFFFD}"/>
           </ac:picMkLst>
         </pc:picChg>
+        <pc:picChg chg="add mod">
+          <ac:chgData name="Emils Zegers" userId="bd5cf22c-0e97-44c0-acad-9bc9915da531" providerId="ADAL" clId="{5F09D76C-1841-4F58-94B1-5AE3681891B6}" dt="2023-06-22T12:12:57.021" v="2712" actId="1076"/>
+          <ac:picMkLst>
+            <pc:docMk/>
+            <pc:sldMk cId="605312590" sldId="256"/>
+            <ac:picMk id="20" creationId="{624BF128-476F-0770-6368-65A761DD7DC9}"/>
+          </ac:picMkLst>
+        </pc:picChg>
         <pc:picChg chg="add del mod">
           <ac:chgData name="Emils Zegers" userId="bd5cf22c-0e97-44c0-acad-9bc9915da531" providerId="ADAL" clId="{5F09D76C-1841-4F58-94B1-5AE3681891B6}" dt="2023-06-22T07:54:18.396" v="101" actId="478"/>
           <ac:picMkLst>
@@ -487,12 +519,20 @@
             <ac:picMk id="21" creationId="{0C2C2998-CE4B-C8EC-EA0A-40889C447CAE}"/>
           </ac:picMkLst>
         </pc:picChg>
+        <pc:picChg chg="add del mod">
+          <ac:chgData name="Emils Zegers" userId="bd5cf22c-0e97-44c0-acad-9bc9915da531" providerId="ADAL" clId="{5F09D76C-1841-4F58-94B1-5AE3681891B6}" dt="2023-06-22T12:13:10.257" v="2713" actId="478"/>
+          <ac:picMkLst>
+            <pc:docMk/>
+            <pc:sldMk cId="605312590" sldId="256"/>
+            <ac:picMk id="23" creationId="{098999BF-B894-6B99-397A-E1BB84087883}"/>
+          </ac:picMkLst>
+        </pc:picChg>
         <pc:picChg chg="add mod">
-          <ac:chgData name="Emils Zegers" userId="bd5cf22c-0e97-44c0-acad-9bc9915da531" providerId="ADAL" clId="{5F09D76C-1841-4F58-94B1-5AE3681891B6}" dt="2023-06-22T10:55:40.568" v="1385" actId="1076"/>
+          <ac:chgData name="Emils Zegers" userId="bd5cf22c-0e97-44c0-acad-9bc9915da531" providerId="ADAL" clId="{5F09D76C-1841-4F58-94B1-5AE3681891B6}" dt="2023-06-22T12:13:22.343" v="2717" actId="1076"/>
           <ac:picMkLst>
             <pc:docMk/>
             <pc:sldMk cId="605312590" sldId="256"/>
-            <ac:picMk id="23" creationId="{098999BF-B894-6B99-397A-E1BB84087883}"/>
+            <ac:picMk id="28" creationId="{868855BE-6969-E2AD-AA61-4CF8B0857074}"/>
           </ac:picMkLst>
         </pc:picChg>
       </pc:sldChg>
@@ -3357,18 +3397,23 @@
               <a:schemeClr val="bg1"/>
             </a:gs>
             <a:gs pos="0">
-              <a:srgbClr val="FF9999">
-                <a:alpha val="50000"/>
+              <a:srgbClr val="FF0000">
+                <a:alpha val="48000"/>
               </a:srgbClr>
             </a:gs>
+            <a:gs pos="53000">
+              <a:schemeClr val="accent2">
+                <a:lumMod val="12000"/>
+                <a:lumOff val="88000"/>
+              </a:schemeClr>
+            </a:gs>
             <a:gs pos="100000">
-              <a:srgbClr val="FF9999">
-                <a:lumMod val="100000"/>
-                <a:alpha val="50000"/>
+              <a:srgbClr val="FF0000">
+                <a:alpha val="38000"/>
               </a:srgbClr>
             </a:gs>
           </a:gsLst>
-          <a:lin ang="6000000" scaled="0"/>
+          <a:lin ang="6120000" scaled="0"/>
           <a:tileRect/>
         </a:gradFill>
         <a:effectLst/>
@@ -3419,7 +3464,7 @@
         </p:blipFill>
         <p:spPr>
           <a:xfrm>
-            <a:off x="1444434" y="8587137"/>
+            <a:off x="1254810" y="7774193"/>
             <a:ext cx="13675709" cy="10226753"/>
           </a:xfrm>
           <a:prstGeom prst="rect">
@@ -3454,19 +3499,639 @@
           <a:lstStyle/>
           <a:p>
             <a:r>
-              <a:rPr lang="en-US" dirty="0"/>
+              <a:rPr lang="en-US" dirty="0">
+                <a:latin typeface="Arial" panose="020B0604020202020204" pitchFamily="34" charset="0"/>
+                <a:cs typeface="Arial" panose="020B0604020202020204" pitchFamily="34" charset="0"/>
+              </a:rPr>
               <a:t>Optical Feedback</a:t>
             </a:r>
-            <a:endParaRPr lang="en-NL" dirty="0"/>
+            <a:endParaRPr lang="en-NL" dirty="0">
+              <a:latin typeface="Arial" panose="020B0604020202020204" pitchFamily="34" charset="0"/>
+              <a:cs typeface="Arial" panose="020B0604020202020204" pitchFamily="34" charset="0"/>
+            </a:endParaRPr>
+          </a:p>
+        </p:txBody>
+      </p:sp>
+      <p:sp>
+        <p:nvSpPr>
+          <p:cNvPr id="11" name="TextBox 10">
+            <a:extLst>
+              <a:ext uri="{FF2B5EF4-FFF2-40B4-BE49-F238E27FC236}">
+                <a16:creationId xmlns:a16="http://schemas.microsoft.com/office/drawing/2014/main" id="{82B0777B-A2FF-B860-C5E1-B1EF9ADF1C0A}"/>
+              </a:ext>
+            </a:extLst>
+          </p:cNvPr>
+          <p:cNvSpPr txBox="1"/>
+          <p:nvPr/>
+        </p:nvSpPr>
+        <p:spPr>
+          <a:xfrm>
+            <a:off x="1627127" y="17414778"/>
+            <a:ext cx="13303392" cy="11787842"/>
+          </a:xfrm>
+          <a:prstGeom prst="rect">
+            <a:avLst/>
+          </a:prstGeom>
+          <a:noFill/>
+        </p:spPr>
+        <p:txBody>
+          <a:bodyPr wrap="square" rtlCol="0">
+            <a:spAutoFit/>
+          </a:bodyPr>
+          <a:lstStyle/>
+          <a:p>
+            <a:pPr algn="just"/>
+            <a:r>
+              <a:rPr lang="en-GB" sz="4000" dirty="0">
+                <a:latin typeface="Arial" panose="020B0604020202020204" pitchFamily="34" charset="0"/>
+                <a:cs typeface="Arial" panose="020B0604020202020204" pitchFamily="34" charset="0"/>
+              </a:rPr>
+              <a:t>The ECDL made use of a Littman-Metcalf (</a:t>
+            </a:r>
+            <a:r>
+              <a:rPr lang="en-GB" sz="4000" dirty="0" err="1">
+                <a:latin typeface="Arial" panose="020B0604020202020204" pitchFamily="34" charset="0"/>
+                <a:cs typeface="Arial" panose="020B0604020202020204" pitchFamily="34" charset="0"/>
+              </a:rPr>
+              <a:t>laat</a:t>
+            </a:r>
+            <a:r>
+              <a:rPr lang="en-GB" sz="4000" dirty="0">
+                <a:latin typeface="Arial" panose="020B0604020202020204" pitchFamily="34" charset="0"/>
+                <a:cs typeface="Arial" panose="020B0604020202020204" pitchFamily="34" charset="0"/>
+              </a:rPr>
+              <a:t> </a:t>
+            </a:r>
+            <a:r>
+              <a:rPr lang="en-GB" sz="4000" dirty="0" err="1">
+                <a:latin typeface="Arial" panose="020B0604020202020204" pitchFamily="34" charset="0"/>
+                <a:cs typeface="Arial" panose="020B0604020202020204" pitchFamily="34" charset="0"/>
+              </a:rPr>
+              <a:t>figuur</a:t>
+            </a:r>
+            <a:r>
+              <a:rPr lang="en-GB" sz="4000" dirty="0">
+                <a:latin typeface="Arial" panose="020B0604020202020204" pitchFamily="34" charset="0"/>
+                <a:cs typeface="Arial" panose="020B0604020202020204" pitchFamily="34" charset="0"/>
+              </a:rPr>
+              <a:t> </a:t>
+            </a:r>
+            <a:r>
+              <a:rPr lang="en-GB" sz="4000" dirty="0" err="1">
+                <a:latin typeface="Arial" panose="020B0604020202020204" pitchFamily="34" charset="0"/>
+                <a:cs typeface="Arial" panose="020B0604020202020204" pitchFamily="34" charset="0"/>
+              </a:rPr>
+              <a:t>zien</a:t>
+            </a:r>
+            <a:r>
+              <a:rPr lang="en-GB" sz="4000" dirty="0">
+                <a:latin typeface="Arial" panose="020B0604020202020204" pitchFamily="34" charset="0"/>
+                <a:cs typeface="Arial" panose="020B0604020202020204" pitchFamily="34" charset="0"/>
+              </a:rPr>
+              <a:t>) configuration, where a mirror mounted on a rotation stage selects which wavelengths are being feedbacked into the diode laser. </a:t>
+            </a:r>
+          </a:p>
+          <a:p>
+            <a:pPr algn="just"/>
+            <a:r>
+              <a:rPr lang="en-GB" sz="4000" dirty="0">
+                <a:latin typeface="Arial" panose="020B0604020202020204" pitchFamily="34" charset="0"/>
+                <a:cs typeface="Arial" panose="020B0604020202020204" pitchFamily="34" charset="0"/>
+              </a:rPr>
+              <a:t>The beam of a diode laser is pointed into a reflection grating, which separates the various component wavelengths of the beam. The first order diffraction is directed into a mirror mounted on a high-precision rotation stage, which reflects a certain wavelength back into the grating and subsequently into the diode laser, providing optical feedback. By adjusting the angle on the rotation stage, we select which wavelength is providing optical feedback. The zeroth order diffraction is used as the output for our ECDL after being directed into an optical fibre.</a:t>
+            </a:r>
+          </a:p>
+          <a:p>
+            <a:pPr algn="just"/>
+            <a:r>
+              <a:rPr lang="en-GB" sz="4000" dirty="0">
+                <a:latin typeface="Arial" panose="020B0604020202020204" pitchFamily="34" charset="0"/>
+                <a:cs typeface="Arial" panose="020B0604020202020204" pitchFamily="34" charset="0"/>
+              </a:rPr>
+              <a:t>That zeroth order diffraction of the ECDL was put into a spectrometer to measure the wavelength range and the effect optical feedback has on the wavelength that the diode laser emits.</a:t>
+            </a:r>
+          </a:p>
+        </p:txBody>
+      </p:sp>
+      <p:sp>
+        <p:nvSpPr>
+          <p:cNvPr id="19" name="TextBox 18">
+            <a:extLst>
+              <a:ext uri="{FF2B5EF4-FFF2-40B4-BE49-F238E27FC236}">
+                <a16:creationId xmlns:a16="http://schemas.microsoft.com/office/drawing/2014/main" id="{5EA47C9F-0453-69C3-157F-6AB057DA5D76}"/>
+              </a:ext>
+            </a:extLst>
+          </p:cNvPr>
+          <p:cNvSpPr txBox="1"/>
+          <p:nvPr/>
+        </p:nvSpPr>
+        <p:spPr>
+          <a:xfrm>
+            <a:off x="1581123" y="4884958"/>
+            <a:ext cx="13728648" cy="4405735"/>
+          </a:xfrm>
+          <a:prstGeom prst="rect">
+            <a:avLst/>
+          </a:prstGeom>
+          <a:noFill/>
+        </p:spPr>
+        <p:txBody>
+          <a:bodyPr wrap="square" rtlCol="0">
+            <a:spAutoFit/>
+          </a:bodyPr>
+          <a:lstStyle/>
+          <a:p>
+            <a:pPr algn="just"/>
+            <a:r>
+              <a:rPr lang="en-GB" sz="4000" b="0" i="0" u="none" strike="noStrike" dirty="0">
+                <a:solidFill>
+                  <a:srgbClr val="000000"/>
+                </a:solidFill>
+                <a:effectLst/>
+                <a:latin typeface="Arial" panose="020B0604020202020204" pitchFamily="34" charset="0"/>
+              </a:rPr>
+              <a:t>For this project we built our own external cavity diode laser (ECDL) and Czerny-Turner Spectrometer, to measure the effects that optical feedback has on the output of a diode laser. The output of the ECDL was used as an input for the spectrometer, which visualized our results using an oscilloscope and a CCD we programmed.</a:t>
+            </a:r>
+            <a:endParaRPr lang="en-NL" sz="4000" dirty="0"/>
+          </a:p>
+          <a:p>
+            <a:pPr algn="just"/>
+            <a:endParaRPr lang="en-NL" sz="4000" dirty="0"/>
+          </a:p>
+        </p:txBody>
+      </p:sp>
+      <p:sp>
+        <p:nvSpPr>
+          <p:cNvPr id="16" name="TextBox 15">
+            <a:extLst>
+              <a:ext uri="{FF2B5EF4-FFF2-40B4-BE49-F238E27FC236}">
+                <a16:creationId xmlns:a16="http://schemas.microsoft.com/office/drawing/2014/main" id="{71943113-C3FB-E68C-3559-3E941114FFB1}"/>
+              </a:ext>
+            </a:extLst>
+          </p:cNvPr>
+          <p:cNvSpPr txBox="1"/>
+          <p:nvPr/>
+        </p:nvSpPr>
+        <p:spPr>
+          <a:xfrm>
+            <a:off x="1581123" y="4088053"/>
+            <a:ext cx="6607277" cy="923330"/>
+          </a:xfrm>
+          <a:prstGeom prst="rect">
+            <a:avLst/>
+          </a:prstGeom>
+          <a:noFill/>
+        </p:spPr>
+        <p:txBody>
+          <a:bodyPr wrap="square" rtlCol="0">
+            <a:spAutoFit/>
+          </a:bodyPr>
+          <a:lstStyle/>
+          <a:p>
+            <a:r>
+              <a:rPr lang="en-US" sz="5400" b="1" dirty="0"/>
+              <a:t>Introduction</a:t>
+            </a:r>
+            <a:endParaRPr lang="en-NL" sz="5400" b="1" dirty="0"/>
+          </a:p>
+        </p:txBody>
+      </p:sp>
+      <p:sp>
+        <p:nvSpPr>
+          <p:cNvPr id="17" name="TextBox 16">
+            <a:extLst>
+              <a:ext uri="{FF2B5EF4-FFF2-40B4-BE49-F238E27FC236}">
+                <a16:creationId xmlns:a16="http://schemas.microsoft.com/office/drawing/2014/main" id="{0E29FBC8-C102-7BAF-D6A6-070BDC02B058}"/>
+              </a:ext>
+            </a:extLst>
+          </p:cNvPr>
+          <p:cNvSpPr txBox="1"/>
+          <p:nvPr/>
+        </p:nvSpPr>
+        <p:spPr>
+          <a:xfrm>
+            <a:off x="17660508" y="5011383"/>
+            <a:ext cx="12267343" cy="11787842"/>
+          </a:xfrm>
+          <a:prstGeom prst="rect">
+            <a:avLst/>
+          </a:prstGeom>
+          <a:noFill/>
+        </p:spPr>
+        <p:txBody>
+          <a:bodyPr wrap="square" rtlCol="0">
+            <a:spAutoFit/>
+          </a:bodyPr>
+          <a:lstStyle/>
+          <a:p>
+            <a:pPr algn="just"/>
+            <a:r>
+              <a:rPr lang="en-GB" sz="4000" b="0" i="0" u="none" strike="noStrike" dirty="0">
+                <a:solidFill>
+                  <a:srgbClr val="000000"/>
+                </a:solidFill>
+                <a:effectLst/>
+                <a:latin typeface="Arial" panose="020B0604020202020204" pitchFamily="34" charset="0"/>
+                <a:cs typeface="Arial" panose="020B0604020202020204" pitchFamily="34" charset="0"/>
+              </a:rPr>
+              <a:t>A diode laser emits light by sending electrons through a semiconductor-type material. This material lets excited electrons deexcite through an energy gap making them emit light with the wavelength of the energy that’s around or higher than the energy gap.</a:t>
+            </a:r>
+          </a:p>
+          <a:p>
+            <a:pPr algn="just"/>
+            <a:r>
+              <a:rPr lang="en-GB" sz="4000" b="0" i="0" u="none" strike="noStrike" dirty="0">
+                <a:solidFill>
+                  <a:srgbClr val="000000"/>
+                </a:solidFill>
+                <a:effectLst/>
+                <a:latin typeface="Arial" panose="020B0604020202020204" pitchFamily="34" charset="0"/>
+                <a:cs typeface="Arial" panose="020B0604020202020204" pitchFamily="34" charset="0"/>
+              </a:rPr>
+              <a:t>Light can influence the semiconductor-type material. </a:t>
+            </a:r>
+          </a:p>
+          <a:p>
+            <a:pPr algn="just"/>
+            <a:r>
+              <a:rPr lang="en-GB" sz="4000" b="0" i="0" u="none" strike="noStrike" dirty="0">
+                <a:solidFill>
+                  <a:srgbClr val="000000"/>
+                </a:solidFill>
+                <a:effectLst/>
+                <a:latin typeface="Arial" panose="020B0604020202020204" pitchFamily="34" charset="0"/>
+                <a:cs typeface="Arial" panose="020B0604020202020204" pitchFamily="34" charset="0"/>
+              </a:rPr>
+              <a:t>When a photon with more energy than the bandgap hits the semiconductor, the electrons act like a harmonic oscillator, making the emission a stimulated emission. This causes the diode to send out more light but with roughly the same wavelength as the incoming light. </a:t>
+            </a:r>
+          </a:p>
+          <a:p>
+            <a:pPr algn="just"/>
+            <a:endParaRPr lang="en-GB" sz="4000" b="0" i="0" u="none" strike="noStrike" dirty="0">
+              <a:solidFill>
+                <a:srgbClr val="000000"/>
+              </a:solidFill>
+              <a:effectLst/>
+              <a:latin typeface="Arial" panose="020B0604020202020204" pitchFamily="34" charset="0"/>
+              <a:cs typeface="Arial" panose="020B0604020202020204" pitchFamily="34" charset="0"/>
+            </a:endParaRPr>
+          </a:p>
+          <a:p>
+            <a:pPr algn="just"/>
+            <a:r>
+              <a:rPr lang="en-GB" sz="4000" dirty="0">
+                <a:latin typeface="Arial" panose="020B0604020202020204" pitchFamily="34" charset="0"/>
+                <a:cs typeface="Arial" panose="020B0604020202020204" pitchFamily="34" charset="0"/>
+              </a:rPr>
+              <a:t>This experiment measures how the optical feedback changes the output of the diode laser. According to the theory, we expect that the diode laser with feedback will have a narrower wavelength and will require less voltage to power because of the harmonic oscillation of the electrons.</a:t>
+            </a:r>
+            <a:endParaRPr lang="en-NL" sz="4000" dirty="0">
+              <a:latin typeface="Arial" panose="020B0604020202020204" pitchFamily="34" charset="0"/>
+              <a:cs typeface="Arial" panose="020B0604020202020204" pitchFamily="34" charset="0"/>
+            </a:endParaRPr>
+          </a:p>
+        </p:txBody>
+      </p:sp>
+      <p:sp>
+        <p:nvSpPr>
+          <p:cNvPr id="18" name="TextBox 17">
+            <a:extLst>
+              <a:ext uri="{FF2B5EF4-FFF2-40B4-BE49-F238E27FC236}">
+                <a16:creationId xmlns:a16="http://schemas.microsoft.com/office/drawing/2014/main" id="{23F4374A-D1AB-AC16-3EDD-BDAA660FAC95}"/>
+              </a:ext>
+            </a:extLst>
+          </p:cNvPr>
+          <p:cNvSpPr txBox="1"/>
+          <p:nvPr/>
+        </p:nvSpPr>
+        <p:spPr>
+          <a:xfrm>
+            <a:off x="17660508" y="4088053"/>
+            <a:ext cx="6607277" cy="923330"/>
+          </a:xfrm>
+          <a:prstGeom prst="rect">
+            <a:avLst/>
+          </a:prstGeom>
+          <a:noFill/>
+        </p:spPr>
+        <p:txBody>
+          <a:bodyPr wrap="square" rtlCol="0">
+            <a:spAutoFit/>
+          </a:bodyPr>
+          <a:lstStyle/>
+          <a:p>
+            <a:r>
+              <a:rPr lang="en-US" sz="5400" b="1" dirty="0"/>
+              <a:t>Expectation</a:t>
+            </a:r>
+            <a:endParaRPr lang="en-NL" sz="5400" b="1" dirty="0"/>
+          </a:p>
+        </p:txBody>
+      </p:sp>
+      <p:sp>
+        <p:nvSpPr>
+          <p:cNvPr id="21" name="TextBox 20">
+            <a:extLst>
+              <a:ext uri="{FF2B5EF4-FFF2-40B4-BE49-F238E27FC236}">
+                <a16:creationId xmlns:a16="http://schemas.microsoft.com/office/drawing/2014/main" id="{63D33713-FA70-0926-2288-F6BB18F431A9}"/>
+              </a:ext>
+            </a:extLst>
+          </p:cNvPr>
+          <p:cNvSpPr txBox="1"/>
+          <p:nvPr/>
+        </p:nvSpPr>
+        <p:spPr>
+          <a:xfrm>
+            <a:off x="1581123" y="8836122"/>
+            <a:ext cx="6607277" cy="923330"/>
+          </a:xfrm>
+          <a:prstGeom prst="rect">
+            <a:avLst/>
+          </a:prstGeom>
+          <a:noFill/>
+        </p:spPr>
+        <p:txBody>
+          <a:bodyPr wrap="square" rtlCol="0">
+            <a:spAutoFit/>
+          </a:bodyPr>
+          <a:lstStyle/>
+          <a:p>
+            <a:r>
+              <a:rPr lang="en-US" sz="5400" b="1" dirty="0">
+                <a:latin typeface="Arial" panose="020B0604020202020204" pitchFamily="34" charset="0"/>
+                <a:cs typeface="Arial" panose="020B0604020202020204" pitchFamily="34" charset="0"/>
+              </a:rPr>
+              <a:t>Methodology</a:t>
+            </a:r>
+            <a:endParaRPr lang="en-NL" sz="5400" b="1" dirty="0">
+              <a:latin typeface="Arial" panose="020B0604020202020204" pitchFamily="34" charset="0"/>
+              <a:cs typeface="Arial" panose="020B0604020202020204" pitchFamily="34" charset="0"/>
+            </a:endParaRPr>
+          </a:p>
+        </p:txBody>
+      </p:sp>
+      <p:sp>
+        <p:nvSpPr>
+          <p:cNvPr id="22" name="TextBox 21">
+            <a:extLst>
+              <a:ext uri="{FF2B5EF4-FFF2-40B4-BE49-F238E27FC236}">
+                <a16:creationId xmlns:a16="http://schemas.microsoft.com/office/drawing/2014/main" id="{31544DDD-4DBB-76CF-C7E7-2828C0580963}"/>
+              </a:ext>
+            </a:extLst>
+          </p:cNvPr>
+          <p:cNvSpPr txBox="1"/>
+          <p:nvPr/>
+        </p:nvSpPr>
+        <p:spPr>
+          <a:xfrm>
+            <a:off x="1581122" y="29040282"/>
+            <a:ext cx="6607277" cy="923330"/>
+          </a:xfrm>
+          <a:prstGeom prst="rect">
+            <a:avLst/>
+          </a:prstGeom>
+          <a:noFill/>
+        </p:spPr>
+        <p:txBody>
+          <a:bodyPr wrap="square" rtlCol="0">
+            <a:spAutoFit/>
+          </a:bodyPr>
+          <a:lstStyle/>
+          <a:p>
+            <a:r>
+              <a:rPr lang="en-US" sz="5400" b="1" dirty="0">
+                <a:latin typeface="Arial" panose="020B0604020202020204" pitchFamily="34" charset="0"/>
+                <a:cs typeface="Arial" panose="020B0604020202020204" pitchFamily="34" charset="0"/>
+              </a:rPr>
+              <a:t>Conclusion</a:t>
+            </a:r>
+            <a:endParaRPr lang="en-NL" sz="5400" b="1" dirty="0">
+              <a:latin typeface="Arial" panose="020B0604020202020204" pitchFamily="34" charset="0"/>
+              <a:cs typeface="Arial" panose="020B0604020202020204" pitchFamily="34" charset="0"/>
+            </a:endParaRPr>
+          </a:p>
+        </p:txBody>
+      </p:sp>
+      <p:sp>
+        <p:nvSpPr>
+          <p:cNvPr id="24" name="TextBox 23">
+            <a:extLst>
+              <a:ext uri="{FF2B5EF4-FFF2-40B4-BE49-F238E27FC236}">
+                <a16:creationId xmlns:a16="http://schemas.microsoft.com/office/drawing/2014/main" id="{37F2954F-601B-7628-AF3C-623E467FC958}"/>
+              </a:ext>
+            </a:extLst>
+          </p:cNvPr>
+          <p:cNvSpPr txBox="1"/>
+          <p:nvPr/>
+        </p:nvSpPr>
+        <p:spPr>
+          <a:xfrm>
+            <a:off x="1581122" y="29963612"/>
+            <a:ext cx="11898904" cy="3785652"/>
+          </a:xfrm>
+          <a:prstGeom prst="rect">
+            <a:avLst/>
+          </a:prstGeom>
+          <a:noFill/>
+        </p:spPr>
+        <p:txBody>
+          <a:bodyPr wrap="square" rtlCol="0">
+            <a:spAutoFit/>
+          </a:bodyPr>
+          <a:lstStyle/>
+          <a:p>
+            <a:pPr algn="just"/>
+            <a:r>
+              <a:rPr lang="en-US" sz="4000" dirty="0">
+                <a:latin typeface="Arial" panose="020B0604020202020204" pitchFamily="34" charset="0"/>
+                <a:cs typeface="Arial" panose="020B0604020202020204" pitchFamily="34" charset="0"/>
+              </a:rPr>
+              <a:t>When optical feedback was being provided the spectrum of the laser peaked and shifted. This can be attributed to the different wavelengths that are being stimulated by the feedback. The wavelengths that were being selected can seen in the whole spectrum in figure 1 when the laser was lasing.</a:t>
+            </a:r>
+            <a:endParaRPr lang="en-NL" sz="4000" dirty="0">
+              <a:latin typeface="Arial" panose="020B0604020202020204" pitchFamily="34" charset="0"/>
+              <a:cs typeface="Arial" panose="020B0604020202020204" pitchFamily="34" charset="0"/>
+            </a:endParaRPr>
+          </a:p>
+        </p:txBody>
+      </p:sp>
+      <p:sp>
+        <p:nvSpPr>
+          <p:cNvPr id="26" name="TextBox 25">
+            <a:extLst>
+              <a:ext uri="{FF2B5EF4-FFF2-40B4-BE49-F238E27FC236}">
+                <a16:creationId xmlns:a16="http://schemas.microsoft.com/office/drawing/2014/main" id="{34648C32-1B5B-84D7-78EB-DE232346049C}"/>
+              </a:ext>
+            </a:extLst>
+          </p:cNvPr>
+          <p:cNvSpPr txBox="1"/>
+          <p:nvPr/>
+        </p:nvSpPr>
+        <p:spPr>
+          <a:xfrm>
+            <a:off x="1581121" y="33800143"/>
+            <a:ext cx="6607277" cy="923330"/>
+          </a:xfrm>
+          <a:prstGeom prst="rect">
+            <a:avLst/>
+          </a:prstGeom>
+          <a:noFill/>
+        </p:spPr>
+        <p:txBody>
+          <a:bodyPr wrap="square" rtlCol="0">
+            <a:spAutoFit/>
+          </a:bodyPr>
+          <a:lstStyle/>
+          <a:p>
+            <a:r>
+              <a:rPr lang="en-US" sz="5400" b="1" dirty="0"/>
+              <a:t>Discussion</a:t>
+            </a:r>
+            <a:endParaRPr lang="en-NL" sz="5400" b="1" dirty="0"/>
+          </a:p>
+        </p:txBody>
+      </p:sp>
+      <p:sp>
+        <p:nvSpPr>
+          <p:cNvPr id="29" name="TextBox 28">
+            <a:extLst>
+              <a:ext uri="{FF2B5EF4-FFF2-40B4-BE49-F238E27FC236}">
+                <a16:creationId xmlns:a16="http://schemas.microsoft.com/office/drawing/2014/main" id="{079F492F-F6C6-929D-855D-07D237F5C7F3}"/>
+              </a:ext>
+            </a:extLst>
+          </p:cNvPr>
+          <p:cNvSpPr txBox="1"/>
+          <p:nvPr/>
+        </p:nvSpPr>
+        <p:spPr>
+          <a:xfrm>
+            <a:off x="1444434" y="40079618"/>
+            <a:ext cx="6607277" cy="923330"/>
+          </a:xfrm>
+          <a:prstGeom prst="rect">
+            <a:avLst/>
+          </a:prstGeom>
+          <a:noFill/>
+        </p:spPr>
+        <p:txBody>
+          <a:bodyPr wrap="square" rtlCol="0">
+            <a:spAutoFit/>
+          </a:bodyPr>
+          <a:lstStyle/>
+          <a:p>
+            <a:r>
+              <a:rPr lang="en-US" sz="5400" b="1" dirty="0"/>
+              <a:t>References</a:t>
+            </a:r>
+            <a:endParaRPr lang="en-NL" sz="5400" b="1" dirty="0"/>
+          </a:p>
+        </p:txBody>
+      </p:sp>
+      <p:sp>
+        <p:nvSpPr>
+          <p:cNvPr id="30" name="TextBox 29">
+            <a:extLst>
+              <a:ext uri="{FF2B5EF4-FFF2-40B4-BE49-F238E27FC236}">
+                <a16:creationId xmlns:a16="http://schemas.microsoft.com/office/drawing/2014/main" id="{06D7D6FF-D3E2-C821-9B87-5E021566DEEE}"/>
+              </a:ext>
+            </a:extLst>
+          </p:cNvPr>
+          <p:cNvSpPr txBox="1"/>
+          <p:nvPr/>
+        </p:nvSpPr>
+        <p:spPr>
+          <a:xfrm>
+            <a:off x="1444434" y="41002948"/>
+            <a:ext cx="11898904" cy="707886"/>
+          </a:xfrm>
+          <a:prstGeom prst="rect">
+            <a:avLst/>
+          </a:prstGeom>
+          <a:noFill/>
+        </p:spPr>
+        <p:txBody>
+          <a:bodyPr wrap="square" rtlCol="0">
+            <a:spAutoFit/>
+          </a:bodyPr>
+          <a:lstStyle/>
+          <a:p>
+            <a:r>
+              <a:rPr lang="en-US" sz="4000" dirty="0"/>
+              <a:t>I need to be written</a:t>
+            </a:r>
+            <a:r>
+              <a:rPr lang="en-US" sz="4000" dirty="0">
+                <a:sym typeface="Wingdings" panose="05000000000000000000" pitchFamily="2" charset="2"/>
+              </a:rPr>
+              <a:t></a:t>
+            </a:r>
+            <a:endParaRPr lang="en-NL" sz="4000" dirty="0"/>
+          </a:p>
+        </p:txBody>
+      </p:sp>
+      <p:sp>
+        <p:nvSpPr>
+          <p:cNvPr id="10" name="TextBox 9">
+            <a:extLst>
+              <a:ext uri="{FF2B5EF4-FFF2-40B4-BE49-F238E27FC236}">
+                <a16:creationId xmlns:a16="http://schemas.microsoft.com/office/drawing/2014/main" id="{93D495C6-9A4B-A40E-70AD-18D5E7855D68}"/>
+              </a:ext>
+            </a:extLst>
+          </p:cNvPr>
+          <p:cNvSpPr txBox="1"/>
+          <p:nvPr/>
+        </p:nvSpPr>
+        <p:spPr>
+          <a:xfrm>
+            <a:off x="1581121" y="34694405"/>
+            <a:ext cx="11898904" cy="4401205"/>
+          </a:xfrm>
+          <a:prstGeom prst="rect">
+            <a:avLst/>
+          </a:prstGeom>
+          <a:noFill/>
+        </p:spPr>
+        <p:txBody>
+          <a:bodyPr wrap="square" rtlCol="0">
+            <a:spAutoFit/>
+          </a:bodyPr>
+          <a:lstStyle/>
+          <a:p>
+            <a:pPr algn="just"/>
+            <a:r>
+              <a:rPr lang="en-US" sz="4000" dirty="0">
+                <a:latin typeface="Arial" panose="020B0604020202020204" pitchFamily="34" charset="0"/>
+                <a:cs typeface="Arial" panose="020B0604020202020204" pitchFamily="34" charset="0"/>
+              </a:rPr>
+              <a:t>We had trouble calibrating the spectrometer due to the neon light not providing a clean spectrum. This caused our measurement wavelengths to have a large error on them. </a:t>
+            </a:r>
+            <a:r>
+              <a:rPr lang="en-US" sz="4000">
+                <a:latin typeface="Arial" panose="020B0604020202020204" pitchFamily="34" charset="0"/>
+                <a:cs typeface="Arial" panose="020B0604020202020204" pitchFamily="34" charset="0"/>
+              </a:rPr>
+              <a:t>We </a:t>
+            </a:r>
+            <a:r>
+              <a:rPr lang="en-US" sz="4000" dirty="0">
+                <a:latin typeface="Arial" panose="020B0604020202020204" pitchFamily="34" charset="0"/>
+                <a:cs typeface="Arial" panose="020B0604020202020204" pitchFamily="34" charset="0"/>
+              </a:rPr>
+              <a:t>attributed the many peaks of the diode laser to the cavity which is inside the laser itself. This cavity allows only the standing waves that fit in the cavity to be emitted.</a:t>
+            </a:r>
+            <a:endParaRPr lang="en-NL" sz="4000" dirty="0">
+              <a:latin typeface="Arial" panose="020B0604020202020204" pitchFamily="34" charset="0"/>
+              <a:cs typeface="Arial" panose="020B0604020202020204" pitchFamily="34" charset="0"/>
+            </a:endParaRPr>
           </a:p>
         </p:txBody>
       </p:sp>
       <p:pic>
         <p:nvPicPr>
-          <p:cNvPr id="23" name="Graphic 22">
+          <p:cNvPr id="20" name="Graphic 19">
             <a:extLst>
               <a:ext uri="{FF2B5EF4-FFF2-40B4-BE49-F238E27FC236}">
-                <a16:creationId xmlns:a16="http://schemas.microsoft.com/office/drawing/2014/main" id="{098999BF-B894-6B99-397A-E1BB84087883}"/>
+                <a16:creationId xmlns:a16="http://schemas.microsoft.com/office/drawing/2014/main" id="{624BF128-476F-0770-6368-65A761DD7DC9}"/>
               </a:ext>
             </a:extLst>
           </p:cNvPr>
@@ -3492,389 +4157,20 @@
         </p:blipFill>
         <p:spPr>
           <a:xfrm>
-            <a:off x="14761356" y="16499898"/>
-            <a:ext cx="15747722" cy="9947434"/>
+            <a:off x="15120142" y="26289835"/>
+            <a:ext cx="15747722" cy="15747722"/>
           </a:xfrm>
           <a:prstGeom prst="rect">
             <a:avLst/>
           </a:prstGeom>
         </p:spPr>
       </p:pic>
-      <p:sp>
-        <p:nvSpPr>
-          <p:cNvPr id="6" name="Rectangle: Rounded Corners 5">
+      <p:pic>
+        <p:nvPicPr>
+          <p:cNvPr id="28" name="Graphic 27">
             <a:extLst>
               <a:ext uri="{FF2B5EF4-FFF2-40B4-BE49-F238E27FC236}">
-                <a16:creationId xmlns:a16="http://schemas.microsoft.com/office/drawing/2014/main" id="{AAE5DBEA-BF18-E3D2-6A0A-B7D3DDDC6955}"/>
-              </a:ext>
-            </a:extLst>
-          </p:cNvPr>
-          <p:cNvSpPr/>
-          <p:nvPr/>
-        </p:nvSpPr>
-        <p:spPr>
-          <a:xfrm>
-            <a:off x="-23209096" y="16080947"/>
-            <a:ext cx="14624844" cy="10077450"/>
-          </a:xfrm>
-          <a:prstGeom prst="roundRect">
-            <a:avLst>
-              <a:gd name="adj" fmla="val 3203"/>
-            </a:avLst>
-          </a:prstGeom>
-          <a:solidFill>
-            <a:schemeClr val="bg1"/>
-          </a:solidFill>
-          <a:ln w="76200">
-            <a:solidFill>
-              <a:schemeClr val="tx1"/>
-            </a:solidFill>
-          </a:ln>
-        </p:spPr>
-        <p:style>
-          <a:lnRef idx="2">
-            <a:schemeClr val="accent1">
-              <a:shade val="50000"/>
-            </a:schemeClr>
-          </a:lnRef>
-          <a:fillRef idx="1">
-            <a:schemeClr val="accent1"/>
-          </a:fillRef>
-          <a:effectRef idx="0">
-            <a:schemeClr val="accent1"/>
-          </a:effectRef>
-          <a:fontRef idx="minor">
-            <a:schemeClr val="lt1"/>
-          </a:fontRef>
-        </p:style>
-        <p:txBody>
-          <a:bodyPr rtlCol="0" anchor="ctr"/>
-          <a:lstStyle/>
-          <a:p>
-            <a:pPr algn="ctr"/>
-            <a:endParaRPr lang="en-NL" dirty="0"/>
-          </a:p>
-        </p:txBody>
-      </p:sp>
-      <p:sp>
-        <p:nvSpPr>
-          <p:cNvPr id="8" name="Rectangle: Top Corners Rounded 7">
-            <a:extLst>
-              <a:ext uri="{FF2B5EF4-FFF2-40B4-BE49-F238E27FC236}">
-                <a16:creationId xmlns:a16="http://schemas.microsoft.com/office/drawing/2014/main" id="{F776A035-17DF-D142-9847-265199F0CBDB}"/>
-              </a:ext>
-            </a:extLst>
-          </p:cNvPr>
-          <p:cNvSpPr/>
-          <p:nvPr/>
-        </p:nvSpPr>
-        <p:spPr>
-          <a:xfrm>
-            <a:off x="-14223052" y="12876466"/>
-            <a:ext cx="5638800" cy="1634630"/>
-          </a:xfrm>
-          <a:prstGeom prst="round2SameRect">
-            <a:avLst/>
-          </a:prstGeom>
-          <a:solidFill>
-            <a:schemeClr val="bg1"/>
-          </a:solidFill>
-          <a:ln w="76200">
-            <a:solidFill>
-              <a:schemeClr val="tx1"/>
-            </a:solidFill>
-          </a:ln>
-        </p:spPr>
-        <p:style>
-          <a:lnRef idx="2">
-            <a:schemeClr val="accent1">
-              <a:shade val="50000"/>
-            </a:schemeClr>
-          </a:lnRef>
-          <a:fillRef idx="1">
-            <a:schemeClr val="accent1"/>
-          </a:fillRef>
-          <a:effectRef idx="0">
-            <a:schemeClr val="accent1"/>
-          </a:effectRef>
-          <a:fontRef idx="minor">
-            <a:schemeClr val="lt1"/>
-          </a:fontRef>
-        </p:style>
-        <p:txBody>
-          <a:bodyPr rtlCol="0" anchor="ctr"/>
-          <a:lstStyle/>
-          <a:p>
-            <a:pPr algn="ctr"/>
-            <a:r>
-              <a:rPr lang="en-US" sz="13800" dirty="0">
-                <a:solidFill>
-                  <a:schemeClr val="tx1"/>
-                </a:solidFill>
-              </a:rPr>
-              <a:t>Setup</a:t>
-            </a:r>
-            <a:endParaRPr lang="en-NL" sz="13800" dirty="0">
-              <a:solidFill>
-                <a:schemeClr val="tx1"/>
-              </a:solidFill>
-            </a:endParaRPr>
-          </a:p>
-        </p:txBody>
-      </p:sp>
-      <p:sp>
-        <p:nvSpPr>
-          <p:cNvPr id="11" name="TextBox 10">
-            <a:extLst>
-              <a:ext uri="{FF2B5EF4-FFF2-40B4-BE49-F238E27FC236}">
-                <a16:creationId xmlns:a16="http://schemas.microsoft.com/office/drawing/2014/main" id="{82B0777B-A2FF-B860-C5E1-B1EF9ADF1C0A}"/>
-              </a:ext>
-            </a:extLst>
-          </p:cNvPr>
-          <p:cNvSpPr txBox="1"/>
-          <p:nvPr/>
-        </p:nvSpPr>
-        <p:spPr>
-          <a:xfrm>
-            <a:off x="1627127" y="17414778"/>
-            <a:ext cx="13303392" cy="11172289"/>
-          </a:xfrm>
-          <a:prstGeom prst="rect">
-            <a:avLst/>
-          </a:prstGeom>
-          <a:noFill/>
-        </p:spPr>
-        <p:txBody>
-          <a:bodyPr wrap="square" rtlCol="0">
-            <a:spAutoFit/>
-          </a:bodyPr>
-          <a:lstStyle/>
-          <a:p>
-            <a:pPr algn="just"/>
-            <a:r>
-              <a:rPr lang="en-GB" sz="4000" dirty="0"/>
-              <a:t>The ECDL made use of a Littman-Metcalf (</a:t>
-            </a:r>
-            <a:r>
-              <a:rPr lang="en-GB" sz="4000" dirty="0" err="1"/>
-              <a:t>laat</a:t>
-            </a:r>
-            <a:r>
-              <a:rPr lang="en-GB" sz="4000" dirty="0"/>
-              <a:t> </a:t>
-            </a:r>
-            <a:r>
-              <a:rPr lang="en-GB" sz="4000" dirty="0" err="1"/>
-              <a:t>figuur</a:t>
-            </a:r>
-            <a:r>
-              <a:rPr lang="en-GB" sz="4000" dirty="0"/>
-              <a:t> </a:t>
-            </a:r>
-            <a:r>
-              <a:rPr lang="en-GB" sz="4000" dirty="0" err="1"/>
-              <a:t>zien</a:t>
-            </a:r>
-            <a:r>
-              <a:rPr lang="en-GB" sz="4000" dirty="0"/>
-              <a:t>) configuration, where a mirror mounted on a rotation stage selects which wavelengths are being feedbacked into the diode laser. </a:t>
-            </a:r>
-          </a:p>
-          <a:p>
-            <a:pPr algn="just"/>
-            <a:r>
-              <a:rPr lang="en-GB" sz="4000" dirty="0"/>
-              <a:t>The beam of a diode laser is pointed into a reflection grating, which separates the various component wavelengths of the beam. The first order diffraction is directed into a mirror mounted on a high-precision rotation stage, which reflects a certain wavelength back into the grating and subsequently into the diode laser, providing optical feedback. By adjusting the angle on the rotation stage, we select which wavelength is providing optical feedback. The zeroth order diffraction is used as the output for our ECDL after being directed into an optical fibre.</a:t>
-            </a:r>
-          </a:p>
-          <a:p>
-            <a:pPr algn="just"/>
-            <a:r>
-              <a:rPr lang="en-GB" sz="4000" dirty="0"/>
-              <a:t>That zeroth order diffraction of the ECDL was put into a spectrometer to measure the wavelength range and the effect optical feedback has on the wavelength that the diode laser emits.</a:t>
-            </a:r>
-          </a:p>
-        </p:txBody>
-      </p:sp>
-      <p:sp>
-        <p:nvSpPr>
-          <p:cNvPr id="15" name="Rectangle: Rounded Corners 14">
-            <a:extLst>
-              <a:ext uri="{FF2B5EF4-FFF2-40B4-BE49-F238E27FC236}">
-                <a16:creationId xmlns:a16="http://schemas.microsoft.com/office/drawing/2014/main" id="{A532EE8C-4283-E6F8-5C11-D477855E5280}"/>
-              </a:ext>
-            </a:extLst>
-          </p:cNvPr>
-          <p:cNvSpPr/>
-          <p:nvPr/>
-        </p:nvSpPr>
-        <p:spPr>
-          <a:xfrm>
-            <a:off x="-23209095" y="7898695"/>
-            <a:ext cx="14624844" cy="5042550"/>
-          </a:xfrm>
-          <a:prstGeom prst="roundRect">
-            <a:avLst>
-              <a:gd name="adj" fmla="val 6138"/>
-            </a:avLst>
-          </a:prstGeom>
-          <a:solidFill>
-            <a:schemeClr val="bg1"/>
-          </a:solidFill>
-          <a:ln w="76200">
-            <a:solidFill>
-              <a:schemeClr val="tx1"/>
-            </a:solidFill>
-          </a:ln>
-        </p:spPr>
-        <p:style>
-          <a:lnRef idx="2">
-            <a:schemeClr val="accent1">
-              <a:shade val="50000"/>
-            </a:schemeClr>
-          </a:lnRef>
-          <a:fillRef idx="1">
-            <a:schemeClr val="accent1"/>
-          </a:fillRef>
-          <a:effectRef idx="0">
-            <a:schemeClr val="accent1"/>
-          </a:effectRef>
-          <a:fontRef idx="minor">
-            <a:schemeClr val="lt1"/>
-          </a:fontRef>
-        </p:style>
-        <p:txBody>
-          <a:bodyPr rtlCol="0" anchor="ctr"/>
-          <a:lstStyle/>
-          <a:p>
-            <a:pPr algn="just"/>
-            <a:endParaRPr lang="en-NL" sz="4400" dirty="0">
-              <a:solidFill>
-                <a:schemeClr val="tx1"/>
-              </a:solidFill>
-            </a:endParaRPr>
-          </a:p>
-        </p:txBody>
-      </p:sp>
-      <p:sp>
-        <p:nvSpPr>
-          <p:cNvPr id="14" name="Rectangle: Top Corners Rounded 13">
-            <a:extLst>
-              <a:ext uri="{FF2B5EF4-FFF2-40B4-BE49-F238E27FC236}">
-                <a16:creationId xmlns:a16="http://schemas.microsoft.com/office/drawing/2014/main" id="{73B8A3AB-D86D-F61D-6ACE-55657C174108}"/>
-              </a:ext>
-            </a:extLst>
-          </p:cNvPr>
-          <p:cNvSpPr/>
-          <p:nvPr/>
-        </p:nvSpPr>
-        <p:spPr>
-          <a:xfrm>
-            <a:off x="-21428934" y="5169388"/>
-            <a:ext cx="11064521" cy="1634630"/>
-          </a:xfrm>
-          <a:prstGeom prst="round2SameRect">
-            <a:avLst/>
-          </a:prstGeom>
-          <a:solidFill>
-            <a:schemeClr val="bg1"/>
-          </a:solidFill>
-          <a:ln w="76200">
-            <a:solidFill>
-              <a:schemeClr val="tx1"/>
-            </a:solidFill>
-          </a:ln>
-        </p:spPr>
-        <p:style>
-          <a:lnRef idx="2">
-            <a:schemeClr val="accent1">
-              <a:shade val="50000"/>
-            </a:schemeClr>
-          </a:lnRef>
-          <a:fillRef idx="1">
-            <a:schemeClr val="accent1"/>
-          </a:fillRef>
-          <a:effectRef idx="0">
-            <a:schemeClr val="accent1"/>
-          </a:effectRef>
-          <a:fontRef idx="minor">
-            <a:schemeClr val="lt1"/>
-          </a:fontRef>
-        </p:style>
-        <p:txBody>
-          <a:bodyPr rtlCol="0" anchor="ctr"/>
-          <a:lstStyle/>
-          <a:p>
-            <a:pPr algn="ctr"/>
-            <a:r>
-              <a:rPr lang="en-US" sz="13800" dirty="0">
-                <a:solidFill>
-                  <a:schemeClr val="tx1"/>
-                </a:solidFill>
-              </a:rPr>
-              <a:t>Introduction</a:t>
-            </a:r>
-            <a:endParaRPr lang="en-NL" sz="13800" dirty="0">
-              <a:solidFill>
-                <a:schemeClr val="tx1"/>
-              </a:solidFill>
-            </a:endParaRPr>
-          </a:p>
-        </p:txBody>
-      </p:sp>
-      <p:sp>
-        <p:nvSpPr>
-          <p:cNvPr id="19" name="TextBox 18">
-            <a:extLst>
-              <a:ext uri="{FF2B5EF4-FFF2-40B4-BE49-F238E27FC236}">
-                <a16:creationId xmlns:a16="http://schemas.microsoft.com/office/drawing/2014/main" id="{5EA47C9F-0453-69C3-157F-6AB057DA5D76}"/>
-              </a:ext>
-            </a:extLst>
-          </p:cNvPr>
-          <p:cNvSpPr txBox="1"/>
-          <p:nvPr/>
-        </p:nvSpPr>
-        <p:spPr>
-          <a:xfrm>
-            <a:off x="1581123" y="4884958"/>
-            <a:ext cx="14234258" cy="4401205"/>
-          </a:xfrm>
-          <a:prstGeom prst="rect">
-            <a:avLst/>
-          </a:prstGeom>
-          <a:noFill/>
-        </p:spPr>
-        <p:txBody>
-          <a:bodyPr wrap="square" rtlCol="0">
-            <a:spAutoFit/>
-          </a:bodyPr>
-          <a:lstStyle/>
-          <a:p>
-            <a:pPr algn="just"/>
-            <a:r>
-              <a:rPr lang="en-GB" sz="4000" b="0" i="0" u="none" strike="noStrike" dirty="0">
-                <a:solidFill>
-                  <a:srgbClr val="000000"/>
-                </a:solidFill>
-                <a:effectLst/>
-                <a:latin typeface="Arial" panose="020B0604020202020204" pitchFamily="34" charset="0"/>
-              </a:rPr>
-              <a:t>For this project we built our own external cavity diode laser (ECDL) and Czerny-Turner Spectrometer, to measure the effects that optical feedback has on the output of a diode laser. The output of the ECDL was used as an input for the spectrometer, which visualized our results using an oscilloscope and a CCD we programmed.</a:t>
-            </a:r>
-            <a:endParaRPr lang="en-NL" sz="4000" dirty="0"/>
-          </a:p>
-          <a:p>
-            <a:pPr algn="just"/>
-            <a:endParaRPr lang="en-NL" sz="4000" dirty="0"/>
-          </a:p>
-        </p:txBody>
-      </p:sp>
-      <p:pic>
-        <p:nvPicPr>
-          <p:cNvPr id="13" name="Graphic 12">
-            <a:extLst>
-              <a:ext uri="{FF2B5EF4-FFF2-40B4-BE49-F238E27FC236}">
-                <a16:creationId xmlns:a16="http://schemas.microsoft.com/office/drawing/2014/main" id="{2363D4A2-65EB-8D1B-426F-3F6A8D121227}"/>
+                <a16:creationId xmlns:a16="http://schemas.microsoft.com/office/drawing/2014/main" id="{868855BE-6969-E2AD-AA61-4CF8B0857074}"/>
               </a:ext>
             </a:extLst>
           </p:cNvPr>
@@ -3883,7 +4179,7 @@
           </p:cNvPicPr>
           <p:nvPr/>
         </p:nvPicPr>
-        <p:blipFill rotWithShape="1">
+        <p:blipFill>
           <a:blip r:embed="rId6">
             <a:extLst>
               <a:ext uri="{28A0092B-C50C-407E-A947-70E740481C1C}">
@@ -3894,456 +4190,20 @@
               </a:ext>
             </a:extLst>
           </a:blip>
-          <a:srcRect l="5139" t="7953" r="6217" b="3588"/>
-          <a:stretch/>
+          <a:stretch>
+            <a:fillRect/>
+          </a:stretch>
         </p:blipFill>
         <p:spPr>
           <a:xfrm>
-            <a:off x="15511746" y="27161287"/>
-            <a:ext cx="14246943" cy="14217445"/>
+            <a:off x="16207144" y="17458415"/>
+            <a:ext cx="13573717" cy="8144230"/>
           </a:xfrm>
           <a:prstGeom prst="rect">
             <a:avLst/>
           </a:prstGeom>
         </p:spPr>
       </p:pic>
-      <p:sp>
-        <p:nvSpPr>
-          <p:cNvPr id="16" name="TextBox 15">
-            <a:extLst>
-              <a:ext uri="{FF2B5EF4-FFF2-40B4-BE49-F238E27FC236}">
-                <a16:creationId xmlns:a16="http://schemas.microsoft.com/office/drawing/2014/main" id="{71943113-C3FB-E68C-3559-3E941114FFB1}"/>
-              </a:ext>
-            </a:extLst>
-          </p:cNvPr>
-          <p:cNvSpPr txBox="1"/>
-          <p:nvPr/>
-        </p:nvSpPr>
-        <p:spPr>
-          <a:xfrm>
-            <a:off x="1581123" y="4088053"/>
-            <a:ext cx="6607277" cy="923330"/>
-          </a:xfrm>
-          <a:prstGeom prst="rect">
-            <a:avLst/>
-          </a:prstGeom>
-          <a:noFill/>
-        </p:spPr>
-        <p:txBody>
-          <a:bodyPr wrap="square" rtlCol="0">
-            <a:spAutoFit/>
-          </a:bodyPr>
-          <a:lstStyle/>
-          <a:p>
-            <a:r>
-              <a:rPr lang="en-US" sz="5400" b="1" dirty="0"/>
-              <a:t>Introduction</a:t>
-            </a:r>
-            <a:endParaRPr lang="en-NL" sz="5400" b="1" dirty="0"/>
-          </a:p>
-        </p:txBody>
-      </p:sp>
-      <p:sp>
-        <p:nvSpPr>
-          <p:cNvPr id="17" name="TextBox 16">
-            <a:extLst>
-              <a:ext uri="{FF2B5EF4-FFF2-40B4-BE49-F238E27FC236}">
-                <a16:creationId xmlns:a16="http://schemas.microsoft.com/office/drawing/2014/main" id="{0E29FBC8-C102-7BAF-D6A6-070BDC02B058}"/>
-              </a:ext>
-            </a:extLst>
-          </p:cNvPr>
-          <p:cNvSpPr txBox="1"/>
-          <p:nvPr/>
-        </p:nvSpPr>
-        <p:spPr>
-          <a:xfrm>
-            <a:off x="17660508" y="5011383"/>
-            <a:ext cx="12267343" cy="12403395"/>
-          </a:xfrm>
-          <a:prstGeom prst="rect">
-            <a:avLst/>
-          </a:prstGeom>
-          <a:noFill/>
-        </p:spPr>
-        <p:txBody>
-          <a:bodyPr wrap="square" rtlCol="0">
-            <a:spAutoFit/>
-          </a:bodyPr>
-          <a:lstStyle/>
-          <a:p>
-            <a:pPr algn="just"/>
-            <a:r>
-              <a:rPr lang="en-GB" sz="4000" b="0" i="0" u="none" strike="noStrike" dirty="0">
-                <a:solidFill>
-                  <a:srgbClr val="000000"/>
-                </a:solidFill>
-                <a:effectLst/>
-                <a:latin typeface="Arial" panose="020B0604020202020204" pitchFamily="34" charset="0"/>
-              </a:rPr>
-              <a:t>A diode laser emits light by sending electrons through a semiconductor-type material. This material lets excited electrons deexcite through an energy gap making them emit light with the wavelength of the energy that’s around or higher than the energy gap.</a:t>
-            </a:r>
-          </a:p>
-          <a:p>
-            <a:pPr algn="just"/>
-            <a:endParaRPr lang="en-GB" sz="4000" dirty="0">
-              <a:solidFill>
-                <a:srgbClr val="000000"/>
-              </a:solidFill>
-              <a:latin typeface="Arial" panose="020B0604020202020204" pitchFamily="34" charset="0"/>
-            </a:endParaRPr>
-          </a:p>
-          <a:p>
-            <a:pPr algn="just"/>
-            <a:r>
-              <a:rPr lang="en-GB" sz="4000" b="0" i="0" u="none" strike="noStrike" dirty="0">
-                <a:solidFill>
-                  <a:srgbClr val="000000"/>
-                </a:solidFill>
-                <a:effectLst/>
-                <a:latin typeface="Arial" panose="020B0604020202020204" pitchFamily="34" charset="0"/>
-              </a:rPr>
-              <a:t>Light can influence the semiconductor-type material. </a:t>
-            </a:r>
-          </a:p>
-          <a:p>
-            <a:pPr algn="just"/>
-            <a:r>
-              <a:rPr lang="en-GB" sz="4000" b="0" i="0" u="none" strike="noStrike" dirty="0">
-                <a:solidFill>
-                  <a:srgbClr val="000000"/>
-                </a:solidFill>
-                <a:effectLst/>
-                <a:latin typeface="Arial" panose="020B0604020202020204" pitchFamily="34" charset="0"/>
-              </a:rPr>
-              <a:t>When a photon with more energy than the bandgap hits the semiconductor, the electrons act like a harmonic oscillator, making the emission a stimulated emission. This causes the diode to send out more light but with roughly the same wavelength as the incoming light.</a:t>
-            </a:r>
-          </a:p>
-          <a:p>
-            <a:pPr algn="just"/>
-            <a:endParaRPr lang="en-GB" sz="4000" b="0" i="0" u="none" strike="noStrike" dirty="0">
-              <a:solidFill>
-                <a:srgbClr val="000000"/>
-              </a:solidFill>
-              <a:effectLst/>
-              <a:latin typeface="Arial" panose="020B0604020202020204" pitchFamily="34" charset="0"/>
-            </a:endParaRPr>
-          </a:p>
-          <a:p>
-            <a:pPr algn="just"/>
-            <a:r>
-              <a:rPr lang="en-GB" sz="4000" dirty="0"/>
-              <a:t>This experiment measures how the optical feedback changes the output of the diode laser. According to the theory, we expect that the diode laser with feedback will have a narrower wavelength and will require less voltage to power because of the harmonic oscillation of the electrons.</a:t>
-            </a:r>
-            <a:endParaRPr lang="en-NL" sz="4000" dirty="0"/>
-          </a:p>
-        </p:txBody>
-      </p:sp>
-      <p:sp>
-        <p:nvSpPr>
-          <p:cNvPr id="18" name="TextBox 17">
-            <a:extLst>
-              <a:ext uri="{FF2B5EF4-FFF2-40B4-BE49-F238E27FC236}">
-                <a16:creationId xmlns:a16="http://schemas.microsoft.com/office/drawing/2014/main" id="{23F4374A-D1AB-AC16-3EDD-BDAA660FAC95}"/>
-              </a:ext>
-            </a:extLst>
-          </p:cNvPr>
-          <p:cNvSpPr txBox="1"/>
-          <p:nvPr/>
-        </p:nvSpPr>
-        <p:spPr>
-          <a:xfrm>
-            <a:off x="17660508" y="4088053"/>
-            <a:ext cx="6607277" cy="923330"/>
-          </a:xfrm>
-          <a:prstGeom prst="rect">
-            <a:avLst/>
-          </a:prstGeom>
-          <a:noFill/>
-        </p:spPr>
-        <p:txBody>
-          <a:bodyPr wrap="square" rtlCol="0">
-            <a:spAutoFit/>
-          </a:bodyPr>
-          <a:lstStyle/>
-          <a:p>
-            <a:r>
-              <a:rPr lang="en-US" sz="5400" b="1" dirty="0"/>
-              <a:t>Expectation</a:t>
-            </a:r>
-            <a:endParaRPr lang="en-NL" sz="5400" b="1" dirty="0"/>
-          </a:p>
-        </p:txBody>
-      </p:sp>
-      <p:sp>
-        <p:nvSpPr>
-          <p:cNvPr id="21" name="TextBox 20">
-            <a:extLst>
-              <a:ext uri="{FF2B5EF4-FFF2-40B4-BE49-F238E27FC236}">
-                <a16:creationId xmlns:a16="http://schemas.microsoft.com/office/drawing/2014/main" id="{63D33713-FA70-0926-2288-F6BB18F431A9}"/>
-              </a:ext>
-            </a:extLst>
-          </p:cNvPr>
-          <p:cNvSpPr txBox="1"/>
-          <p:nvPr/>
-        </p:nvSpPr>
-        <p:spPr>
-          <a:xfrm>
-            <a:off x="1581123" y="8836122"/>
-            <a:ext cx="6607277" cy="923330"/>
-          </a:xfrm>
-          <a:prstGeom prst="rect">
-            <a:avLst/>
-          </a:prstGeom>
-          <a:noFill/>
-        </p:spPr>
-        <p:txBody>
-          <a:bodyPr wrap="square" rtlCol="0">
-            <a:spAutoFit/>
-          </a:bodyPr>
-          <a:lstStyle/>
-          <a:p>
-            <a:r>
-              <a:rPr lang="en-US" sz="5400" b="1" dirty="0"/>
-              <a:t>Methodology</a:t>
-            </a:r>
-            <a:endParaRPr lang="en-NL" sz="5400" b="1" dirty="0"/>
-          </a:p>
-        </p:txBody>
-      </p:sp>
-      <p:sp>
-        <p:nvSpPr>
-          <p:cNvPr id="22" name="TextBox 21">
-            <a:extLst>
-              <a:ext uri="{FF2B5EF4-FFF2-40B4-BE49-F238E27FC236}">
-                <a16:creationId xmlns:a16="http://schemas.microsoft.com/office/drawing/2014/main" id="{31544DDD-4DBB-76CF-C7E7-2828C0580963}"/>
-              </a:ext>
-            </a:extLst>
-          </p:cNvPr>
-          <p:cNvSpPr txBox="1"/>
-          <p:nvPr/>
-        </p:nvSpPr>
-        <p:spPr>
-          <a:xfrm>
-            <a:off x="1581122" y="29040282"/>
-            <a:ext cx="6607277" cy="923330"/>
-          </a:xfrm>
-          <a:prstGeom prst="rect">
-            <a:avLst/>
-          </a:prstGeom>
-          <a:noFill/>
-        </p:spPr>
-        <p:txBody>
-          <a:bodyPr wrap="square" rtlCol="0">
-            <a:spAutoFit/>
-          </a:bodyPr>
-          <a:lstStyle/>
-          <a:p>
-            <a:r>
-              <a:rPr lang="en-US" sz="5400" b="1" dirty="0"/>
-              <a:t>Conclusion</a:t>
-            </a:r>
-            <a:endParaRPr lang="en-NL" sz="5400" b="1" dirty="0"/>
-          </a:p>
-        </p:txBody>
-      </p:sp>
-      <p:sp>
-        <p:nvSpPr>
-          <p:cNvPr id="24" name="TextBox 23">
-            <a:extLst>
-              <a:ext uri="{FF2B5EF4-FFF2-40B4-BE49-F238E27FC236}">
-                <a16:creationId xmlns:a16="http://schemas.microsoft.com/office/drawing/2014/main" id="{37F2954F-601B-7628-AF3C-623E467FC958}"/>
-              </a:ext>
-            </a:extLst>
-          </p:cNvPr>
-          <p:cNvSpPr txBox="1"/>
-          <p:nvPr/>
-        </p:nvSpPr>
-        <p:spPr>
-          <a:xfrm>
-            <a:off x="1581122" y="29963612"/>
-            <a:ext cx="11898904" cy="707886"/>
-          </a:xfrm>
-          <a:prstGeom prst="rect">
-            <a:avLst/>
-          </a:prstGeom>
-          <a:noFill/>
-        </p:spPr>
-        <p:txBody>
-          <a:bodyPr wrap="square" rtlCol="0">
-            <a:spAutoFit/>
-          </a:bodyPr>
-          <a:lstStyle/>
-          <a:p>
-            <a:r>
-              <a:rPr lang="en-US" sz="4000" dirty="0"/>
-              <a:t>I need to be written</a:t>
-            </a:r>
-            <a:r>
-              <a:rPr lang="en-US" sz="4000" dirty="0">
-                <a:sym typeface="Wingdings" panose="05000000000000000000" pitchFamily="2" charset="2"/>
-              </a:rPr>
-              <a:t></a:t>
-            </a:r>
-            <a:endParaRPr lang="en-NL" sz="4000" dirty="0"/>
-          </a:p>
-        </p:txBody>
-      </p:sp>
-      <p:sp>
-        <p:nvSpPr>
-          <p:cNvPr id="26" name="TextBox 25">
-            <a:extLst>
-              <a:ext uri="{FF2B5EF4-FFF2-40B4-BE49-F238E27FC236}">
-                <a16:creationId xmlns:a16="http://schemas.microsoft.com/office/drawing/2014/main" id="{34648C32-1B5B-84D7-78EB-DE232346049C}"/>
-              </a:ext>
-            </a:extLst>
-          </p:cNvPr>
-          <p:cNvSpPr txBox="1"/>
-          <p:nvPr/>
-        </p:nvSpPr>
-        <p:spPr>
-          <a:xfrm>
-            <a:off x="1581122" y="34244279"/>
-            <a:ext cx="6607277" cy="923330"/>
-          </a:xfrm>
-          <a:prstGeom prst="rect">
-            <a:avLst/>
-          </a:prstGeom>
-          <a:noFill/>
-        </p:spPr>
-        <p:txBody>
-          <a:bodyPr wrap="square" rtlCol="0">
-            <a:spAutoFit/>
-          </a:bodyPr>
-          <a:lstStyle/>
-          <a:p>
-            <a:r>
-              <a:rPr lang="en-US" sz="5400" b="1" dirty="0"/>
-              <a:t>Discussion</a:t>
-            </a:r>
-            <a:endParaRPr lang="en-NL" sz="5400" b="1" dirty="0"/>
-          </a:p>
-        </p:txBody>
-      </p:sp>
-      <p:sp>
-        <p:nvSpPr>
-          <p:cNvPr id="27" name="TextBox 26">
-            <a:extLst>
-              <a:ext uri="{FF2B5EF4-FFF2-40B4-BE49-F238E27FC236}">
-                <a16:creationId xmlns:a16="http://schemas.microsoft.com/office/drawing/2014/main" id="{69DC1238-EB0D-C7D5-29FC-96E28CD19024}"/>
-              </a:ext>
-            </a:extLst>
-          </p:cNvPr>
-          <p:cNvSpPr txBox="1"/>
-          <p:nvPr/>
-        </p:nvSpPr>
-        <p:spPr>
-          <a:xfrm>
-            <a:off x="1581122" y="35167609"/>
-            <a:ext cx="11898904" cy="707886"/>
-          </a:xfrm>
-          <a:prstGeom prst="rect">
-            <a:avLst/>
-          </a:prstGeom>
-          <a:noFill/>
-        </p:spPr>
-        <p:txBody>
-          <a:bodyPr wrap="square" rtlCol="0">
-            <a:spAutoFit/>
-          </a:bodyPr>
-          <a:lstStyle/>
-          <a:p>
-            <a:r>
-              <a:rPr lang="en-US" sz="4000" dirty="0"/>
-              <a:t>I need to be written</a:t>
-            </a:r>
-            <a:r>
-              <a:rPr lang="en-US" sz="4000" dirty="0">
-                <a:sym typeface="Wingdings" panose="05000000000000000000" pitchFamily="2" charset="2"/>
-              </a:rPr>
-              <a:t></a:t>
-            </a:r>
-            <a:endParaRPr lang="en-NL" sz="4000" dirty="0"/>
-          </a:p>
-        </p:txBody>
-      </p:sp>
-      <p:sp>
-        <p:nvSpPr>
-          <p:cNvPr id="29" name="TextBox 28">
-            <a:extLst>
-              <a:ext uri="{FF2B5EF4-FFF2-40B4-BE49-F238E27FC236}">
-                <a16:creationId xmlns:a16="http://schemas.microsoft.com/office/drawing/2014/main" id="{079F492F-F6C6-929D-855D-07D237F5C7F3}"/>
-              </a:ext>
-            </a:extLst>
-          </p:cNvPr>
-          <p:cNvSpPr txBox="1"/>
-          <p:nvPr/>
-        </p:nvSpPr>
-        <p:spPr>
-          <a:xfrm>
-            <a:off x="1444434" y="38558788"/>
-            <a:ext cx="6607277" cy="923330"/>
-          </a:xfrm>
-          <a:prstGeom prst="rect">
-            <a:avLst/>
-          </a:prstGeom>
-          <a:noFill/>
-        </p:spPr>
-        <p:txBody>
-          <a:bodyPr wrap="square" rtlCol="0">
-            <a:spAutoFit/>
-          </a:bodyPr>
-          <a:lstStyle/>
-          <a:p>
-            <a:r>
-              <a:rPr lang="en-US" sz="5400" b="1"/>
-              <a:t>References</a:t>
-            </a:r>
-            <a:endParaRPr lang="en-NL" sz="5400" b="1" dirty="0"/>
-          </a:p>
-        </p:txBody>
-      </p:sp>
-      <p:sp>
-        <p:nvSpPr>
-          <p:cNvPr id="30" name="TextBox 29">
-            <a:extLst>
-              <a:ext uri="{FF2B5EF4-FFF2-40B4-BE49-F238E27FC236}">
-                <a16:creationId xmlns:a16="http://schemas.microsoft.com/office/drawing/2014/main" id="{06D7D6FF-D3E2-C821-9B87-5E021566DEEE}"/>
-              </a:ext>
-            </a:extLst>
-          </p:cNvPr>
-          <p:cNvSpPr txBox="1"/>
-          <p:nvPr/>
-        </p:nvSpPr>
-        <p:spPr>
-          <a:xfrm>
-            <a:off x="1444434" y="39482118"/>
-            <a:ext cx="11898904" cy="707886"/>
-          </a:xfrm>
-          <a:prstGeom prst="rect">
-            <a:avLst/>
-          </a:prstGeom>
-          <a:noFill/>
-        </p:spPr>
-        <p:txBody>
-          <a:bodyPr wrap="square" rtlCol="0">
-            <a:spAutoFit/>
-          </a:bodyPr>
-          <a:lstStyle/>
-          <a:p>
-            <a:r>
-              <a:rPr lang="en-US" sz="4000" dirty="0"/>
-              <a:t>I need to be written</a:t>
-            </a:r>
-            <a:r>
-              <a:rPr lang="en-US" sz="4000" dirty="0">
-                <a:sym typeface="Wingdings" panose="05000000000000000000" pitchFamily="2" charset="2"/>
-              </a:rPr>
-              <a:t></a:t>
-            </a:r>
-            <a:endParaRPr lang="en-NL" sz="4000" dirty="0"/>
-          </a:p>
-        </p:txBody>
-      </p:sp>
     </p:spTree>
     <p:extLst>
       <p:ext uri="{BB962C8B-B14F-4D97-AF65-F5344CB8AC3E}">

</xml_diff>

<commit_message>
the most up to date version of the poster (13:14)
</commit_message>
<xml_diff>
--- a/Poster/Poster.pptx
+++ b/Poster/Poster.pptx
@@ -4,6 +4,9 @@
   <p:sldMasterIdLst>
     <p:sldMasterId id="2147483684" r:id="rId1"/>
   </p:sldMasterIdLst>
+  <p:notesMasterIdLst>
+    <p:notesMasterId r:id="rId3"/>
+  </p:notesMasterIdLst>
   <p:sldIdLst>
     <p:sldId id="256" r:id="rId2"/>
   </p:sldIdLst>
@@ -20763,6 +20766,440 @@
     </pc:docChg>
   </pc:docChgLst>
 </pc:chgInfo>
+</file>
+
+<file path=ppt/notesMasters/notesMaster1.xml><?xml version="1.0" encoding="utf-8"?>
+<p:notesMaster xmlns:a="http://schemas.openxmlformats.org/drawingml/2006/main" xmlns:r="http://schemas.openxmlformats.org/officeDocument/2006/relationships" xmlns:p="http://schemas.openxmlformats.org/presentationml/2006/main">
+  <p:cSld>
+    <p:bg>
+      <p:bgRef idx="1001">
+        <a:schemeClr val="bg1"/>
+      </p:bgRef>
+    </p:bg>
+    <p:spTree>
+      <p:nvGrpSpPr>
+        <p:cNvPr id="1" name=""/>
+        <p:cNvGrpSpPr/>
+        <p:nvPr/>
+      </p:nvGrpSpPr>
+      <p:grpSpPr>
+        <a:xfrm>
+          <a:off x="0" y="0"/>
+          <a:ext cx="0" cy="0"/>
+          <a:chOff x="0" y="0"/>
+          <a:chExt cx="0" cy="0"/>
+        </a:xfrm>
+      </p:grpSpPr>
+      <p:sp>
+        <p:nvSpPr>
+          <p:cNvPr id="2" name="Header Placeholder 1"/>
+          <p:cNvSpPr>
+            <a:spLocks noGrp="1"/>
+          </p:cNvSpPr>
+          <p:nvPr>
+            <p:ph type="hdr" sz="quarter"/>
+          </p:nvPr>
+        </p:nvSpPr>
+        <p:spPr>
+          <a:xfrm>
+            <a:off x="0" y="0"/>
+            <a:ext cx="2971800" cy="458788"/>
+          </a:xfrm>
+          <a:prstGeom prst="rect">
+            <a:avLst/>
+          </a:prstGeom>
+        </p:spPr>
+        <p:txBody>
+          <a:bodyPr vert="horz" lIns="91440" tIns="45720" rIns="91440" bIns="45720" rtlCol="0"/>
+          <a:lstStyle>
+            <a:lvl1pPr algn="l">
+              <a:defRPr sz="1200"/>
+            </a:lvl1pPr>
+          </a:lstStyle>
+          <a:p>
+            <a:endParaRPr lang="en-NL"/>
+          </a:p>
+        </p:txBody>
+      </p:sp>
+      <p:sp>
+        <p:nvSpPr>
+          <p:cNvPr id="3" name="Date Placeholder 2"/>
+          <p:cNvSpPr>
+            <a:spLocks noGrp="1"/>
+          </p:cNvSpPr>
+          <p:nvPr>
+            <p:ph type="dt" idx="1"/>
+          </p:nvPr>
+        </p:nvSpPr>
+        <p:spPr>
+          <a:xfrm>
+            <a:off x="3884613" y="0"/>
+            <a:ext cx="2971800" cy="458788"/>
+          </a:xfrm>
+          <a:prstGeom prst="rect">
+            <a:avLst/>
+          </a:prstGeom>
+        </p:spPr>
+        <p:txBody>
+          <a:bodyPr vert="horz" lIns="91440" tIns="45720" rIns="91440" bIns="45720" rtlCol="0"/>
+          <a:lstStyle>
+            <a:lvl1pPr algn="r">
+              <a:defRPr sz="1200"/>
+            </a:lvl1pPr>
+          </a:lstStyle>
+          <a:p>
+            <a:fld id="{1582A805-36BF-6C40-B799-13A4DF012BD0}" type="datetimeFigureOut">
+              <a:rPr lang="en-NL" smtClean="0"/>
+              <a:t>26/06/2023</a:t>
+            </a:fld>
+            <a:endParaRPr lang="en-NL"/>
+          </a:p>
+        </p:txBody>
+      </p:sp>
+      <p:sp>
+        <p:nvSpPr>
+          <p:cNvPr id="4" name="Slide Image Placeholder 3"/>
+          <p:cNvSpPr>
+            <a:spLocks noGrp="1" noRot="1" noChangeAspect="1"/>
+          </p:cNvSpPr>
+          <p:nvPr>
+            <p:ph type="sldImg" idx="2"/>
+          </p:nvPr>
+        </p:nvSpPr>
+        <p:spPr>
+          <a:xfrm>
+            <a:off x="2338388" y="1143000"/>
+            <a:ext cx="2181225" cy="3086100"/>
+          </a:xfrm>
+          <a:prstGeom prst="rect">
+            <a:avLst/>
+          </a:prstGeom>
+          <a:noFill/>
+          <a:ln w="12700">
+            <a:solidFill>
+              <a:prstClr val="black"/>
+            </a:solidFill>
+          </a:ln>
+        </p:spPr>
+        <p:txBody>
+          <a:bodyPr vert="horz" lIns="91440" tIns="45720" rIns="91440" bIns="45720" rtlCol="0" anchor="ctr"/>
+          <a:lstStyle/>
+          <a:p>
+            <a:endParaRPr lang="en-NL"/>
+          </a:p>
+        </p:txBody>
+      </p:sp>
+      <p:sp>
+        <p:nvSpPr>
+          <p:cNvPr id="5" name="Notes Placeholder 4"/>
+          <p:cNvSpPr>
+            <a:spLocks noGrp="1"/>
+          </p:cNvSpPr>
+          <p:nvPr>
+            <p:ph type="body" sz="quarter" idx="3"/>
+          </p:nvPr>
+        </p:nvSpPr>
+        <p:spPr>
+          <a:xfrm>
+            <a:off x="685800" y="4400550"/>
+            <a:ext cx="5486400" cy="3600450"/>
+          </a:xfrm>
+          <a:prstGeom prst="rect">
+            <a:avLst/>
+          </a:prstGeom>
+        </p:spPr>
+        <p:txBody>
+          <a:bodyPr vert="horz" lIns="91440" tIns="45720" rIns="91440" bIns="45720" rtlCol="0"/>
+          <a:lstStyle/>
+          <a:p>
+            <a:pPr lvl="0"/>
+            <a:r>
+              <a:rPr lang="en-GB"/>
+              <a:t>Click to edit Master text styles</a:t>
+            </a:r>
+          </a:p>
+          <a:p>
+            <a:pPr lvl="1"/>
+            <a:r>
+              <a:rPr lang="en-GB"/>
+              <a:t>Second level</a:t>
+            </a:r>
+          </a:p>
+          <a:p>
+            <a:pPr lvl="2"/>
+            <a:r>
+              <a:rPr lang="en-GB"/>
+              <a:t>Third level</a:t>
+            </a:r>
+          </a:p>
+          <a:p>
+            <a:pPr lvl="3"/>
+            <a:r>
+              <a:rPr lang="en-GB"/>
+              <a:t>Fourth level</a:t>
+            </a:r>
+          </a:p>
+          <a:p>
+            <a:pPr lvl="4"/>
+            <a:r>
+              <a:rPr lang="en-GB"/>
+              <a:t>Fifth level</a:t>
+            </a:r>
+            <a:endParaRPr lang="en-NL"/>
+          </a:p>
+        </p:txBody>
+      </p:sp>
+      <p:sp>
+        <p:nvSpPr>
+          <p:cNvPr id="6" name="Footer Placeholder 5"/>
+          <p:cNvSpPr>
+            <a:spLocks noGrp="1"/>
+          </p:cNvSpPr>
+          <p:nvPr>
+            <p:ph type="ftr" sz="quarter" idx="4"/>
+          </p:nvPr>
+        </p:nvSpPr>
+        <p:spPr>
+          <a:xfrm>
+            <a:off x="0" y="8685213"/>
+            <a:ext cx="2971800" cy="458787"/>
+          </a:xfrm>
+          <a:prstGeom prst="rect">
+            <a:avLst/>
+          </a:prstGeom>
+        </p:spPr>
+        <p:txBody>
+          <a:bodyPr vert="horz" lIns="91440" tIns="45720" rIns="91440" bIns="45720" rtlCol="0" anchor="b"/>
+          <a:lstStyle>
+            <a:lvl1pPr algn="l">
+              <a:defRPr sz="1200"/>
+            </a:lvl1pPr>
+          </a:lstStyle>
+          <a:p>
+            <a:endParaRPr lang="en-NL"/>
+          </a:p>
+        </p:txBody>
+      </p:sp>
+      <p:sp>
+        <p:nvSpPr>
+          <p:cNvPr id="7" name="Slide Number Placeholder 6"/>
+          <p:cNvSpPr>
+            <a:spLocks noGrp="1"/>
+          </p:cNvSpPr>
+          <p:nvPr>
+            <p:ph type="sldNum" sz="quarter" idx="5"/>
+          </p:nvPr>
+        </p:nvSpPr>
+        <p:spPr>
+          <a:xfrm>
+            <a:off x="3884613" y="8685213"/>
+            <a:ext cx="2971800" cy="458787"/>
+          </a:xfrm>
+          <a:prstGeom prst="rect">
+            <a:avLst/>
+          </a:prstGeom>
+        </p:spPr>
+        <p:txBody>
+          <a:bodyPr vert="horz" lIns="91440" tIns="45720" rIns="91440" bIns="45720" rtlCol="0" anchor="b"/>
+          <a:lstStyle>
+            <a:lvl1pPr algn="r">
+              <a:defRPr sz="1200"/>
+            </a:lvl1pPr>
+          </a:lstStyle>
+          <a:p>
+            <a:fld id="{A4813CE7-9BC2-AE46-B7A7-1FF6C6A7FDC7}" type="slidenum">
+              <a:rPr lang="en-NL" smtClean="0"/>
+              <a:t>‹#›</a:t>
+            </a:fld>
+            <a:endParaRPr lang="en-NL"/>
+          </a:p>
+        </p:txBody>
+      </p:sp>
+    </p:spTree>
+    <p:extLst>
+      <p:ext uri="{BB962C8B-B14F-4D97-AF65-F5344CB8AC3E}">
+        <p14:creationId xmlns:p14="http://schemas.microsoft.com/office/powerpoint/2010/main" val="2547857117"/>
+      </p:ext>
+    </p:extLst>
+  </p:cSld>
+  <p:clrMap bg1="lt1" tx1="dk1" bg2="lt2" tx2="dk2" accent1="accent1" accent2="accent2" accent3="accent3" accent4="accent4" accent5="accent5" accent6="accent6" hlink="hlink" folHlink="folHlink"/>
+  <p:notesStyle>
+    <a:lvl1pPr marL="0" algn="l" defTabSz="914400" rtl="0" eaLnBrk="1" latinLnBrk="0" hangingPunct="1">
+      <a:defRPr sz="1200" kern="1200">
+        <a:solidFill>
+          <a:schemeClr val="tx1"/>
+        </a:solidFill>
+        <a:latin typeface="+mn-lt"/>
+        <a:ea typeface="+mn-ea"/>
+        <a:cs typeface="+mn-cs"/>
+      </a:defRPr>
+    </a:lvl1pPr>
+    <a:lvl2pPr marL="457200" algn="l" defTabSz="914400" rtl="0" eaLnBrk="1" latinLnBrk="0" hangingPunct="1">
+      <a:defRPr sz="1200" kern="1200">
+        <a:solidFill>
+          <a:schemeClr val="tx1"/>
+        </a:solidFill>
+        <a:latin typeface="+mn-lt"/>
+        <a:ea typeface="+mn-ea"/>
+        <a:cs typeface="+mn-cs"/>
+      </a:defRPr>
+    </a:lvl2pPr>
+    <a:lvl3pPr marL="914400" algn="l" defTabSz="914400" rtl="0" eaLnBrk="1" latinLnBrk="0" hangingPunct="1">
+      <a:defRPr sz="1200" kern="1200">
+        <a:solidFill>
+          <a:schemeClr val="tx1"/>
+        </a:solidFill>
+        <a:latin typeface="+mn-lt"/>
+        <a:ea typeface="+mn-ea"/>
+        <a:cs typeface="+mn-cs"/>
+      </a:defRPr>
+    </a:lvl3pPr>
+    <a:lvl4pPr marL="1371600" algn="l" defTabSz="914400" rtl="0" eaLnBrk="1" latinLnBrk="0" hangingPunct="1">
+      <a:defRPr sz="1200" kern="1200">
+        <a:solidFill>
+          <a:schemeClr val="tx1"/>
+        </a:solidFill>
+        <a:latin typeface="+mn-lt"/>
+        <a:ea typeface="+mn-ea"/>
+        <a:cs typeface="+mn-cs"/>
+      </a:defRPr>
+    </a:lvl4pPr>
+    <a:lvl5pPr marL="1828800" algn="l" defTabSz="914400" rtl="0" eaLnBrk="1" latinLnBrk="0" hangingPunct="1">
+      <a:defRPr sz="1200" kern="1200">
+        <a:solidFill>
+          <a:schemeClr val="tx1"/>
+        </a:solidFill>
+        <a:latin typeface="+mn-lt"/>
+        <a:ea typeface="+mn-ea"/>
+        <a:cs typeface="+mn-cs"/>
+      </a:defRPr>
+    </a:lvl5pPr>
+    <a:lvl6pPr marL="2286000" algn="l" defTabSz="914400" rtl="0" eaLnBrk="1" latinLnBrk="0" hangingPunct="1">
+      <a:defRPr sz="1200" kern="1200">
+        <a:solidFill>
+          <a:schemeClr val="tx1"/>
+        </a:solidFill>
+        <a:latin typeface="+mn-lt"/>
+        <a:ea typeface="+mn-ea"/>
+        <a:cs typeface="+mn-cs"/>
+      </a:defRPr>
+    </a:lvl6pPr>
+    <a:lvl7pPr marL="2743200" algn="l" defTabSz="914400" rtl="0" eaLnBrk="1" latinLnBrk="0" hangingPunct="1">
+      <a:defRPr sz="1200" kern="1200">
+        <a:solidFill>
+          <a:schemeClr val="tx1"/>
+        </a:solidFill>
+        <a:latin typeface="+mn-lt"/>
+        <a:ea typeface="+mn-ea"/>
+        <a:cs typeface="+mn-cs"/>
+      </a:defRPr>
+    </a:lvl7pPr>
+    <a:lvl8pPr marL="3200400" algn="l" defTabSz="914400" rtl="0" eaLnBrk="1" latinLnBrk="0" hangingPunct="1">
+      <a:defRPr sz="1200" kern="1200">
+        <a:solidFill>
+          <a:schemeClr val="tx1"/>
+        </a:solidFill>
+        <a:latin typeface="+mn-lt"/>
+        <a:ea typeface="+mn-ea"/>
+        <a:cs typeface="+mn-cs"/>
+      </a:defRPr>
+    </a:lvl8pPr>
+    <a:lvl9pPr marL="3657600" algn="l" defTabSz="914400" rtl="0" eaLnBrk="1" latinLnBrk="0" hangingPunct="1">
+      <a:defRPr sz="1200" kern="1200">
+        <a:solidFill>
+          <a:schemeClr val="tx1"/>
+        </a:solidFill>
+        <a:latin typeface="+mn-lt"/>
+        <a:ea typeface="+mn-ea"/>
+        <a:cs typeface="+mn-cs"/>
+      </a:defRPr>
+    </a:lvl9pPr>
+  </p:notesStyle>
+</p:notesMaster>
+</file>
+
+<file path=ppt/notesSlides/notesSlide1.xml><?xml version="1.0" encoding="utf-8"?>
+<p:notes xmlns:a="http://schemas.openxmlformats.org/drawingml/2006/main" xmlns:r="http://schemas.openxmlformats.org/officeDocument/2006/relationships" xmlns:p="http://schemas.openxmlformats.org/presentationml/2006/main">
+  <p:cSld>
+    <p:spTree>
+      <p:nvGrpSpPr>
+        <p:cNvPr id="1" name=""/>
+        <p:cNvGrpSpPr/>
+        <p:nvPr/>
+      </p:nvGrpSpPr>
+      <p:grpSpPr>
+        <a:xfrm>
+          <a:off x="0" y="0"/>
+          <a:ext cx="0" cy="0"/>
+          <a:chOff x="0" y="0"/>
+          <a:chExt cx="0" cy="0"/>
+        </a:xfrm>
+      </p:grpSpPr>
+      <p:sp>
+        <p:nvSpPr>
+          <p:cNvPr id="2" name="Slide Image Placeholder 1"/>
+          <p:cNvSpPr>
+            <a:spLocks noGrp="1" noRot="1" noChangeAspect="1"/>
+          </p:cNvSpPr>
+          <p:nvPr>
+            <p:ph type="sldImg"/>
+          </p:nvPr>
+        </p:nvSpPr>
+        <p:spPr/>
+      </p:sp>
+      <p:sp>
+        <p:nvSpPr>
+          <p:cNvPr id="3" name="Notes Placeholder 2"/>
+          <p:cNvSpPr>
+            <a:spLocks noGrp="1"/>
+          </p:cNvSpPr>
+          <p:nvPr>
+            <p:ph type="body" idx="1"/>
+          </p:nvPr>
+        </p:nvSpPr>
+        <p:spPr/>
+        <p:txBody>
+          <a:bodyPr/>
+          <a:lstStyle/>
+          <a:p>
+            <a:endParaRPr lang="en-NL"/>
+          </a:p>
+        </p:txBody>
+      </p:sp>
+      <p:sp>
+        <p:nvSpPr>
+          <p:cNvPr id="4" name="Slide Number Placeholder 3"/>
+          <p:cNvSpPr>
+            <a:spLocks noGrp="1"/>
+          </p:cNvSpPr>
+          <p:nvPr>
+            <p:ph type="sldNum" sz="quarter" idx="5"/>
+          </p:nvPr>
+        </p:nvSpPr>
+        <p:spPr/>
+        <p:txBody>
+          <a:bodyPr/>
+          <a:lstStyle/>
+          <a:p>
+            <a:fld id="{A4813CE7-9BC2-AE46-B7A7-1FF6C6A7FDC7}" type="slidenum">
+              <a:rPr lang="en-NL" smtClean="0"/>
+              <a:t>1</a:t>
+            </a:fld>
+            <a:endParaRPr lang="en-NL"/>
+          </a:p>
+        </p:txBody>
+      </p:sp>
+    </p:spTree>
+    <p:extLst>
+      <p:ext uri="{BB962C8B-B14F-4D97-AF65-F5344CB8AC3E}">
+        <p14:creationId xmlns:p14="http://schemas.microsoft.com/office/powerpoint/2010/main" val="2398548864"/>
+      </p:ext>
+    </p:extLst>
+  </p:cSld>
+  <p:clrMapOvr>
+    <a:masterClrMapping/>
+  </p:clrMapOvr>
+</p:notes>
 </file>
 
 <file path=ppt/slideLayouts/slideLayout1.xml><?xml version="1.0" encoding="utf-8"?>
@@ -20896,7 +21333,7 @@
           <a:p>
             <a:fld id="{B8089D90-E8EC-433F-8241-FB36479BB3A8}" type="datetimeFigureOut">
               <a:rPr lang="en-NL" smtClean="0"/>
-              <a:t>22/06/2023</a:t>
+              <a:t>26/06/2023</a:t>
             </a:fld>
             <a:endParaRPr lang="en-NL"/>
           </a:p>
@@ -21066,7 +21503,7 @@
           <a:p>
             <a:fld id="{B8089D90-E8EC-433F-8241-FB36479BB3A8}" type="datetimeFigureOut">
               <a:rPr lang="en-NL" smtClean="0"/>
-              <a:t>22/06/2023</a:t>
+              <a:t>26/06/2023</a:t>
             </a:fld>
             <a:endParaRPr lang="en-NL"/>
           </a:p>
@@ -21246,7 +21683,7 @@
           <a:p>
             <a:fld id="{B8089D90-E8EC-433F-8241-FB36479BB3A8}" type="datetimeFigureOut">
               <a:rPr lang="en-NL" smtClean="0"/>
-              <a:t>22/06/2023</a:t>
+              <a:t>26/06/2023</a:t>
             </a:fld>
             <a:endParaRPr lang="en-NL"/>
           </a:p>
@@ -21416,7 +21853,7 @@
           <a:p>
             <a:fld id="{B8089D90-E8EC-433F-8241-FB36479BB3A8}" type="datetimeFigureOut">
               <a:rPr lang="en-NL" smtClean="0"/>
-              <a:t>22/06/2023</a:t>
+              <a:t>26/06/2023</a:t>
             </a:fld>
             <a:endParaRPr lang="en-NL"/>
           </a:p>
@@ -21660,7 +22097,7 @@
           <a:p>
             <a:fld id="{B8089D90-E8EC-433F-8241-FB36479BB3A8}" type="datetimeFigureOut">
               <a:rPr lang="en-NL" smtClean="0"/>
-              <a:t>22/06/2023</a:t>
+              <a:t>26/06/2023</a:t>
             </a:fld>
             <a:endParaRPr lang="en-NL"/>
           </a:p>
@@ -21892,7 +22329,7 @@
           <a:p>
             <a:fld id="{B8089D90-E8EC-433F-8241-FB36479BB3A8}" type="datetimeFigureOut">
               <a:rPr lang="en-NL" smtClean="0"/>
-              <a:t>22/06/2023</a:t>
+              <a:t>26/06/2023</a:t>
             </a:fld>
             <a:endParaRPr lang="en-NL"/>
           </a:p>
@@ -22259,7 +22696,7 @@
           <a:p>
             <a:fld id="{B8089D90-E8EC-433F-8241-FB36479BB3A8}" type="datetimeFigureOut">
               <a:rPr lang="en-NL" smtClean="0"/>
-              <a:t>22/06/2023</a:t>
+              <a:t>26/06/2023</a:t>
             </a:fld>
             <a:endParaRPr lang="en-NL"/>
           </a:p>
@@ -22377,7 +22814,7 @@
           <a:p>
             <a:fld id="{B8089D90-E8EC-433F-8241-FB36479BB3A8}" type="datetimeFigureOut">
               <a:rPr lang="en-NL" smtClean="0"/>
-              <a:t>22/06/2023</a:t>
+              <a:t>26/06/2023</a:t>
             </a:fld>
             <a:endParaRPr lang="en-NL"/>
           </a:p>
@@ -22472,7 +22909,7 @@
           <a:p>
             <a:fld id="{B8089D90-E8EC-433F-8241-FB36479BB3A8}" type="datetimeFigureOut">
               <a:rPr lang="en-NL" smtClean="0"/>
-              <a:t>22/06/2023</a:t>
+              <a:t>26/06/2023</a:t>
             </a:fld>
             <a:endParaRPr lang="en-NL"/>
           </a:p>
@@ -22749,7 +23186,7 @@
           <a:p>
             <a:fld id="{B8089D90-E8EC-433F-8241-FB36479BB3A8}" type="datetimeFigureOut">
               <a:rPr lang="en-NL" smtClean="0"/>
-              <a:t>22/06/2023</a:t>
+              <a:t>26/06/2023</a:t>
             </a:fld>
             <a:endParaRPr lang="en-NL"/>
           </a:p>
@@ -23006,7 +23443,7 @@
           <a:p>
             <a:fld id="{B8089D90-E8EC-433F-8241-FB36479BB3A8}" type="datetimeFigureOut">
               <a:rPr lang="en-NL" smtClean="0"/>
-              <a:t>22/06/2023</a:t>
+              <a:t>26/06/2023</a:t>
             </a:fld>
             <a:endParaRPr lang="en-NL"/>
           </a:p>
@@ -23219,7 +23656,7 @@
           <a:p>
             <a:fld id="{B8089D90-E8EC-433F-8241-FB36479BB3A8}" type="datetimeFigureOut">
               <a:rPr lang="en-NL" smtClean="0"/>
-              <a:t>22/06/2023</a:t>
+              <a:t>26/06/2023</a:t>
             </a:fld>
             <a:endParaRPr lang="en-NL"/>
           </a:p>
@@ -23657,44 +24094,6 @@
           <a:chExt cx="0" cy="0"/>
         </a:xfrm>
       </p:grpSpPr>
-      <p:pic>
-        <p:nvPicPr>
-          <p:cNvPr id="7" name="Graphic 6">
-            <a:extLst>
-              <a:ext uri="{FF2B5EF4-FFF2-40B4-BE49-F238E27FC236}">
-                <a16:creationId xmlns:a16="http://schemas.microsoft.com/office/drawing/2014/main" id="{BA027267-29E6-ED00-67F1-DFA0D8E32B97}"/>
-              </a:ext>
-            </a:extLst>
-          </p:cNvPr>
-          <p:cNvPicPr>
-            <a:picLocks noChangeAspect="1"/>
-          </p:cNvPicPr>
-          <p:nvPr/>
-        </p:nvPicPr>
-        <p:blipFill rotWithShape="1">
-          <a:blip r:embed="rId2">
-            <a:extLst>
-              <a:ext uri="{28A0092B-C50C-407E-A947-70E740481C1C}">
-                <a14:useLocalDpi xmlns:a14="http://schemas.microsoft.com/office/drawing/2010/main" val="0"/>
-              </a:ext>
-              <a:ext uri="{96DAC541-7B7A-43D3-8B79-37D633B846F1}">
-                <asvg:svgBlip xmlns:asvg="http://schemas.microsoft.com/office/drawing/2016/SVG/main" r:embed="rId3"/>
-              </a:ext>
-            </a:extLst>
-          </a:blip>
-          <a:srcRect t="14089" b="14624"/>
-          <a:stretch/>
-        </p:blipFill>
-        <p:spPr>
-          <a:xfrm>
-            <a:off x="0" y="16689340"/>
-            <a:ext cx="16309401" cy="8694342"/>
-          </a:xfrm>
-          <a:prstGeom prst="rect">
-            <a:avLst/>
-          </a:prstGeom>
-        </p:spPr>
-      </p:pic>
       <p:sp>
         <p:nvSpPr>
           <p:cNvPr id="2" name="Title 1">
@@ -23713,8 +24112,8 @@
         </p:nvSpPr>
         <p:spPr>
           <a:xfrm>
-            <a:off x="6916749" y="439846"/>
-            <a:ext cx="17259835" cy="2979845"/>
+            <a:off x="4174852" y="2229638"/>
+            <a:ext cx="21890584" cy="2979845"/>
           </a:xfrm>
         </p:spPr>
         <p:txBody>
@@ -23723,12 +24122,17 @@
           </a:bodyPr>
           <a:lstStyle/>
           <a:p>
+            <a:pPr>
+              <a:lnSpc>
+                <a:spcPct val="100000"/>
+              </a:lnSpc>
+            </a:pPr>
             <a:r>
               <a:rPr lang="en-US" sz="10000" dirty="0">
                 <a:latin typeface="Arial" panose="020B0604020202020204" pitchFamily="34" charset="0"/>
                 <a:cs typeface="Arial" panose="020B0604020202020204" pitchFamily="34" charset="0"/>
               </a:rPr>
-              <a:t>Measuring the effect of optical feedback on diode laser</a:t>
+              <a:t>Measuring the Effect of Optical Feedback on a Diode Laser</a:t>
             </a:r>
             <a:endParaRPr lang="en-NL" sz="10000" dirty="0">
               <a:latin typeface="Arial" panose="020B0604020202020204" pitchFamily="34" charset="0"/>
@@ -23751,7 +24155,7 @@
         </p:nvSpPr>
         <p:spPr>
           <a:xfrm>
-            <a:off x="922875" y="12576233"/>
+            <a:off x="703370" y="11882380"/>
             <a:ext cx="13773069" cy="4401205"/>
           </a:xfrm>
           <a:prstGeom prst="rect">
@@ -23771,7 +24175,7 @@
                 <a:latin typeface="Arial" panose="020B0604020202020204" pitchFamily="34" charset="0"/>
                 <a:cs typeface="Arial" panose="020B0604020202020204" pitchFamily="34" charset="0"/>
               </a:rPr>
-              <a:t>The ECDL makes use of a Littman-Metcalf configuration, where a mirror mounted on a high-precision rotation stage selects which wavelength(s) are being feedbacked into the diode laser. The zeroth order diffraction of the ECDL is directed into a spectrometer, which displays the wavelengths present in the beam. The spectrometer is calibrated with a neon lamp.</a:t>
+              <a:t>The ECDL makes use of a Littman-Metcalf configuration, where a mirror mounted on a high-precision rotation stage selects which wavelength(s) are feedbacked into the diode laser [1]. The zeroth order diffraction of the ECDL is directed into a spectrometer, which displays the wavelengths present in the beam. The spectrometer is calibrated with a neon lamp.</a:t>
             </a:r>
           </a:p>
         </p:txBody>
@@ -23790,7 +24194,7 @@
         </p:nvSpPr>
         <p:spPr>
           <a:xfrm>
-            <a:off x="922875" y="6015290"/>
+            <a:off x="704006" y="7349762"/>
             <a:ext cx="13728648" cy="3170099"/>
           </a:xfrm>
           <a:prstGeom prst="rect">
@@ -23812,8 +24216,9 @@
                 </a:solidFill>
                 <a:effectLst/>
                 <a:latin typeface="Arial" panose="020B0604020202020204" pitchFamily="34" charset="0"/>
+                <a:cs typeface="Arial" panose="020B0604020202020204" pitchFamily="34" charset="0"/>
               </a:rPr>
-              <a:t>Optical feedback is the process in which a select band from the output of a laser is reflected back into the laser cavity</a:t>
+              <a:t>Optical feedback is the phenomenon in which a selected mode of a diode laser is reflected back into the laser cavity</a:t>
             </a:r>
             <a:r>
               <a:rPr lang="en-GB" sz="4000" dirty="0">
@@ -23821,8 +24226,9 @@
                   <a:srgbClr val="000000"/>
                 </a:solidFill>
                 <a:latin typeface="Arial" panose="020B0604020202020204" pitchFamily="34" charset="0"/>
+                <a:cs typeface="Arial" panose="020B0604020202020204" pitchFamily="34" charset="0"/>
               </a:rPr>
-              <a:t>. </a:t>
+              <a:t> to amplify it. </a:t>
             </a:r>
             <a:r>
               <a:rPr lang="en-GB" sz="4000" b="0" i="0" u="none" strike="noStrike" dirty="0">
@@ -23831,48 +24237,14 @@
                 </a:solidFill>
                 <a:effectLst/>
                 <a:latin typeface="Arial" panose="020B0604020202020204" pitchFamily="34" charset="0"/>
+                <a:cs typeface="Arial" panose="020B0604020202020204" pitchFamily="34" charset="0"/>
               </a:rPr>
-              <a:t>For this project we built our own external cavity diode laser (ECDL) and Czerny-Turner Spectrometer to measure the effect that </a:t>
+              <a:t>For this project we built our own external cavity diode laser (ECDL) and Czerny-Turner Spectrometer to measure this effect. </a:t>
             </a:r>
-            <a:r>
-              <a:rPr lang="en-GB" sz="4000" dirty="0">
-                <a:solidFill>
-                  <a:srgbClr val="000000"/>
-                </a:solidFill>
-                <a:latin typeface="Arial" panose="020B0604020202020204" pitchFamily="34" charset="0"/>
-              </a:rPr>
-              <a:t>feedback </a:t>
-            </a:r>
-            <a:r>
-              <a:rPr lang="en-GB" sz="4000" b="0" i="0" u="none" strike="noStrike" dirty="0">
-                <a:solidFill>
-                  <a:srgbClr val="000000"/>
-                </a:solidFill>
-                <a:effectLst/>
-                <a:latin typeface="Arial" panose="020B0604020202020204" pitchFamily="34" charset="0"/>
-              </a:rPr>
-              <a:t>has on the output of </a:t>
-            </a:r>
-            <a:r>
-              <a:rPr lang="en-GB" sz="4000" dirty="0">
-                <a:solidFill>
-                  <a:srgbClr val="000000"/>
-                </a:solidFill>
-                <a:latin typeface="Arial" panose="020B0604020202020204" pitchFamily="34" charset="0"/>
-              </a:rPr>
-              <a:t>the diode</a:t>
-            </a:r>
-            <a:r>
-              <a:rPr lang="en-GB" sz="4000" b="0" i="0" u="none" strike="noStrike" dirty="0">
-                <a:solidFill>
-                  <a:srgbClr val="000000"/>
-                </a:solidFill>
-                <a:effectLst/>
-                <a:latin typeface="Arial" panose="020B0604020202020204" pitchFamily="34" charset="0"/>
-              </a:rPr>
-              <a:t> laser. </a:t>
-            </a:r>
-            <a:endParaRPr lang="en-NL" sz="4000" dirty="0"/>
+            <a:endParaRPr lang="en-NL" sz="4000" dirty="0">
+              <a:latin typeface="Arial" panose="020B0604020202020204" pitchFamily="34" charset="0"/>
+              <a:cs typeface="Arial" panose="020B0604020202020204" pitchFamily="34" charset="0"/>
+            </a:endParaRPr>
           </a:p>
         </p:txBody>
       </p:sp>
@@ -23890,7 +24262,7 @@
         </p:nvSpPr>
         <p:spPr>
           <a:xfrm>
-            <a:off x="922875" y="5218385"/>
+            <a:off x="703371" y="6439684"/>
             <a:ext cx="6607277" cy="923330"/>
           </a:xfrm>
           <a:prstGeom prst="rect">
@@ -23904,11 +24276,18 @@
           </a:bodyPr>
           <a:lstStyle/>
           <a:p>
+            <a:pPr algn="just"/>
             <a:r>
-              <a:rPr lang="en-US" sz="5400" b="1" dirty="0"/>
-              <a:t>Introduction</a:t>
+              <a:rPr lang="en-US" sz="5400" b="1" dirty="0">
+                <a:latin typeface="Arial" panose="020B0604020202020204" pitchFamily="34" charset="0"/>
+                <a:cs typeface="Arial" panose="020B0604020202020204" pitchFamily="34" charset="0"/>
+              </a:rPr>
+              <a:t>1. Introduction</a:t>
             </a:r>
-            <a:endParaRPr lang="en-NL" sz="5400" b="1" dirty="0"/>
+            <a:endParaRPr lang="en-NL" sz="5400" b="1" dirty="0">
+              <a:latin typeface="Arial" panose="020B0604020202020204" pitchFamily="34" charset="0"/>
+              <a:cs typeface="Arial" panose="020B0604020202020204" pitchFamily="34" charset="0"/>
+            </a:endParaRPr>
           </a:p>
         </p:txBody>
       </p:sp>
@@ -23926,7 +24305,7 @@
         </p:nvSpPr>
         <p:spPr>
           <a:xfrm>
-            <a:off x="17046682" y="5218385"/>
+            <a:off x="16403276" y="6516117"/>
             <a:ext cx="6607277" cy="923330"/>
           </a:xfrm>
           <a:prstGeom prst="rect">
@@ -23940,11 +24319,18 @@
           </a:bodyPr>
           <a:lstStyle/>
           <a:p>
+            <a:pPr algn="just"/>
             <a:r>
-              <a:rPr lang="en-US" sz="5400" b="1" dirty="0"/>
-              <a:t>Expectation</a:t>
+              <a:rPr lang="en-US" sz="5400" b="1" dirty="0">
+                <a:latin typeface="Arial" panose="020B0604020202020204" pitchFamily="34" charset="0"/>
+                <a:cs typeface="Arial" panose="020B0604020202020204" pitchFamily="34" charset="0"/>
+              </a:rPr>
+              <a:t>2. Expectation</a:t>
             </a:r>
-            <a:endParaRPr lang="en-NL" sz="5400" b="1" dirty="0"/>
+            <a:endParaRPr lang="en-NL" sz="5400" b="1" dirty="0">
+              <a:latin typeface="Arial" panose="020B0604020202020204" pitchFamily="34" charset="0"/>
+              <a:cs typeface="Arial" panose="020B0604020202020204" pitchFamily="34" charset="0"/>
+            </a:endParaRPr>
           </a:p>
         </p:txBody>
       </p:sp>
@@ -23962,7 +24348,7 @@
         </p:nvSpPr>
         <p:spPr>
           <a:xfrm>
-            <a:off x="967297" y="11557409"/>
+            <a:off x="746606" y="11000219"/>
             <a:ext cx="6607277" cy="923330"/>
           </a:xfrm>
           <a:prstGeom prst="rect">
@@ -23976,12 +24362,13 @@
           </a:bodyPr>
           <a:lstStyle/>
           <a:p>
+            <a:pPr algn="just"/>
             <a:r>
               <a:rPr lang="en-US" sz="5400" b="1" dirty="0">
                 <a:latin typeface="Arial" panose="020B0604020202020204" pitchFamily="34" charset="0"/>
                 <a:cs typeface="Arial" panose="020B0604020202020204" pitchFamily="34" charset="0"/>
               </a:rPr>
-              <a:t>Methodology</a:t>
+              <a:t>3. Methodology</a:t>
             </a:r>
             <a:endParaRPr lang="en-NL" sz="5400" b="1" dirty="0">
               <a:latin typeface="Arial" panose="020B0604020202020204" pitchFamily="34" charset="0"/>
@@ -24004,7 +24391,7 @@
         </p:nvSpPr>
         <p:spPr>
           <a:xfrm>
-            <a:off x="967297" y="26051424"/>
+            <a:off x="703371" y="25754206"/>
             <a:ext cx="7260700" cy="923330"/>
           </a:xfrm>
           <a:prstGeom prst="rect">
@@ -24018,12 +24405,13 @@
           </a:bodyPr>
           <a:lstStyle/>
           <a:p>
+            <a:pPr algn="just"/>
             <a:r>
               <a:rPr lang="en-US" sz="5400" b="1" dirty="0">
                 <a:latin typeface="Arial" panose="020B0604020202020204" pitchFamily="34" charset="0"/>
                 <a:cs typeface="Arial" panose="020B0604020202020204" pitchFamily="34" charset="0"/>
               </a:rPr>
-              <a:t>Conclusion</a:t>
+              <a:t>5. Conclusion</a:t>
             </a:r>
             <a:endParaRPr lang="en-NL" sz="5400" b="1" dirty="0">
               <a:latin typeface="Arial" panose="020B0604020202020204" pitchFamily="34" charset="0"/>
@@ -24046,8 +24434,8 @@
         </p:nvSpPr>
         <p:spPr>
           <a:xfrm>
-            <a:off x="922875" y="26974754"/>
-            <a:ext cx="13075640" cy="3785652"/>
+            <a:off x="703370" y="26677536"/>
+            <a:ext cx="13799377" cy="3785652"/>
           </a:xfrm>
           <a:prstGeom prst="rect">
             <a:avLst/>
@@ -24066,7 +24454,7 @@
                 <a:latin typeface="Arial" panose="020B0604020202020204" pitchFamily="34" charset="0"/>
                 <a:cs typeface="Arial" panose="020B0604020202020204" pitchFamily="34" charset="0"/>
               </a:rPr>
-              <a:t>When optical feedback was being provided the spectrum of the laser peaked and shifted. This can be attributed to the different wavelengths that are being stimulated by the feedback. The wavelengths that were being selected can seen in the whole spectrum in figure 1 when the laser was lasing.</a:t>
+              <a:t>When the laser was provided with optical feedback, the laser’s spectrum narrowed and shifted. The shift was dependent on the laser mode reflected back into the laser cavity. The wavelengths which provided the narrowest peaks when providing feedback can be selected from the peaks shown in the broad spectrum of  Figure 1.</a:t>
             </a:r>
             <a:endParaRPr lang="en-NL" sz="4000" dirty="0">
               <a:latin typeface="Arial" panose="020B0604020202020204" pitchFamily="34" charset="0"/>
@@ -24089,7 +24477,7 @@
         </p:nvSpPr>
         <p:spPr>
           <a:xfrm>
-            <a:off x="967297" y="30924236"/>
+            <a:off x="633913" y="31156398"/>
             <a:ext cx="6607277" cy="923330"/>
           </a:xfrm>
           <a:prstGeom prst="rect">
@@ -24103,11 +24491,18 @@
           </a:bodyPr>
           <a:lstStyle/>
           <a:p>
+            <a:pPr algn="just"/>
             <a:r>
-              <a:rPr lang="en-US" sz="5400" b="1" dirty="0"/>
-              <a:t>Discussion</a:t>
+              <a:rPr lang="en-US" sz="5400" b="1" dirty="0">
+                <a:latin typeface="Arial" panose="020B0604020202020204" pitchFamily="34" charset="0"/>
+                <a:cs typeface="Arial" panose="020B0604020202020204" pitchFamily="34" charset="0"/>
+              </a:rPr>
+              <a:t>6. Discussion</a:t>
             </a:r>
-            <a:endParaRPr lang="en-NL" sz="5400" b="1" dirty="0"/>
+            <a:endParaRPr lang="en-NL" sz="5400" b="1" dirty="0">
+              <a:latin typeface="Arial" panose="020B0604020202020204" pitchFamily="34" charset="0"/>
+              <a:cs typeface="Arial" panose="020B0604020202020204" pitchFamily="34" charset="0"/>
+            </a:endParaRPr>
           </a:p>
         </p:txBody>
       </p:sp>
@@ -24125,7 +24520,7 @@
         </p:nvSpPr>
         <p:spPr>
           <a:xfrm>
-            <a:off x="1444434" y="40079618"/>
+            <a:off x="633913" y="36639302"/>
             <a:ext cx="6607277" cy="923330"/>
           </a:xfrm>
           <a:prstGeom prst="rect">
@@ -24139,11 +24534,18 @@
           </a:bodyPr>
           <a:lstStyle/>
           <a:p>
+            <a:pPr algn="just"/>
             <a:r>
-              <a:rPr lang="en-US" sz="5400" b="1" dirty="0"/>
-              <a:t>References</a:t>
+              <a:rPr lang="en-US" sz="5400" b="1" dirty="0">
+                <a:latin typeface="Arial" panose="020B0604020202020204" pitchFamily="34" charset="0"/>
+                <a:cs typeface="Arial" panose="020B0604020202020204" pitchFamily="34" charset="0"/>
+              </a:rPr>
+              <a:t>7. References</a:t>
             </a:r>
-            <a:endParaRPr lang="en-NL" sz="5400" b="1" dirty="0"/>
+            <a:endParaRPr lang="en-NL" sz="5400" b="1" dirty="0">
+              <a:latin typeface="Arial" panose="020B0604020202020204" pitchFamily="34" charset="0"/>
+              <a:cs typeface="Arial" panose="020B0604020202020204" pitchFamily="34" charset="0"/>
+            </a:endParaRPr>
           </a:p>
         </p:txBody>
       </p:sp>
@@ -24161,8 +24563,8 @@
         </p:nvSpPr>
         <p:spPr>
           <a:xfrm>
-            <a:off x="1444434" y="41002948"/>
-            <a:ext cx="11898904" cy="707886"/>
+            <a:off x="703372" y="37562632"/>
+            <a:ext cx="13821586" cy="4401205"/>
           </a:xfrm>
           <a:prstGeom prst="rect">
             <a:avLst/>
@@ -24175,17 +24577,104 @@
           </a:bodyPr>
           <a:lstStyle/>
           <a:p>
+            <a:pPr algn="just"/>
             <a:r>
-              <a:rPr lang="en-US" sz="4000" dirty="0"/>
-              <a:t>I need to be written</a:t>
+              <a:rPr lang="en-NL" sz="4000" dirty="0">
+                <a:latin typeface="Arial" panose="020B0604020202020204" pitchFamily="34" charset="0"/>
+                <a:cs typeface="Arial" panose="020B0604020202020204" pitchFamily="34" charset="0"/>
+              </a:rPr>
+              <a:t>[1] </a:t>
             </a:r>
             <a:r>
-              <a:rPr lang="en-US" sz="4000" dirty="0">
-                <a:sym typeface="Wingdings" panose="05000000000000000000" pitchFamily="2" charset="2"/>
+              <a:rPr lang="en-GB" sz="4000" b="0" i="0" u="none" strike="noStrike" dirty="0">
+                <a:solidFill>
+                  <a:srgbClr val="1A1A1A"/>
+                </a:solidFill>
+                <a:effectLst/>
+                <a:latin typeface="Arial" panose="020B0604020202020204" pitchFamily="34" charset="0"/>
+                <a:cs typeface="Arial" panose="020B0604020202020204" pitchFamily="34" charset="0"/>
               </a:rPr>
-              <a:t></a:t>
+              <a:t>Erik G. Brekke, Matthew A. Schulz; Observation of laser feedback using a grating spectrometer. </a:t>
             </a:r>
-            <a:endParaRPr lang="en-NL" sz="4000" dirty="0"/>
+            <a:r>
+              <a:rPr lang="en-GB" sz="4000" b="0" i="1" u="none" strike="noStrike" dirty="0">
+                <a:solidFill>
+                  <a:srgbClr val="1A1A1A"/>
+                </a:solidFill>
+                <a:effectLst/>
+                <a:latin typeface="Arial" panose="020B0604020202020204" pitchFamily="34" charset="0"/>
+                <a:cs typeface="Arial" panose="020B0604020202020204" pitchFamily="34" charset="0"/>
+              </a:rPr>
+              <a:t>American Journal of Physics</a:t>
+            </a:r>
+            <a:r>
+              <a:rPr lang="en-GB" sz="4000" b="0" i="0" u="none" strike="noStrike" dirty="0">
+                <a:solidFill>
+                  <a:srgbClr val="1A1A1A"/>
+                </a:solidFill>
+                <a:effectLst/>
+                <a:latin typeface="Arial" panose="020B0604020202020204" pitchFamily="34" charset="0"/>
+                <a:cs typeface="Arial" panose="020B0604020202020204" pitchFamily="34" charset="0"/>
+              </a:rPr>
+              <a:t> 1 July 2015; 83 (7): 616–620.</a:t>
+            </a:r>
+            <a:endParaRPr lang="en-NL" sz="4000" dirty="0">
+              <a:latin typeface="Arial" panose="020B0604020202020204" pitchFamily="34" charset="0"/>
+              <a:cs typeface="Arial" panose="020B0604020202020204" pitchFamily="34" charset="0"/>
+            </a:endParaRPr>
+          </a:p>
+          <a:p>
+            <a:pPr algn="just"/>
+            <a:endParaRPr lang="en-NL" sz="4000" dirty="0">
+              <a:latin typeface="Arial" panose="020B0604020202020204" pitchFamily="34" charset="0"/>
+              <a:cs typeface="Arial" panose="020B0604020202020204" pitchFamily="34" charset="0"/>
+            </a:endParaRPr>
+          </a:p>
+          <a:p>
+            <a:pPr algn="just"/>
+            <a:r>
+              <a:rPr lang="en-NL" sz="4000" dirty="0">
+                <a:latin typeface="Arial" panose="020B0604020202020204" pitchFamily="34" charset="0"/>
+                <a:cs typeface="Arial" panose="020B0604020202020204" pitchFamily="34" charset="0"/>
+              </a:rPr>
+              <a:t>[2] </a:t>
+            </a:r>
+            <a:r>
+              <a:rPr lang="en-GB" sz="4000" b="0" i="0" u="none" strike="noStrike" dirty="0" err="1">
+                <a:effectLst/>
+                <a:latin typeface="Arial" panose="020B0604020202020204" pitchFamily="34" charset="0"/>
+                <a:cs typeface="Arial" panose="020B0604020202020204" pitchFamily="34" charset="0"/>
+              </a:rPr>
+              <a:t>Jumpertz</a:t>
+            </a:r>
+            <a:r>
+              <a:rPr lang="en-GB" sz="4000" b="0" i="0" u="none" strike="noStrike" dirty="0">
+                <a:effectLst/>
+                <a:latin typeface="Arial" panose="020B0604020202020204" pitchFamily="34" charset="0"/>
+                <a:cs typeface="Arial" panose="020B0604020202020204" pitchFamily="34" charset="0"/>
+              </a:rPr>
+              <a:t>, L. (2017). Optical Feedback in </a:t>
+            </a:r>
+            <a:r>
+              <a:rPr lang="en-GB" sz="4000" b="0" i="0" u="none" strike="noStrike" dirty="0" err="1">
+                <a:effectLst/>
+                <a:latin typeface="Arial" panose="020B0604020202020204" pitchFamily="34" charset="0"/>
+                <a:cs typeface="Arial" panose="020B0604020202020204" pitchFamily="34" charset="0"/>
+              </a:rPr>
+              <a:t>Interband</a:t>
+            </a:r>
+            <a:r>
+              <a:rPr lang="en-GB" sz="4000" b="0" i="0" u="none" strike="noStrike" dirty="0">
+                <a:effectLst/>
+                <a:latin typeface="Arial" panose="020B0604020202020204" pitchFamily="34" charset="0"/>
+                <a:cs typeface="Arial" panose="020B0604020202020204" pitchFamily="34" charset="0"/>
+              </a:rPr>
+              <a:t> Lasers. In: Nonlinear Photonics in Mid-infrared Quantum Cascade Lasers. Springer Theses. Springer, Cham.</a:t>
+            </a:r>
+            <a:endParaRPr lang="en-NL" sz="4000" dirty="0">
+              <a:latin typeface="Arial" panose="020B0604020202020204" pitchFamily="34" charset="0"/>
+              <a:cs typeface="Arial" panose="020B0604020202020204" pitchFamily="34" charset="0"/>
+            </a:endParaRPr>
           </a:p>
         </p:txBody>
       </p:sp>
@@ -24203,8 +24692,8 @@
         </p:nvSpPr>
         <p:spPr>
           <a:xfrm>
-            <a:off x="967297" y="31818498"/>
-            <a:ext cx="11898904" cy="4401205"/>
+            <a:off x="633913" y="32037817"/>
+            <a:ext cx="13868834" cy="3785652"/>
           </a:xfrm>
           <a:prstGeom prst="rect">
             <a:avLst/>
@@ -24223,7 +24712,7 @@
                 <a:latin typeface="Arial" panose="020B0604020202020204" pitchFamily="34" charset="0"/>
                 <a:cs typeface="Arial" panose="020B0604020202020204" pitchFamily="34" charset="0"/>
               </a:rPr>
-              <a:t>We had trouble calibrating the spectrometer due to the neon light not providing a clean spectrum. This caused our measurement wavelengths to have a large error on them. We attributed the many peaks of the diode laser to the cavity which is inside the laser itself. This cavity allows only the standing waves that fit in the cavity to be emitted.</a:t>
+              <a:t>We had trouble calibrating the spectrometer due to the neon light not providing a sharp spectrum. This caused our measurement wavelengths to have a large error on them. We attributed the many peaks of the diode laser to the cavity which is inside the laser itself. This cavity allows only the standing waves that fit in the cavity to be emitted.</a:t>
             </a:r>
             <a:endParaRPr lang="en-NL" sz="4000" dirty="0">
               <a:latin typeface="Arial" panose="020B0604020202020204" pitchFamily="34" charset="0"/>
@@ -24232,83 +24721,6 @@
           </a:p>
         </p:txBody>
       </p:sp>
-      <p:pic>
-        <p:nvPicPr>
-          <p:cNvPr id="20" name="Graphic 19">
-            <a:extLst>
-              <a:ext uri="{FF2B5EF4-FFF2-40B4-BE49-F238E27FC236}">
-                <a16:creationId xmlns:a16="http://schemas.microsoft.com/office/drawing/2014/main" id="{624BF128-476F-0770-6368-65A761DD7DC9}"/>
-              </a:ext>
-            </a:extLst>
-          </p:cNvPr>
-          <p:cNvPicPr>
-            <a:picLocks noChangeAspect="1"/>
-          </p:cNvPicPr>
-          <p:nvPr/>
-        </p:nvPicPr>
-        <p:blipFill rotWithShape="1">
-          <a:blip r:embed="rId4">
-            <a:extLst>
-              <a:ext uri="{28A0092B-C50C-407E-A947-70E740481C1C}">
-                <a14:useLocalDpi xmlns:a14="http://schemas.microsoft.com/office/drawing/2010/main" val="0"/>
-              </a:ext>
-              <a:ext uri="{96DAC541-7B7A-43D3-8B79-37D633B846F1}">
-                <asvg:svgBlip xmlns:asvg="http://schemas.microsoft.com/office/drawing/2016/SVG/main" r:embed="rId5"/>
-              </a:ext>
-            </a:extLst>
-          </a:blip>
-          <a:srcRect l="5788" t="9412" r="8017" b="6151"/>
-          <a:stretch/>
-        </p:blipFill>
-        <p:spPr>
-          <a:xfrm>
-            <a:off x="16052745" y="26782717"/>
-            <a:ext cx="13573717" cy="13296901"/>
-          </a:xfrm>
-          <a:prstGeom prst="rect">
-            <a:avLst/>
-          </a:prstGeom>
-        </p:spPr>
-      </p:pic>
-      <p:pic>
-        <p:nvPicPr>
-          <p:cNvPr id="28" name="Graphic 27">
-            <a:extLst>
-              <a:ext uri="{FF2B5EF4-FFF2-40B4-BE49-F238E27FC236}">
-                <a16:creationId xmlns:a16="http://schemas.microsoft.com/office/drawing/2014/main" id="{868855BE-6969-E2AD-AA61-4CF8B0857074}"/>
-              </a:ext>
-            </a:extLst>
-          </p:cNvPr>
-          <p:cNvPicPr>
-            <a:picLocks noChangeAspect="1"/>
-          </p:cNvPicPr>
-          <p:nvPr/>
-        </p:nvPicPr>
-        <p:blipFill>
-          <a:blip r:embed="rId6">
-            <a:extLst>
-              <a:ext uri="{28A0092B-C50C-407E-A947-70E740481C1C}">
-                <a14:useLocalDpi xmlns:a14="http://schemas.microsoft.com/office/drawing/2010/main" val="0"/>
-              </a:ext>
-              <a:ext uri="{96DAC541-7B7A-43D3-8B79-37D633B846F1}">
-                <asvg:svgBlip xmlns:asvg="http://schemas.microsoft.com/office/drawing/2016/SVG/main" r:embed="rId7"/>
-              </a:ext>
-            </a:extLst>
-          </a:blip>
-          <a:stretch>
-            <a:fillRect/>
-          </a:stretch>
-        </p:blipFill>
-        <p:spPr>
-          <a:xfrm>
-            <a:off x="16052745" y="16588382"/>
-            <a:ext cx="13573717" cy="8144230"/>
-          </a:xfrm>
-          <a:prstGeom prst="rect">
-            <a:avLst/>
-          </a:prstGeom>
-        </p:spPr>
-      </p:pic>
       <p:sp>
         <p:nvSpPr>
           <p:cNvPr id="3" name="TextBox 2">
@@ -24323,8 +24735,8 @@
         </p:nvSpPr>
         <p:spPr>
           <a:xfrm>
-            <a:off x="17046682" y="24898886"/>
-            <a:ext cx="12267343" cy="1569660"/>
+            <a:off x="17067942" y="24836388"/>
+            <a:ext cx="11371179" cy="1569660"/>
           </a:xfrm>
           <a:prstGeom prst="rect">
             <a:avLst/>
@@ -24350,7 +24762,7 @@
                 <a:latin typeface="Arial" panose="020B0604020202020204" pitchFamily="34" charset="0"/>
                 <a:cs typeface="Arial" panose="020B0604020202020204" pitchFamily="34" charset="0"/>
               </a:rPr>
-              <a:t>Measurement of the diode laser without feedback at different currents. The intensity is relative to the highest peak of the laser at 28mA without feedback.</a:t>
+              <a:t>Spectrum of the diode laser at 25mA (orange) and at 28mA (blue). The intensity is normalized by the highest peak at 28mA.</a:t>
             </a:r>
             <a:endParaRPr lang="en-NL" sz="3200" dirty="0">
               <a:latin typeface="Arial" panose="020B0604020202020204" pitchFamily="34" charset="0"/>
@@ -24373,8 +24785,8 @@
         </p:nvSpPr>
         <p:spPr>
           <a:xfrm>
-            <a:off x="17046683" y="40263174"/>
-            <a:ext cx="12267344" cy="2062103"/>
+            <a:off x="17213508" y="39178003"/>
+            <a:ext cx="11594089" cy="3046988"/>
           </a:xfrm>
           <a:prstGeom prst="rect">
             <a:avLst/>
@@ -24400,7 +24812,7 @@
                 <a:latin typeface="Arial" panose="020B0604020202020204" pitchFamily="34" charset="0"/>
                 <a:cs typeface="Arial" panose="020B0604020202020204" pitchFamily="34" charset="0"/>
               </a:rPr>
-              <a:t>Measurement of the diode laser with feedback at 28mA. The angle is the angle of the mirror normal with the grating normal. The intensity is relative to the highest peak of the laser at 28mA without feedback.</a:t>
+              <a:t>Spectra of the diode laser with optical feedback. A laser mode (wavelength) is selected by changing the incidence angle normal to the diffraction grating (see labels). The result is an enhanced peak at the wavelength providing the feedback. The intensity is relative to the highest peak of the laser at 28mA without feedback.</a:t>
             </a:r>
             <a:endParaRPr lang="en-NL" sz="3200" dirty="0">
               <a:latin typeface="Arial" panose="020B0604020202020204" pitchFamily="34" charset="0"/>
@@ -24415,6 +24827,150 @@
             <a:extLst>
               <a:ext uri="{FF2B5EF4-FFF2-40B4-BE49-F238E27FC236}">
                 <a16:creationId xmlns:a16="http://schemas.microsoft.com/office/drawing/2014/main" id="{2E593A0A-BC36-01EC-4F0E-AD011E643AF7}"/>
+              </a:ext>
+            </a:extLst>
+          </p:cNvPr>
+          <p:cNvPicPr>
+            <a:picLocks noChangeAspect="1"/>
+          </p:cNvPicPr>
+          <p:nvPr/>
+        </p:nvPicPr>
+        <p:blipFill>
+          <a:blip r:embed="rId3">
+            <a:extLst>
+              <a:ext uri="{28A0092B-C50C-407E-A947-70E740481C1C}">
+                <a14:useLocalDpi xmlns:a14="http://schemas.microsoft.com/office/drawing/2010/main" val="0"/>
+              </a:ext>
+              <a:ext uri="{96DAC541-7B7A-43D3-8B79-37D633B846F1}">
+                <asvg:svgBlip xmlns:asvg="http://schemas.microsoft.com/office/drawing/2016/SVG/main" r:embed="rId4"/>
+              </a:ext>
+            </a:extLst>
+          </a:blip>
+          <a:stretch>
+            <a:fillRect/>
+          </a:stretch>
+        </p:blipFill>
+        <p:spPr>
+          <a:xfrm>
+            <a:off x="22500632" y="301816"/>
+            <a:ext cx="6341068" cy="1435371"/>
+          </a:xfrm>
+          <a:prstGeom prst="rect">
+            <a:avLst/>
+          </a:prstGeom>
+        </p:spPr>
+      </p:pic>
+      <p:graphicFrame>
+        <p:nvGraphicFramePr>
+          <p:cNvPr id="2554" name="Object 2553">
+            <a:extLst>
+              <a:ext uri="{FF2B5EF4-FFF2-40B4-BE49-F238E27FC236}">
+                <a16:creationId xmlns:a16="http://schemas.microsoft.com/office/drawing/2014/main" id="{320234E1-44B5-2BFA-A3DD-D0A959BB062E}"/>
+              </a:ext>
+            </a:extLst>
+          </p:cNvPr>
+          <p:cNvGraphicFramePr>
+            <a:graphicFrameLocks noChangeAspect="1"/>
+          </p:cNvGraphicFramePr>
+          <p:nvPr>
+            <p:extLst>
+              <p:ext uri="{D42A27DB-BD31-4B8C-83A1-F6EECF244321}">
+                <p14:modId xmlns:p14="http://schemas.microsoft.com/office/powerpoint/2010/main" val="3832284536"/>
+              </p:ext>
+            </p:extLst>
+          </p:nvPr>
+        </p:nvGraphicFramePr>
+        <p:xfrm>
+          <a:off x="16446511" y="7363014"/>
+          <a:ext cx="12414172" cy="8779814"/>
+        </p:xfrm>
+        <a:graphic>
+          <a:graphicData uri="http://schemas.openxmlformats.org/presentationml/2006/ole">
+            <mc:AlternateContent xmlns:mc="http://schemas.openxmlformats.org/markup-compatibility/2006">
+              <mc:Choice xmlns:v="urn:schemas-microsoft-com:vml" Requires="v">
+                <p:oleObj name="Document" r:id="rId5" imgW="4483100" imgH="3162300" progId="Word.Document.12">
+                  <p:embed/>
+                </p:oleObj>
+              </mc:Choice>
+              <mc:Fallback>
+                <p:oleObj name="Document" r:id="rId5" imgW="4483100" imgH="3162300" progId="Word.Document.12">
+                  <p:embed/>
+                  <p:pic>
+                    <p:nvPicPr>
+                      <p:cNvPr id="2554" name="Object 2553">
+                        <a:extLst>
+                          <a:ext uri="{FF2B5EF4-FFF2-40B4-BE49-F238E27FC236}">
+                            <a16:creationId xmlns:a16="http://schemas.microsoft.com/office/drawing/2014/main" id="{320234E1-44B5-2BFA-A3DD-D0A959BB062E}"/>
+                          </a:ext>
+                        </a:extLst>
+                      </p:cNvPr>
+                      <p:cNvPicPr/>
+                      <p:nvPr/>
+                    </p:nvPicPr>
+                    <p:blipFill>
+                      <a:blip r:embed="rId6"/>
+                      <a:stretch>
+                        <a:fillRect/>
+                      </a:stretch>
+                    </p:blipFill>
+                    <p:spPr>
+                      <a:xfrm>
+                        <a:off x="16446511" y="7363014"/>
+                        <a:ext cx="12414172" cy="8779814"/>
+                      </a:xfrm>
+                      <a:prstGeom prst="rect">
+                        <a:avLst/>
+                      </a:prstGeom>
+                    </p:spPr>
+                  </p:pic>
+                </p:oleObj>
+              </mc:Fallback>
+            </mc:AlternateContent>
+          </a:graphicData>
+        </a:graphic>
+      </p:graphicFrame>
+      <p:pic>
+        <p:nvPicPr>
+          <p:cNvPr id="6" name="Picture 5">
+            <a:extLst>
+              <a:ext uri="{FF2B5EF4-FFF2-40B4-BE49-F238E27FC236}">
+                <a16:creationId xmlns:a16="http://schemas.microsoft.com/office/drawing/2014/main" id="{6CC7E9B9-9461-8F90-567B-5AF2781D9DD6}"/>
+              </a:ext>
+            </a:extLst>
+          </p:cNvPr>
+          <p:cNvPicPr>
+            <a:picLocks noChangeAspect="1"/>
+          </p:cNvPicPr>
+          <p:nvPr/>
+        </p:nvPicPr>
+        <p:blipFill>
+          <a:blip r:embed="rId7">
+            <a:extLst>
+              <a:ext uri="{28A0092B-C50C-407E-A947-70E740481C1C}">
+                <a14:useLocalDpi xmlns:a14="http://schemas.microsoft.com/office/drawing/2010/main" val="0"/>
+              </a:ext>
+            </a:extLst>
+          </a:blip>
+          <a:stretch>
+            <a:fillRect/>
+          </a:stretch>
+        </p:blipFill>
+        <p:spPr>
+          <a:xfrm>
+            <a:off x="10987535" y="461982"/>
+            <a:ext cx="8265218" cy="1275205"/>
+          </a:xfrm>
+          <a:prstGeom prst="rect">
+            <a:avLst/>
+          </a:prstGeom>
+        </p:spPr>
+      </p:pic>
+      <p:pic>
+        <p:nvPicPr>
+          <p:cNvPr id="23" name="Graphic 22">
+            <a:extLst>
+              <a:ext uri="{FF2B5EF4-FFF2-40B4-BE49-F238E27FC236}">
+                <a16:creationId xmlns:a16="http://schemas.microsoft.com/office/drawing/2014/main" id="{ADDDBEAF-66E0-B180-AF29-32017F4EDC04}"/>
               </a:ext>
             </a:extLst>
           </p:cNvPr>
@@ -24440,83 +24996,275 @@
         </p:blipFill>
         <p:spPr>
           <a:xfrm>
-            <a:off x="22357669" y="2174499"/>
-            <a:ext cx="7268793" cy="1645372"/>
+            <a:off x="703372" y="239419"/>
+            <a:ext cx="7348340" cy="1488672"/>
           </a:xfrm>
           <a:prstGeom prst="rect">
             <a:avLst/>
           </a:prstGeom>
         </p:spPr>
       </p:pic>
-      <p:graphicFrame>
-        <p:nvGraphicFramePr>
-          <p:cNvPr id="2554" name="Object 2553">
+      <p:sp>
+        <p:nvSpPr>
+          <p:cNvPr id="25" name="TextBox 24">
             <a:extLst>
               <a:ext uri="{FF2B5EF4-FFF2-40B4-BE49-F238E27FC236}">
-                <a16:creationId xmlns:a16="http://schemas.microsoft.com/office/drawing/2014/main" id="{320234E1-44B5-2BFA-A3DD-D0A959BB062E}"/>
+                <a16:creationId xmlns:a16="http://schemas.microsoft.com/office/drawing/2014/main" id="{B29D553E-96FD-5AB3-7E35-C1ED901401BF}"/>
               </a:ext>
             </a:extLst>
           </p:cNvPr>
-          <p:cNvGraphicFramePr>
-            <a:graphicFrameLocks noChangeAspect="1"/>
-          </p:cNvGraphicFramePr>
-          <p:nvPr>
-            <p:extLst>
-              <p:ext uri="{D42A27DB-BD31-4B8C-83A1-F6EECF244321}">
-                <p14:modId xmlns:p14="http://schemas.microsoft.com/office/powerpoint/2010/main" val="945692543"/>
-              </p:ext>
-            </p:extLst>
-          </p:nvPr>
-        </p:nvGraphicFramePr>
-        <p:xfrm>
-          <a:off x="17221200" y="6115050"/>
-          <a:ext cx="11620500" cy="9601200"/>
-        </p:xfrm>
-        <a:graphic>
-          <a:graphicData uri="http://schemas.openxmlformats.org/presentationml/2006/ole">
-            <mc:AlternateContent xmlns:mc="http://schemas.openxmlformats.org/markup-compatibility/2006">
-              <mc:Choice xmlns:v="urn:schemas-microsoft-com:vml" Requires="v">
-                <p:oleObj name="Document" r:id="rId10" imgW="4660552" imgH="3841609" progId="Word.Document.12">
-                  <p:embed/>
-                </p:oleObj>
-              </mc:Choice>
-              <mc:Fallback>
-                <p:oleObj name="Document" r:id="rId10" imgW="4660552" imgH="3841609" progId="Word.Document.12">
-                  <p:embed/>
-                  <p:pic>
-                    <p:nvPicPr>
-                      <p:cNvPr id="2554" name="Object 2553">
-                        <a:extLst>
-                          <a:ext uri="{FF2B5EF4-FFF2-40B4-BE49-F238E27FC236}">
-                            <a16:creationId xmlns:a16="http://schemas.microsoft.com/office/drawing/2014/main" id="{320234E1-44B5-2BFA-A3DD-D0A959BB062E}"/>
-                          </a:ext>
-                        </a:extLst>
-                      </p:cNvPr>
-                      <p:cNvPicPr/>
-                      <p:nvPr/>
-                    </p:nvPicPr>
-                    <p:blipFill>
-                      <a:blip r:embed="rId11"/>
-                      <a:stretch>
-                        <a:fillRect/>
-                      </a:stretch>
-                    </p:blipFill>
-                    <p:spPr>
-                      <a:xfrm>
-                        <a:off x="17221200" y="6115050"/>
-                        <a:ext cx="11620500" cy="9601200"/>
-                      </a:xfrm>
-                      <a:prstGeom prst="rect">
-                        <a:avLst/>
-                      </a:prstGeom>
-                    </p:spPr>
-                  </p:pic>
-                </p:oleObj>
-              </mc:Fallback>
-            </mc:AlternateContent>
-          </a:graphicData>
-        </a:graphic>
-      </p:graphicFrame>
+          <p:cNvSpPr txBox="1"/>
+          <p:nvPr/>
+        </p:nvSpPr>
+        <p:spPr>
+          <a:xfrm>
+            <a:off x="10287786" y="5204618"/>
+            <a:ext cx="9664716" cy="769441"/>
+          </a:xfrm>
+          <a:prstGeom prst="rect">
+            <a:avLst/>
+          </a:prstGeom>
+          <a:noFill/>
+        </p:spPr>
+        <p:txBody>
+          <a:bodyPr wrap="square" rtlCol="0">
+            <a:spAutoFit/>
+          </a:bodyPr>
+          <a:lstStyle/>
+          <a:p>
+            <a:pPr algn="just"/>
+            <a:r>
+              <a:rPr lang="en-NL" sz="4400" dirty="0">
+                <a:solidFill>
+                  <a:schemeClr val="bg2">
+                    <a:lumMod val="50000"/>
+                  </a:schemeClr>
+                </a:solidFill>
+                <a:latin typeface="Arial" panose="020B0604020202020204" pitchFamily="34" charset="0"/>
+                <a:cs typeface="Arial" panose="020B0604020202020204" pitchFamily="34" charset="0"/>
+              </a:rPr>
+              <a:t>T. </a:t>
+            </a:r>
+            <a:r>
+              <a:rPr lang="en-GB" sz="4400" dirty="0">
+                <a:solidFill>
+                  <a:schemeClr val="bg2">
+                    <a:lumMod val="50000"/>
+                  </a:schemeClr>
+                </a:solidFill>
+                <a:latin typeface="Arial" panose="020B0604020202020204" pitchFamily="34" charset="0"/>
+                <a:cs typeface="Arial" panose="020B0604020202020204" pitchFamily="34" charset="0"/>
+              </a:rPr>
+              <a:t>de Boer, R. van </a:t>
+            </a:r>
+            <a:r>
+              <a:rPr lang="en-GB" sz="4400" dirty="0" err="1">
+                <a:solidFill>
+                  <a:schemeClr val="bg2">
+                    <a:lumMod val="50000"/>
+                  </a:schemeClr>
+                </a:solidFill>
+                <a:latin typeface="Arial" panose="020B0604020202020204" pitchFamily="34" charset="0"/>
+                <a:cs typeface="Arial" panose="020B0604020202020204" pitchFamily="34" charset="0"/>
+              </a:rPr>
+              <a:t>Straaten</a:t>
+            </a:r>
+            <a:r>
+              <a:rPr lang="en-GB" sz="4400" dirty="0">
+                <a:solidFill>
+                  <a:schemeClr val="bg2">
+                    <a:lumMod val="50000"/>
+                  </a:schemeClr>
+                </a:solidFill>
+                <a:latin typeface="Arial" panose="020B0604020202020204" pitchFamily="34" charset="0"/>
+                <a:cs typeface="Arial" panose="020B0604020202020204" pitchFamily="34" charset="0"/>
+              </a:rPr>
+              <a:t>, E. </a:t>
+            </a:r>
+            <a:r>
+              <a:rPr lang="en-GB" sz="4400" dirty="0" err="1">
+                <a:solidFill>
+                  <a:schemeClr val="bg2">
+                    <a:lumMod val="50000"/>
+                  </a:schemeClr>
+                </a:solidFill>
+                <a:latin typeface="Arial" panose="020B0604020202020204" pitchFamily="34" charset="0"/>
+                <a:cs typeface="Arial" panose="020B0604020202020204" pitchFamily="34" charset="0"/>
+              </a:rPr>
+              <a:t>Zegers</a:t>
+            </a:r>
+            <a:endParaRPr lang="en-NL" sz="4400" dirty="0">
+              <a:solidFill>
+                <a:schemeClr val="bg2">
+                  <a:lumMod val="50000"/>
+                </a:schemeClr>
+              </a:solidFill>
+              <a:latin typeface="Arial" panose="020B0604020202020204" pitchFamily="34" charset="0"/>
+              <a:cs typeface="Arial" panose="020B0604020202020204" pitchFamily="34" charset="0"/>
+            </a:endParaRPr>
+          </a:p>
+        </p:txBody>
+      </p:sp>
+      <p:pic>
+        <p:nvPicPr>
+          <p:cNvPr id="31" name="Graphic 30">
+            <a:extLst>
+              <a:ext uri="{FF2B5EF4-FFF2-40B4-BE49-F238E27FC236}">
+                <a16:creationId xmlns:a16="http://schemas.microsoft.com/office/drawing/2014/main" id="{B6EFFC4C-4E7E-7A30-D4BA-DC7808B8BE36}"/>
+              </a:ext>
+            </a:extLst>
+          </p:cNvPr>
+          <p:cNvPicPr>
+            <a:picLocks noChangeAspect="1"/>
+          </p:cNvPicPr>
+          <p:nvPr/>
+        </p:nvPicPr>
+        <p:blipFill>
+          <a:blip r:embed="rId10">
+            <a:extLst>
+              <a:ext uri="{28A0092B-C50C-407E-A947-70E740481C1C}">
+                <a14:useLocalDpi xmlns:a14="http://schemas.microsoft.com/office/drawing/2010/main" val="0"/>
+              </a:ext>
+              <a:ext uri="{96DAC541-7B7A-43D3-8B79-37D633B846F1}">
+                <asvg:svgBlip xmlns:asvg="http://schemas.microsoft.com/office/drawing/2016/SVG/main" r:embed="rId11"/>
+              </a:ext>
+            </a:extLst>
+          </a:blip>
+          <a:stretch>
+            <a:fillRect/>
+          </a:stretch>
+        </p:blipFill>
+        <p:spPr>
+          <a:xfrm>
+            <a:off x="433412" y="17041836"/>
+            <a:ext cx="15492770" cy="8072945"/>
+          </a:xfrm>
+          <a:prstGeom prst="rect">
+            <a:avLst/>
+          </a:prstGeom>
+        </p:spPr>
+      </p:pic>
+      <p:pic>
+        <p:nvPicPr>
+          <p:cNvPr id="33" name="Graphic 32">
+            <a:extLst>
+              <a:ext uri="{FF2B5EF4-FFF2-40B4-BE49-F238E27FC236}">
+                <a16:creationId xmlns:a16="http://schemas.microsoft.com/office/drawing/2014/main" id="{BDCB3B4C-1811-F6C9-D304-25D5C32F7A7A}"/>
+              </a:ext>
+            </a:extLst>
+          </p:cNvPr>
+          <p:cNvPicPr>
+            <a:picLocks noChangeAspect="1"/>
+          </p:cNvPicPr>
+          <p:nvPr/>
+        </p:nvPicPr>
+        <p:blipFill>
+          <a:blip r:embed="rId12">
+            <a:extLst>
+              <a:ext uri="{28A0092B-C50C-407E-A947-70E740481C1C}">
+                <a14:useLocalDpi xmlns:a14="http://schemas.microsoft.com/office/drawing/2010/main" val="0"/>
+              </a:ext>
+              <a:ext uri="{96DAC541-7B7A-43D3-8B79-37D633B846F1}">
+                <asvg:svgBlip xmlns:asvg="http://schemas.microsoft.com/office/drawing/2016/SVG/main" r:embed="rId13"/>
+              </a:ext>
+            </a:extLst>
+          </a:blip>
+          <a:stretch>
+            <a:fillRect/>
+          </a:stretch>
+        </p:blipFill>
+        <p:spPr>
+          <a:xfrm>
+            <a:off x="15926182" y="25367825"/>
+            <a:ext cx="14528464" cy="14528464"/>
+          </a:xfrm>
+          <a:prstGeom prst="rect">
+            <a:avLst/>
+          </a:prstGeom>
+        </p:spPr>
+      </p:pic>
+      <p:pic>
+        <p:nvPicPr>
+          <p:cNvPr id="35" name="Graphic 34">
+            <a:extLst>
+              <a:ext uri="{FF2B5EF4-FFF2-40B4-BE49-F238E27FC236}">
+                <a16:creationId xmlns:a16="http://schemas.microsoft.com/office/drawing/2014/main" id="{37B76962-94C1-76FD-60A0-A6FF1C70565A}"/>
+              </a:ext>
+            </a:extLst>
+          </p:cNvPr>
+          <p:cNvPicPr>
+            <a:picLocks noChangeAspect="1"/>
+          </p:cNvPicPr>
+          <p:nvPr/>
+        </p:nvPicPr>
+        <p:blipFill>
+          <a:blip r:embed="rId14">
+            <a:extLst>
+              <a:ext uri="{28A0092B-C50C-407E-A947-70E740481C1C}">
+                <a14:useLocalDpi xmlns:a14="http://schemas.microsoft.com/office/drawing/2010/main" val="0"/>
+              </a:ext>
+              <a:ext uri="{96DAC541-7B7A-43D3-8B79-37D633B846F1}">
+                <asvg:svgBlip xmlns:asvg="http://schemas.microsoft.com/office/drawing/2016/SVG/main" r:embed="rId15"/>
+              </a:ext>
+            </a:extLst>
+          </a:blip>
+          <a:stretch>
+            <a:fillRect/>
+          </a:stretch>
+        </p:blipFill>
+        <p:spPr>
+          <a:xfrm>
+            <a:off x="16334294" y="16825994"/>
+            <a:ext cx="13352518" cy="8011511"/>
+          </a:xfrm>
+          <a:prstGeom prst="rect">
+            <a:avLst/>
+          </a:prstGeom>
+        </p:spPr>
+      </p:pic>
+      <p:sp>
+        <p:nvSpPr>
+          <p:cNvPr id="36" name="TextBox 35">
+            <a:extLst>
+              <a:ext uri="{FF2B5EF4-FFF2-40B4-BE49-F238E27FC236}">
+                <a16:creationId xmlns:a16="http://schemas.microsoft.com/office/drawing/2014/main" id="{6F89F645-D870-9FD6-5DE6-29F66132BBD8}"/>
+              </a:ext>
+            </a:extLst>
+          </p:cNvPr>
+          <p:cNvSpPr txBox="1"/>
+          <p:nvPr/>
+        </p:nvSpPr>
+        <p:spPr>
+          <a:xfrm>
+            <a:off x="16446511" y="16118506"/>
+            <a:ext cx="6607277" cy="923330"/>
+          </a:xfrm>
+          <a:prstGeom prst="rect">
+            <a:avLst/>
+          </a:prstGeom>
+          <a:noFill/>
+        </p:spPr>
+        <p:txBody>
+          <a:bodyPr wrap="square" rtlCol="0">
+            <a:spAutoFit/>
+          </a:bodyPr>
+          <a:lstStyle/>
+          <a:p>
+            <a:pPr algn="just"/>
+            <a:r>
+              <a:rPr lang="en-US" sz="5400" b="1" dirty="0">
+                <a:latin typeface="Arial" panose="020B0604020202020204" pitchFamily="34" charset="0"/>
+                <a:cs typeface="Arial" panose="020B0604020202020204" pitchFamily="34" charset="0"/>
+              </a:rPr>
+              <a:t>4. Results</a:t>
+            </a:r>
+            <a:endParaRPr lang="en-NL" sz="5400" b="1" dirty="0">
+              <a:latin typeface="Arial" panose="020B0604020202020204" pitchFamily="34" charset="0"/>
+              <a:cs typeface="Arial" panose="020B0604020202020204" pitchFamily="34" charset="0"/>
+            </a:endParaRPr>
+          </a:p>
+        </p:txBody>
+      </p:sp>
     </p:spTree>
     <p:extLst>
       <p:ext uri="{BB962C8B-B14F-4D97-AF65-F5344CB8AC3E}">
@@ -24789,4 +25537,299 @@
     </a:ext>
   </a:extLst>
 </a:theme>
+</file>
+
+<file path=ppt/theme/theme2.xml><?xml version="1.0" encoding="utf-8"?>
+<a:theme xmlns:a="http://schemas.openxmlformats.org/drawingml/2006/main" name="Office Theme">
+  <a:themeElements>
+    <a:clrScheme name="Office">
+      <a:dk1>
+        <a:sysClr val="windowText" lastClr="000000"/>
+      </a:dk1>
+      <a:lt1>
+        <a:sysClr val="window" lastClr="FFFFFF"/>
+      </a:lt1>
+      <a:dk2>
+        <a:srgbClr val="44546A"/>
+      </a:dk2>
+      <a:lt2>
+        <a:srgbClr val="E7E6E6"/>
+      </a:lt2>
+      <a:accent1>
+        <a:srgbClr val="4472C4"/>
+      </a:accent1>
+      <a:accent2>
+        <a:srgbClr val="ED7D31"/>
+      </a:accent2>
+      <a:accent3>
+        <a:srgbClr val="A5A5A5"/>
+      </a:accent3>
+      <a:accent4>
+        <a:srgbClr val="FFC000"/>
+      </a:accent4>
+      <a:accent5>
+        <a:srgbClr val="5B9BD5"/>
+      </a:accent5>
+      <a:accent6>
+        <a:srgbClr val="70AD47"/>
+      </a:accent6>
+      <a:hlink>
+        <a:srgbClr val="0563C1"/>
+      </a:hlink>
+      <a:folHlink>
+        <a:srgbClr val="954F72"/>
+      </a:folHlink>
+    </a:clrScheme>
+    <a:fontScheme name="Office">
+      <a:majorFont>
+        <a:latin typeface="Calibri Light" panose="020F0302020204030204"/>
+        <a:ea typeface=""/>
+        <a:cs typeface=""/>
+        <a:font script="Jpan" typeface="游ゴシック Light"/>
+        <a:font script="Hang" typeface="맑은 고딕"/>
+        <a:font script="Hans" typeface="等线 Light"/>
+        <a:font script="Hant" typeface="新細明體"/>
+        <a:font script="Arab" typeface="Times New Roman"/>
+        <a:font script="Hebr" typeface="Times New Roman"/>
+        <a:font script="Thai" typeface="Angsana New"/>
+        <a:font script="Ethi" typeface="Nyala"/>
+        <a:font script="Beng" typeface="Vrinda"/>
+        <a:font script="Gujr" typeface="Shruti"/>
+        <a:font script="Khmr" typeface="MoolBoran"/>
+        <a:font script="Knda" typeface="Tunga"/>
+        <a:font script="Guru" typeface="Raavi"/>
+        <a:font script="Cans" typeface="Euphemia"/>
+        <a:font script="Cher" typeface="Plantagenet Cherokee"/>
+        <a:font script="Yiii" typeface="Microsoft Yi Baiti"/>
+        <a:font script="Tibt" typeface="Microsoft Himalaya"/>
+        <a:font script="Thaa" typeface="MV Boli"/>
+        <a:font script="Deva" typeface="Mangal"/>
+        <a:font script="Telu" typeface="Gautami"/>
+        <a:font script="Taml" typeface="Latha"/>
+        <a:font script="Syrc" typeface="Estrangelo Edessa"/>
+        <a:font script="Orya" typeface="Kalinga"/>
+        <a:font script="Mlym" typeface="Kartika"/>
+        <a:font script="Laoo" typeface="DokChampa"/>
+        <a:font script="Sinh" typeface="Iskoola Pota"/>
+        <a:font script="Mong" typeface="Mongolian Baiti"/>
+        <a:font script="Viet" typeface="Times New Roman"/>
+        <a:font script="Uigh" typeface="Microsoft Uighur"/>
+        <a:font script="Geor" typeface="Sylfaen"/>
+        <a:font script="Armn" typeface="Arial"/>
+        <a:font script="Bugi" typeface="Leelawadee UI"/>
+        <a:font script="Bopo" typeface="Microsoft JhengHei"/>
+        <a:font script="Java" typeface="Javanese Text"/>
+        <a:font script="Lisu" typeface="Segoe UI"/>
+        <a:font script="Mymr" typeface="Myanmar Text"/>
+        <a:font script="Nkoo" typeface="Ebrima"/>
+        <a:font script="Olck" typeface="Nirmala UI"/>
+        <a:font script="Osma" typeface="Ebrima"/>
+        <a:font script="Phag" typeface="Phagspa"/>
+        <a:font script="Syrn" typeface="Estrangelo Edessa"/>
+        <a:font script="Syrj" typeface="Estrangelo Edessa"/>
+        <a:font script="Syre" typeface="Estrangelo Edessa"/>
+        <a:font script="Sora" typeface="Nirmala UI"/>
+        <a:font script="Tale" typeface="Microsoft Tai Le"/>
+        <a:font script="Talu" typeface="Microsoft New Tai Lue"/>
+        <a:font script="Tfng" typeface="Ebrima"/>
+      </a:majorFont>
+      <a:minorFont>
+        <a:latin typeface="Calibri" panose="020F0502020204030204"/>
+        <a:ea typeface=""/>
+        <a:cs typeface=""/>
+        <a:font script="Jpan" typeface="游ゴシック"/>
+        <a:font script="Hang" typeface="맑은 고딕"/>
+        <a:font script="Hans" typeface="等线"/>
+        <a:font script="Hant" typeface="新細明體"/>
+        <a:font script="Arab" typeface="Arial"/>
+        <a:font script="Hebr" typeface="Arial"/>
+        <a:font script="Thai" typeface="Cordia New"/>
+        <a:font script="Ethi" typeface="Nyala"/>
+        <a:font script="Beng" typeface="Vrinda"/>
+        <a:font script="Gujr" typeface="Shruti"/>
+        <a:font script="Khmr" typeface="DaunPenh"/>
+        <a:font script="Knda" typeface="Tunga"/>
+        <a:font script="Guru" typeface="Raavi"/>
+        <a:font script="Cans" typeface="Euphemia"/>
+        <a:font script="Cher" typeface="Plantagenet Cherokee"/>
+        <a:font script="Yiii" typeface="Microsoft Yi Baiti"/>
+        <a:font script="Tibt" typeface="Microsoft Himalaya"/>
+        <a:font script="Thaa" typeface="MV Boli"/>
+        <a:font script="Deva" typeface="Mangal"/>
+        <a:font script="Telu" typeface="Gautami"/>
+        <a:font script="Taml" typeface="Latha"/>
+        <a:font script="Syrc" typeface="Estrangelo Edessa"/>
+        <a:font script="Orya" typeface="Kalinga"/>
+        <a:font script="Mlym" typeface="Kartika"/>
+        <a:font script="Laoo" typeface="DokChampa"/>
+        <a:font script="Sinh" typeface="Iskoola Pota"/>
+        <a:font script="Mong" typeface="Mongolian Baiti"/>
+        <a:font script="Viet" typeface="Arial"/>
+        <a:font script="Uigh" typeface="Microsoft Uighur"/>
+        <a:font script="Geor" typeface="Sylfaen"/>
+        <a:font script="Armn" typeface="Arial"/>
+        <a:font script="Bugi" typeface="Leelawadee UI"/>
+        <a:font script="Bopo" typeface="Microsoft JhengHei"/>
+        <a:font script="Java" typeface="Javanese Text"/>
+        <a:font script="Lisu" typeface="Segoe UI"/>
+        <a:font script="Mymr" typeface="Myanmar Text"/>
+        <a:font script="Nkoo" typeface="Ebrima"/>
+        <a:font script="Olck" typeface="Nirmala UI"/>
+        <a:font script="Osma" typeface="Ebrima"/>
+        <a:font script="Phag" typeface="Phagspa"/>
+        <a:font script="Syrn" typeface="Estrangelo Edessa"/>
+        <a:font script="Syrj" typeface="Estrangelo Edessa"/>
+        <a:font script="Syre" typeface="Estrangelo Edessa"/>
+        <a:font script="Sora" typeface="Nirmala UI"/>
+        <a:font script="Tale" typeface="Microsoft Tai Le"/>
+        <a:font script="Talu" typeface="Microsoft New Tai Lue"/>
+        <a:font script="Tfng" typeface="Ebrima"/>
+      </a:minorFont>
+    </a:fontScheme>
+    <a:fmtScheme name="Office">
+      <a:fillStyleLst>
+        <a:solidFill>
+          <a:schemeClr val="phClr"/>
+        </a:solidFill>
+        <a:gradFill rotWithShape="1">
+          <a:gsLst>
+            <a:gs pos="0">
+              <a:schemeClr val="phClr">
+                <a:lumMod val="110000"/>
+                <a:satMod val="105000"/>
+                <a:tint val="67000"/>
+              </a:schemeClr>
+            </a:gs>
+            <a:gs pos="50000">
+              <a:schemeClr val="phClr">
+                <a:lumMod val="105000"/>
+                <a:satMod val="103000"/>
+                <a:tint val="73000"/>
+              </a:schemeClr>
+            </a:gs>
+            <a:gs pos="100000">
+              <a:schemeClr val="phClr">
+                <a:lumMod val="105000"/>
+                <a:satMod val="109000"/>
+                <a:tint val="81000"/>
+              </a:schemeClr>
+            </a:gs>
+          </a:gsLst>
+          <a:lin ang="5400000" scaled="0"/>
+        </a:gradFill>
+        <a:gradFill rotWithShape="1">
+          <a:gsLst>
+            <a:gs pos="0">
+              <a:schemeClr val="phClr">
+                <a:satMod val="103000"/>
+                <a:lumMod val="102000"/>
+                <a:tint val="94000"/>
+              </a:schemeClr>
+            </a:gs>
+            <a:gs pos="50000">
+              <a:schemeClr val="phClr">
+                <a:satMod val="110000"/>
+                <a:lumMod val="100000"/>
+                <a:shade val="100000"/>
+              </a:schemeClr>
+            </a:gs>
+            <a:gs pos="100000">
+              <a:schemeClr val="phClr">
+                <a:lumMod val="99000"/>
+                <a:satMod val="120000"/>
+                <a:shade val="78000"/>
+              </a:schemeClr>
+            </a:gs>
+          </a:gsLst>
+          <a:lin ang="5400000" scaled="0"/>
+        </a:gradFill>
+      </a:fillStyleLst>
+      <a:lnStyleLst>
+        <a:ln w="6350" cap="flat" cmpd="sng" algn="ctr">
+          <a:solidFill>
+            <a:schemeClr val="phClr"/>
+          </a:solidFill>
+          <a:prstDash val="solid"/>
+          <a:miter lim="800000"/>
+        </a:ln>
+        <a:ln w="12700" cap="flat" cmpd="sng" algn="ctr">
+          <a:solidFill>
+            <a:schemeClr val="phClr"/>
+          </a:solidFill>
+          <a:prstDash val="solid"/>
+          <a:miter lim="800000"/>
+        </a:ln>
+        <a:ln w="19050" cap="flat" cmpd="sng" algn="ctr">
+          <a:solidFill>
+            <a:schemeClr val="phClr"/>
+          </a:solidFill>
+          <a:prstDash val="solid"/>
+          <a:miter lim="800000"/>
+        </a:ln>
+      </a:lnStyleLst>
+      <a:effectStyleLst>
+        <a:effectStyle>
+          <a:effectLst/>
+        </a:effectStyle>
+        <a:effectStyle>
+          <a:effectLst/>
+        </a:effectStyle>
+        <a:effectStyle>
+          <a:effectLst>
+            <a:outerShdw blurRad="57150" dist="19050" dir="5400000" algn="ctr" rotWithShape="0">
+              <a:srgbClr val="000000">
+                <a:alpha val="63000"/>
+              </a:srgbClr>
+            </a:outerShdw>
+          </a:effectLst>
+        </a:effectStyle>
+      </a:effectStyleLst>
+      <a:bgFillStyleLst>
+        <a:solidFill>
+          <a:schemeClr val="phClr"/>
+        </a:solidFill>
+        <a:solidFill>
+          <a:schemeClr val="phClr">
+            <a:tint val="95000"/>
+            <a:satMod val="170000"/>
+          </a:schemeClr>
+        </a:solidFill>
+        <a:gradFill rotWithShape="1">
+          <a:gsLst>
+            <a:gs pos="0">
+              <a:schemeClr val="phClr">
+                <a:tint val="93000"/>
+                <a:satMod val="150000"/>
+                <a:shade val="98000"/>
+                <a:lumMod val="102000"/>
+              </a:schemeClr>
+            </a:gs>
+            <a:gs pos="50000">
+              <a:schemeClr val="phClr">
+                <a:tint val="98000"/>
+                <a:satMod val="130000"/>
+                <a:shade val="90000"/>
+                <a:lumMod val="103000"/>
+              </a:schemeClr>
+            </a:gs>
+            <a:gs pos="100000">
+              <a:schemeClr val="phClr">
+                <a:shade val="63000"/>
+                <a:satMod val="120000"/>
+              </a:schemeClr>
+            </a:gs>
+          </a:gsLst>
+          <a:lin ang="5400000" scaled="0"/>
+        </a:gradFill>
+      </a:bgFillStyleLst>
+    </a:fmtScheme>
+  </a:themeElements>
+  <a:objectDefaults/>
+  <a:extraClrSchemeLst/>
+  <a:extLst>
+    <a:ext uri="{05A4C25C-085E-4340-85A3-A5531E510DB2}">
+      <thm15:themeFamily xmlns:thm15="http://schemas.microsoft.com/office/thememl/2012/main" name="Office Theme" id="{62F939B6-93AF-4DB8-9C6B-D6C7DFDC589F}" vid="{4A3C46E8-61CC-4603-A589-7422A47A8E4A}"/>
+    </a:ext>
+  </a:extLst>
+</a:theme>
 </file>
</xml_diff>

<commit_message>
small edits to poster + creation of animation
</commit_message>
<xml_diff>
--- a/Poster/Poster.pptx
+++ b/Poster/Poster.pptx
@@ -24155,7 +24155,7 @@
         </p:nvSpPr>
         <p:spPr>
           <a:xfrm>
-            <a:off x="703370" y="11882380"/>
+            <a:off x="703370" y="11756190"/>
             <a:ext cx="13773069" cy="4401205"/>
           </a:xfrm>
           <a:prstGeom prst="rect">
@@ -24175,7 +24175,7 @@
                 <a:latin typeface="Arial" panose="020B0604020202020204" pitchFamily="34" charset="0"/>
                 <a:cs typeface="Arial" panose="020B0604020202020204" pitchFamily="34" charset="0"/>
               </a:rPr>
-              <a:t>The ECDL makes use of a Littman-Metcalf configuration, where a mirror mounted on a high-precision rotation stage selects which wavelength(s) are feedbacked into the diode laser [1]. The zeroth order diffraction of the ECDL is directed into a spectrometer, which displays the wavelengths present in the beam. The spectrometer is calibrated with a neon lamp.</a:t>
+              <a:t>The ECDL makes use of a Littman-Metcalf configuration, where a mirror mounted on a high-precision rotation stage selects which wavelength(s) are feedbacked into the diode laser [2]. The zeroth order diffraction of the ECDL is directed into a spectrometer, which displays the wavelengths present in the beam. The spectrometer is calibrated with a neon lamp.</a:t>
             </a:r>
           </a:p>
         </p:txBody>
@@ -24348,7 +24348,7 @@
         </p:nvSpPr>
         <p:spPr>
           <a:xfrm>
-            <a:off x="746606" y="11000219"/>
+            <a:off x="746606" y="10874029"/>
             <a:ext cx="6607277" cy="923330"/>
           </a:xfrm>
           <a:prstGeom prst="rect">
@@ -24391,7 +24391,7 @@
         </p:nvSpPr>
         <p:spPr>
           <a:xfrm>
-            <a:off x="703371" y="25754206"/>
+            <a:off x="703371" y="25159553"/>
             <a:ext cx="7260700" cy="923330"/>
           </a:xfrm>
           <a:prstGeom prst="rect">
@@ -24434,8 +24434,8 @@
         </p:nvSpPr>
         <p:spPr>
           <a:xfrm>
-            <a:off x="703370" y="26677536"/>
-            <a:ext cx="13799377" cy="3785652"/>
+            <a:off x="703370" y="26082883"/>
+            <a:ext cx="13799377" cy="4401205"/>
           </a:xfrm>
           <a:prstGeom prst="rect">
             <a:avLst/>
@@ -24454,7 +24454,7 @@
                 <a:latin typeface="Arial" panose="020B0604020202020204" pitchFamily="34" charset="0"/>
                 <a:cs typeface="Arial" panose="020B0604020202020204" pitchFamily="34" charset="0"/>
               </a:rPr>
-              <a:t>When the laser was provided with optical feedback, the laser’s spectrum narrowed and shifted. The shift was dependent on the laser mode reflected back into the laser cavity. The wavelengths which provided the narrowest peaks when providing feedback can be selected from the peaks shown in the broad spectrum of  Figure 1.</a:t>
+              <a:t>When the laser was provided with optical feedback, the laser’s spectrum narrowed and shifted. The shift was dependent on the laser mode reflected back into the laser cavity. The wavelengths which provided the most obvious shifts and narrowest peaks when providing feedback correspond to the wavelengths of the peaks shown in the broad spectrum of  Figure 1.</a:t>
             </a:r>
             <a:endParaRPr lang="en-NL" sz="4000" dirty="0">
               <a:latin typeface="Arial" panose="020B0604020202020204" pitchFamily="34" charset="0"/>
@@ -24586,37 +24586,32 @@
               <a:t>[1] </a:t>
             </a:r>
             <a:r>
-              <a:rPr lang="en-GB" sz="4000" b="0" i="0" u="none" strike="noStrike" dirty="0">
-                <a:solidFill>
-                  <a:srgbClr val="1A1A1A"/>
-                </a:solidFill>
-                <a:effectLst/>
+              <a:rPr lang="en-GB" sz="4000" dirty="0" err="1">
                 <a:latin typeface="Arial" panose="020B0604020202020204" pitchFamily="34" charset="0"/>
                 <a:cs typeface="Arial" panose="020B0604020202020204" pitchFamily="34" charset="0"/>
               </a:rPr>
-              <a:t>Erik G. Brekke, Matthew A. Schulz; Observation of laser feedback using a grating spectrometer. </a:t>
+              <a:t>Jumpertz</a:t>
             </a:r>
             <a:r>
-              <a:rPr lang="en-GB" sz="4000" b="0" i="1" u="none" strike="noStrike" dirty="0">
-                <a:solidFill>
-                  <a:srgbClr val="1A1A1A"/>
-                </a:solidFill>
-                <a:effectLst/>
+              <a:rPr lang="en-GB" sz="4000" dirty="0">
                 <a:latin typeface="Arial" panose="020B0604020202020204" pitchFamily="34" charset="0"/>
                 <a:cs typeface="Arial" panose="020B0604020202020204" pitchFamily="34" charset="0"/>
               </a:rPr>
-              <a:t>American Journal of Physics</a:t>
+              <a:t>, L. (2017). Optical Feedback in </a:t>
             </a:r>
             <a:r>
-              <a:rPr lang="en-GB" sz="4000" b="0" i="0" u="none" strike="noStrike" dirty="0">
-                <a:solidFill>
-                  <a:srgbClr val="1A1A1A"/>
-                </a:solidFill>
-                <a:effectLst/>
+              <a:rPr lang="en-GB" sz="4000" dirty="0" err="1">
                 <a:latin typeface="Arial" panose="020B0604020202020204" pitchFamily="34" charset="0"/>
                 <a:cs typeface="Arial" panose="020B0604020202020204" pitchFamily="34" charset="0"/>
               </a:rPr>
-              <a:t> 1 July 2015; 83 (7): 616–620.</a:t>
+              <a:t>Interband</a:t>
+            </a:r>
+            <a:r>
+              <a:rPr lang="en-GB" sz="4000" dirty="0">
+                <a:latin typeface="Arial" panose="020B0604020202020204" pitchFamily="34" charset="0"/>
+                <a:cs typeface="Arial" panose="020B0604020202020204" pitchFamily="34" charset="0"/>
+              </a:rPr>
+              <a:t> Lasers. In: Nonlinear Photonics in Mid-infrared Quantum Cascade Lasers. Springer Theses. Springer, Cham.</a:t>
             </a:r>
             <a:endParaRPr lang="en-NL" sz="4000" dirty="0">
               <a:latin typeface="Arial" panose="020B0604020202020204" pitchFamily="34" charset="0"/>
@@ -24640,36 +24635,34 @@
               <a:t>[2] </a:t>
             </a:r>
             <a:r>
-              <a:rPr lang="en-GB" sz="4000" b="0" i="0" u="none" strike="noStrike" dirty="0" err="1">
-                <a:effectLst/>
+              <a:rPr lang="en-GB" sz="4000" dirty="0">
+                <a:solidFill>
+                  <a:srgbClr val="1A1A1A"/>
+                </a:solidFill>
                 <a:latin typeface="Arial" panose="020B0604020202020204" pitchFamily="34" charset="0"/>
                 <a:cs typeface="Arial" panose="020B0604020202020204" pitchFamily="34" charset="0"/>
               </a:rPr>
-              <a:t>Jumpertz</a:t>
+              <a:t>Erik G. Brekke, Matthew A. Schulz; Observation of laser feedback using a grating spectrometer. </a:t>
             </a:r>
             <a:r>
-              <a:rPr lang="en-GB" sz="4000" b="0" i="0" u="none" strike="noStrike" dirty="0">
-                <a:effectLst/>
+              <a:rPr lang="en-GB" sz="4000" i="1" dirty="0">
+                <a:solidFill>
+                  <a:srgbClr val="1A1A1A"/>
+                </a:solidFill>
                 <a:latin typeface="Arial" panose="020B0604020202020204" pitchFamily="34" charset="0"/>
                 <a:cs typeface="Arial" panose="020B0604020202020204" pitchFamily="34" charset="0"/>
               </a:rPr>
-              <a:t>, L. (2017). Optical Feedback in </a:t>
+              <a:t>American Journal of Physics</a:t>
             </a:r>
             <a:r>
-              <a:rPr lang="en-GB" sz="4000" b="0" i="0" u="none" strike="noStrike" dirty="0" err="1">
-                <a:effectLst/>
+              <a:rPr lang="en-GB" sz="4000" dirty="0">
+                <a:solidFill>
+                  <a:srgbClr val="1A1A1A"/>
+                </a:solidFill>
                 <a:latin typeface="Arial" panose="020B0604020202020204" pitchFamily="34" charset="0"/>
                 <a:cs typeface="Arial" panose="020B0604020202020204" pitchFamily="34" charset="0"/>
               </a:rPr>
-              <a:t>Interband</a:t>
-            </a:r>
-            <a:r>
-              <a:rPr lang="en-GB" sz="4000" b="0" i="0" u="none" strike="noStrike" dirty="0">
-                <a:effectLst/>
-                <a:latin typeface="Arial" panose="020B0604020202020204" pitchFamily="34" charset="0"/>
-                <a:cs typeface="Arial" panose="020B0604020202020204" pitchFamily="34" charset="0"/>
-              </a:rPr>
-              <a:t> Lasers. In: Nonlinear Photonics in Mid-infrared Quantum Cascade Lasers. Springer Theses. Springer, Cham.</a:t>
+              <a:t> 1 July 2015; 83 (7): 616–620.</a:t>
             </a:r>
             <a:endParaRPr lang="en-NL" sz="4000" dirty="0">
               <a:latin typeface="Arial" panose="020B0604020202020204" pitchFamily="34" charset="0"/>
@@ -24875,7 +24868,7 @@
           <p:nvPr>
             <p:extLst>
               <p:ext uri="{D42A27DB-BD31-4B8C-83A1-F6EECF244321}">
-                <p14:modId xmlns:p14="http://schemas.microsoft.com/office/powerpoint/2010/main" val="3832284536"/>
+                <p14:modId xmlns:p14="http://schemas.microsoft.com/office/powerpoint/2010/main" val="1037927031"/>
               </p:ext>
             </p:extLst>
           </p:nvPr>
@@ -25136,8 +25129,8 @@
         </p:blipFill>
         <p:spPr>
           <a:xfrm>
-            <a:off x="433412" y="17041836"/>
-            <a:ext cx="15492770" cy="8072945"/>
+            <a:off x="553476" y="16572712"/>
+            <a:ext cx="15034867" cy="8072945"/>
           </a:xfrm>
           <a:prstGeom prst="rect">
             <a:avLst/>

</xml_diff>